<commit_message>
Added MVVM diagram to WPF presentation
</commit_message>
<xml_diff>
--- a/Presentation/lesson-12-wpf.pptx
+++ b/Presentation/lesson-12-wpf.pptx
@@ -5,7 +5,7 @@
     <p:sldMasterId id="2147483648" r:id="rId1"/>
   </p:sldMasterIdLst>
   <p:notesMasterIdLst>
-    <p:notesMasterId r:id="rId23"/>
+    <p:notesMasterId r:id="rId24"/>
   </p:notesMasterIdLst>
   <p:sldIdLst>
     <p:sldId id="256" r:id="rId2"/>
@@ -29,6 +29,7 @@
     <p:sldId id="274" r:id="rId20"/>
     <p:sldId id="275" r:id="rId21"/>
     <p:sldId id="276" r:id="rId22"/>
+    <p:sldId id="278" r:id="rId23"/>
   </p:sldIdLst>
   <p:sldSz cx="9144000" cy="6858000" type="screen4x3"/>
   <p:notesSz cx="6858000" cy="9144000"/>
@@ -212,7 +213,7 @@
           <a:p>
             <a:fld id="{B24A7054-7FFB-49F4-A126-5DF6E687FF53}" type="datetimeFigureOut">
               <a:rPr lang="ru-RU" smtClean="0"/>
-              <a:t>27.03.2013</a:t>
+              <a:t>10.10.2013</a:t>
             </a:fld>
             <a:endParaRPr lang="ru-RU"/>
           </a:p>
@@ -1275,7 +1276,7 @@
           <a:p>
             <a:fld id="{8E6E6A2A-E9D3-4A0D-B04A-ABDD367A1E08}" type="datetimeFigureOut">
               <a:rPr lang="ru-RU" smtClean="0"/>
-              <a:t>27.03.2013</a:t>
+              <a:t>10.10.2013</a:t>
             </a:fld>
             <a:endParaRPr lang="ru-RU"/>
           </a:p>
@@ -2723,7 +2724,7 @@
           <a:p>
             <a:fld id="{AC3D3127-B7C4-45E3-9797-C527EC9FDD78}" type="datetimeFigureOut">
               <a:rPr lang="ru-RU" smtClean="0"/>
-              <a:t>27.03.2013</a:t>
+              <a:t>10.10.2013</a:t>
             </a:fld>
             <a:endParaRPr lang="ru-RU"/>
           </a:p>
@@ -6749,6 +6750,113 @@
 </p:sld>
 </file>
 
+<file path=ppt/slides/slide22.xml><?xml version="1.0" encoding="utf-8"?>
+<p:sld xmlns:a="http://schemas.openxmlformats.org/drawingml/2006/main" xmlns:r="http://schemas.openxmlformats.org/officeDocument/2006/relationships" xmlns:p="http://schemas.openxmlformats.org/presentationml/2006/main">
+  <p:cSld>
+    <p:spTree>
+      <p:nvGrpSpPr>
+        <p:cNvPr id="1" name=""/>
+        <p:cNvGrpSpPr/>
+        <p:nvPr/>
+      </p:nvGrpSpPr>
+      <p:grpSpPr>
+        <a:xfrm>
+          <a:off x="0" y="0"/>
+          <a:ext cx="0" cy="0"/>
+          <a:chOff x="0" y="0"/>
+          <a:chExt cx="0" cy="0"/>
+        </a:xfrm>
+      </p:grpSpPr>
+      <p:sp>
+        <p:nvSpPr>
+          <p:cNvPr id="2" name="Title 1"/>
+          <p:cNvSpPr>
+            <a:spLocks noGrp="1"/>
+          </p:cNvSpPr>
+          <p:nvPr>
+            <p:ph type="title"/>
+          </p:nvPr>
+        </p:nvSpPr>
+        <p:spPr/>
+        <p:txBody>
+          <a:bodyPr/>
+          <a:lstStyle/>
+          <a:p>
+            <a:r>
+              <a:rPr lang="en-US" dirty="0" smtClean="0"/>
+              <a:t>MVVM: Model View View-Model</a:t>
+            </a:r>
+            <a:endParaRPr lang="en-US" dirty="0"/>
+          </a:p>
+        </p:txBody>
+      </p:sp>
+      <p:pic>
+        <p:nvPicPr>
+          <p:cNvPr id="1026" name="Picture 2"/>
+          <p:cNvPicPr>
+            <a:picLocks noChangeAspect="1" noChangeArrowheads="1"/>
+          </p:cNvPicPr>
+          <p:nvPr/>
+        </p:nvPicPr>
+        <p:blipFill>
+          <a:blip r:embed="rId2">
+            <a:extLst>
+              <a:ext uri="{28A0092B-C50C-407E-A947-70E740481C1C}">
+                <a14:useLocalDpi xmlns:a14="http://schemas.microsoft.com/office/drawing/2010/main" val="0"/>
+              </a:ext>
+            </a:extLst>
+          </a:blip>
+          <a:srcRect/>
+          <a:stretch>
+            <a:fillRect/>
+          </a:stretch>
+        </p:blipFill>
+        <p:spPr bwMode="auto">
+          <a:xfrm>
+            <a:off x="1724025" y="1700808"/>
+            <a:ext cx="5695950" cy="4362450"/>
+          </a:xfrm>
+          <a:prstGeom prst="rect">
+            <a:avLst/>
+          </a:prstGeom>
+          <a:noFill/>
+          <a:ln>
+            <a:noFill/>
+          </a:ln>
+          <a:extLst>
+            <a:ext uri="{909E8E84-426E-40DD-AFC4-6F175D3DCCD1}">
+              <a14:hiddenFill xmlns:a14="http://schemas.microsoft.com/office/drawing/2010/main">
+                <a:solidFill>
+                  <a:schemeClr val="accent1"/>
+                </a:solidFill>
+              </a14:hiddenFill>
+            </a:ext>
+            <a:ext uri="{91240B29-F687-4F45-9708-019B960494DF}">
+              <a14:hiddenLine xmlns:a14="http://schemas.microsoft.com/office/drawing/2010/main" w="9525">
+                <a:solidFill>
+                  <a:schemeClr val="tx1"/>
+                </a:solidFill>
+                <a:miter lim="800000"/>
+                <a:headEnd/>
+                <a:tailEnd/>
+              </a14:hiddenLine>
+            </a:ext>
+          </a:extLst>
+        </p:spPr>
+      </p:pic>
+    </p:spTree>
+    <p:extLst>
+      <p:ext uri="{BB962C8B-B14F-4D97-AF65-F5344CB8AC3E}">
+        <p14:creationId xmlns:p14="http://schemas.microsoft.com/office/powerpoint/2010/main" val="2939539671"/>
+      </p:ext>
+    </p:extLst>
+  </p:cSld>
+  <p:clrMapOvr>
+    <a:masterClrMapping/>
+  </p:clrMapOvr>
+</p:sld>
+</file>
+
 <file path=ppt/slides/slide3.xml><?xml version="1.0" encoding="utf-8"?>
 <p:sld xmlns:a="http://schemas.openxmlformats.org/drawingml/2006/main" xmlns:r="http://schemas.openxmlformats.org/officeDocument/2006/relationships" xmlns:p="http://schemas.openxmlformats.org/presentationml/2006/main">
   <p:cSld>

</xml_diff>

<commit_message>
WPF presentation: margin and layout containers
</commit_message>
<xml_diff>
--- a/Presentation/lesson-12-wpf.pptx
+++ b/Presentation/lesson-12-wpf.pptx
@@ -5,7 +5,7 @@
     <p:sldMasterId id="2147483648" r:id="rId1"/>
   </p:sldMasterIdLst>
   <p:notesMasterIdLst>
-    <p:notesMasterId r:id="rId24"/>
+    <p:notesMasterId r:id="rId25"/>
   </p:notesMasterIdLst>
   <p:sldIdLst>
     <p:sldId id="256" r:id="rId2"/>
@@ -26,10 +26,11 @@
     <p:sldId id="271" r:id="rId17"/>
     <p:sldId id="272" r:id="rId18"/>
     <p:sldId id="273" r:id="rId19"/>
-    <p:sldId id="274" r:id="rId20"/>
-    <p:sldId id="275" r:id="rId21"/>
-    <p:sldId id="276" r:id="rId22"/>
-    <p:sldId id="278" r:id="rId23"/>
+    <p:sldId id="279" r:id="rId20"/>
+    <p:sldId id="274" r:id="rId21"/>
+    <p:sldId id="275" r:id="rId22"/>
+    <p:sldId id="276" r:id="rId23"/>
+    <p:sldId id="278" r:id="rId24"/>
   </p:sldIdLst>
   <p:sldSz cx="9144000" cy="6858000" type="screen4x3"/>
   <p:notesSz cx="6858000" cy="9144000"/>
@@ -213,7 +214,7 @@
           <a:p>
             <a:fld id="{B24A7054-7FFB-49F4-A126-5DF6E687FF53}" type="datetimeFigureOut">
               <a:rPr lang="ru-RU" smtClean="0"/>
-              <a:t>10.10.2013</a:t>
+              <a:t>30.10.2013</a:t>
             </a:fld>
             <a:endParaRPr lang="ru-RU"/>
           </a:p>
@@ -1276,7 +1277,7 @@
           <a:p>
             <a:fld id="{8E6E6A2A-E9D3-4A0D-B04A-ABDD367A1E08}" type="datetimeFigureOut">
               <a:rPr lang="ru-RU" smtClean="0"/>
-              <a:t>10.10.2013</a:t>
+              <a:t>30.10.2013</a:t>
             </a:fld>
             <a:endParaRPr lang="ru-RU"/>
           </a:p>
@@ -2724,7 +2725,7 @@
           <a:p>
             <a:fld id="{AC3D3127-B7C4-45E3-9797-C527EC9FDD78}" type="datetimeFigureOut">
               <a:rPr lang="ru-RU" smtClean="0"/>
-              <a:t>10.10.2013</a:t>
+              <a:t>30.10.2013</a:t>
             </a:fld>
             <a:endParaRPr lang="ru-RU"/>
           </a:p>
@@ -5013,6 +5014,351 @@
         </p:nvSpPr>
         <p:spPr/>
         <p:txBody>
+          <a:bodyPr>
+            <a:normAutofit/>
+          </a:bodyPr>
+          <a:lstStyle/>
+          <a:p>
+            <a:r>
+              <a:rPr lang="en-US" dirty="0" smtClean="0"/>
+              <a:t>Margin (</a:t>
+            </a:r>
+            <a:r>
+              <a:rPr lang="ru-RU" dirty="0" smtClean="0"/>
+              <a:t>граница</a:t>
+            </a:r>
+            <a:r>
+              <a:rPr lang="en-US" dirty="0" smtClean="0"/>
+              <a:t>)</a:t>
+            </a:r>
+            <a:endParaRPr lang="en-US" dirty="0"/>
+          </a:p>
+        </p:txBody>
+      </p:sp>
+      <p:pic>
+        <p:nvPicPr>
+          <p:cNvPr id="1026" name="Picture 2"/>
+          <p:cNvPicPr>
+            <a:picLocks noChangeAspect="1" noChangeArrowheads="1"/>
+          </p:cNvPicPr>
+          <p:nvPr/>
+        </p:nvPicPr>
+        <p:blipFill>
+          <a:blip r:embed="rId2">
+            <a:extLst>
+              <a:ext uri="{28A0092B-C50C-407E-A947-70E740481C1C}">
+                <a14:useLocalDpi xmlns:a14="http://schemas.microsoft.com/office/drawing/2010/main" val="0"/>
+              </a:ext>
+            </a:extLst>
+          </a:blip>
+          <a:srcRect/>
+          <a:stretch>
+            <a:fillRect/>
+          </a:stretch>
+        </p:blipFill>
+        <p:spPr bwMode="auto">
+          <a:xfrm>
+            <a:off x="2526030" y="1268760"/>
+            <a:ext cx="4091940" cy="3345180"/>
+          </a:xfrm>
+          <a:prstGeom prst="rect">
+            <a:avLst/>
+          </a:prstGeom>
+          <a:noFill/>
+          <a:ln>
+            <a:noFill/>
+          </a:ln>
+          <a:extLst>
+            <a:ext uri="{909E8E84-426E-40DD-AFC4-6F175D3DCCD1}">
+              <a14:hiddenFill xmlns:a14="http://schemas.microsoft.com/office/drawing/2010/main">
+                <a:solidFill>
+                  <a:schemeClr val="accent1"/>
+                </a:solidFill>
+              </a14:hiddenFill>
+            </a:ext>
+            <a:ext uri="{91240B29-F687-4F45-9708-019B960494DF}">
+              <a14:hiddenLine xmlns:a14="http://schemas.microsoft.com/office/drawing/2010/main" w="9525">
+                <a:solidFill>
+                  <a:schemeClr val="tx1"/>
+                </a:solidFill>
+                <a:miter lim="800000"/>
+                <a:headEnd/>
+                <a:tailEnd/>
+              </a14:hiddenLine>
+            </a:ext>
+          </a:extLst>
+        </p:spPr>
+      </p:pic>
+      <p:sp>
+        <p:nvSpPr>
+          <p:cNvPr id="5" name="TextBox 4"/>
+          <p:cNvSpPr txBox="1"/>
+          <p:nvPr/>
+        </p:nvSpPr>
+        <p:spPr>
+          <a:xfrm>
+            <a:off x="395536" y="4653136"/>
+            <a:ext cx="8280920" cy="2308324"/>
+          </a:xfrm>
+          <a:prstGeom prst="rect">
+            <a:avLst/>
+          </a:prstGeom>
+          <a:noFill/>
+        </p:spPr>
+        <p:txBody>
+          <a:bodyPr wrap="square" rtlCol="0">
+            <a:spAutoFit/>
+          </a:bodyPr>
+          <a:lstStyle/>
+          <a:p>
+            <a:r>
+              <a:rPr lang="ru-RU" sz="2400" dirty="0" smtClean="0"/>
+              <a:t>Свойство </a:t>
+            </a:r>
+            <a:r>
+              <a:rPr lang="en-US" sz="2400" dirty="0"/>
+              <a:t>Margin </a:t>
+            </a:r>
+            <a:r>
+              <a:rPr lang="ru-RU" sz="2400" dirty="0" smtClean="0"/>
+              <a:t>позволяет задать отступы вокруг элемента который запрещено занимать другим:</a:t>
+            </a:r>
+          </a:p>
+          <a:p>
+            <a:pPr marL="342900" indent="-342900">
+              <a:buFont typeface="Arial" panose="020B0604020202020204" pitchFamily="34" charset="0"/>
+              <a:buChar char="•"/>
+            </a:pPr>
+            <a:r>
+              <a:rPr lang="en-US" sz="2400" dirty="0" smtClean="0"/>
+              <a:t>Margin="</a:t>
+            </a:r>
+            <a:r>
+              <a:rPr lang="ru-RU" sz="2400" dirty="0" smtClean="0"/>
+              <a:t>слева</a:t>
+            </a:r>
+            <a:r>
+              <a:rPr lang="en-US" sz="2400" dirty="0" smtClean="0"/>
+              <a:t>,</a:t>
+            </a:r>
+            <a:r>
+              <a:rPr lang="ru-RU" sz="2400" dirty="0" smtClean="0"/>
+              <a:t>сверху</a:t>
+            </a:r>
+            <a:r>
+              <a:rPr lang="en-US" sz="2400" dirty="0" smtClean="0"/>
+              <a:t>,</a:t>
+            </a:r>
+            <a:r>
+              <a:rPr lang="ru-RU" sz="2400" dirty="0" smtClean="0"/>
+              <a:t>справа</a:t>
+            </a:r>
+            <a:r>
+              <a:rPr lang="en-US" sz="2400" dirty="0" smtClean="0"/>
+              <a:t>,</a:t>
+            </a:r>
+            <a:r>
+              <a:rPr lang="ru-RU" sz="2400" dirty="0" smtClean="0"/>
+              <a:t>снизу</a:t>
+            </a:r>
+            <a:r>
+              <a:rPr lang="en-US" sz="2400" dirty="0" smtClean="0"/>
+              <a:t>"</a:t>
+            </a:r>
+            <a:endParaRPr lang="ru-RU" sz="2400" dirty="0" smtClean="0"/>
+          </a:p>
+          <a:p>
+            <a:pPr marL="342900" indent="-342900">
+              <a:buFont typeface="Arial" panose="020B0604020202020204" pitchFamily="34" charset="0"/>
+              <a:buChar char="•"/>
+            </a:pPr>
+            <a:r>
+              <a:rPr lang="en-US" sz="2400" dirty="0" smtClean="0"/>
+              <a:t>Margin="</a:t>
+            </a:r>
+            <a:r>
+              <a:rPr lang="ru-RU" sz="2400" dirty="0" smtClean="0"/>
+              <a:t>слева и справа</a:t>
+            </a:r>
+            <a:r>
+              <a:rPr lang="en-US" sz="2400" dirty="0" smtClean="0"/>
+              <a:t>,</a:t>
+            </a:r>
+            <a:r>
+              <a:rPr lang="ru-RU" sz="2400" dirty="0" smtClean="0"/>
+              <a:t>сверху и снизу</a:t>
+            </a:r>
+            <a:r>
+              <a:rPr lang="en-US" sz="2400" dirty="0" smtClean="0"/>
+              <a:t>«</a:t>
+            </a:r>
+            <a:endParaRPr lang="ru-RU" sz="2400" dirty="0" smtClean="0"/>
+          </a:p>
+          <a:p>
+            <a:pPr marL="342900" indent="-342900">
+              <a:buFont typeface="Arial" panose="020B0604020202020204" pitchFamily="34" charset="0"/>
+              <a:buChar char="•"/>
+            </a:pPr>
+            <a:r>
+              <a:rPr lang="en-US" sz="2400" dirty="0"/>
+              <a:t>Margin</a:t>
+            </a:r>
+            <a:r>
+              <a:rPr lang="en-US" sz="2400" dirty="0" smtClean="0"/>
+              <a:t>="</a:t>
+            </a:r>
+            <a:r>
+              <a:rPr lang="ru-RU" sz="2400" dirty="0" smtClean="0"/>
+              <a:t>одинаковый отсуп со всех сторон</a:t>
+            </a:r>
+            <a:r>
+              <a:rPr lang="en-US" sz="2400" dirty="0" smtClean="0"/>
+              <a:t>"</a:t>
+            </a:r>
+            <a:endParaRPr lang="en-US" sz="2400" dirty="0"/>
+          </a:p>
+          <a:p>
+            <a:pPr algn="ctr"/>
+            <a:endParaRPr lang="en-US" sz="2400" dirty="0" smtClean="0"/>
+          </a:p>
+        </p:txBody>
+      </p:sp>
+    </p:spTree>
+    <p:extLst>
+      <p:ext uri="{BB962C8B-B14F-4D97-AF65-F5344CB8AC3E}">
+        <p14:creationId xmlns:p14="http://schemas.microsoft.com/office/powerpoint/2010/main" val="1425892575"/>
+      </p:ext>
+    </p:extLst>
+  </p:cSld>
+  <p:clrMapOvr>
+    <a:masterClrMapping/>
+  </p:clrMapOvr>
+</p:sld>
+</file>
+
+<file path=ppt/slides/slide2.xml><?xml version="1.0" encoding="utf-8"?>
+<p:sld xmlns:a="http://schemas.openxmlformats.org/drawingml/2006/main" xmlns:r="http://schemas.openxmlformats.org/officeDocument/2006/relationships" xmlns:p="http://schemas.openxmlformats.org/presentationml/2006/main">
+  <p:cSld>
+    <p:spTree>
+      <p:nvGrpSpPr>
+        <p:cNvPr id="1" name=""/>
+        <p:cNvGrpSpPr/>
+        <p:nvPr/>
+      </p:nvGrpSpPr>
+      <p:grpSpPr>
+        <a:xfrm>
+          <a:off x="0" y="0"/>
+          <a:ext cx="0" cy="0"/>
+          <a:chOff x="0" y="0"/>
+          <a:chExt cx="0" cy="0"/>
+        </a:xfrm>
+      </p:grpSpPr>
+      <p:sp>
+        <p:nvSpPr>
+          <p:cNvPr id="2" name="Title 1"/>
+          <p:cNvSpPr>
+            <a:spLocks noGrp="1"/>
+          </p:cNvSpPr>
+          <p:nvPr>
+            <p:ph type="title"/>
+          </p:nvPr>
+        </p:nvSpPr>
+        <p:spPr/>
+        <p:txBody>
+          <a:bodyPr/>
+          <a:lstStyle/>
+          <a:p>
+            <a:r>
+              <a:rPr lang="ru-RU" dirty="0" smtClean="0"/>
+              <a:t>Литература</a:t>
+            </a:r>
+            <a:endParaRPr lang="en-US" dirty="0"/>
+          </a:p>
+        </p:txBody>
+      </p:sp>
+      <p:sp>
+        <p:nvSpPr>
+          <p:cNvPr id="3" name="Content Placeholder 2"/>
+          <p:cNvSpPr>
+            <a:spLocks noGrp="1"/>
+          </p:cNvSpPr>
+          <p:nvPr>
+            <p:ph idx="1"/>
+          </p:nvPr>
+        </p:nvSpPr>
+        <p:spPr/>
+        <p:txBody>
+          <a:bodyPr/>
+          <a:lstStyle/>
+          <a:p>
+            <a:r>
+              <a:rPr lang="en-US" dirty="0" smtClean="0"/>
+              <a:t>Pro WPF in C# 2010, Mathew McDonald, </a:t>
+            </a:r>
+            <a:r>
+              <a:rPr lang="en-US" dirty="0" err="1" smtClean="0"/>
+              <a:t>Apress</a:t>
+            </a:r>
+            <a:r>
+              <a:rPr lang="en-US" dirty="0" smtClean="0"/>
+              <a:t>; ISBN </a:t>
+            </a:r>
+            <a:r>
+              <a:rPr lang="en-US" dirty="0"/>
+              <a:t>978-1-4302-7205-2</a:t>
+            </a:r>
+          </a:p>
+        </p:txBody>
+      </p:sp>
+    </p:spTree>
+    <p:extLst>
+      <p:ext uri="{BB962C8B-B14F-4D97-AF65-F5344CB8AC3E}">
+        <p14:creationId xmlns:p14="http://schemas.microsoft.com/office/powerpoint/2010/main" val="3525476021"/>
+      </p:ext>
+    </p:extLst>
+  </p:cSld>
+  <p:clrMapOvr>
+    <a:masterClrMapping/>
+  </p:clrMapOvr>
+  <p:timing>
+    <p:tnLst>
+      <p:par>
+        <p:cTn id="1" dur="indefinite" restart="never" nodeType="tmRoot"/>
+      </p:par>
+    </p:tnLst>
+  </p:timing>
+</p:sld>
+</file>
+
+<file path=ppt/slides/slide20.xml><?xml version="1.0" encoding="utf-8"?>
+<p:sld xmlns:a="http://schemas.openxmlformats.org/drawingml/2006/main" xmlns:r="http://schemas.openxmlformats.org/officeDocument/2006/relationships" xmlns:p="http://schemas.openxmlformats.org/presentationml/2006/main">
+  <p:cSld>
+    <p:spTree>
+      <p:nvGrpSpPr>
+        <p:cNvPr id="1" name=""/>
+        <p:cNvGrpSpPr/>
+        <p:nvPr/>
+      </p:nvGrpSpPr>
+      <p:grpSpPr>
+        <a:xfrm>
+          <a:off x="0" y="0"/>
+          <a:ext cx="0" cy="0"/>
+          <a:chOff x="0" y="0"/>
+          <a:chExt cx="0" cy="0"/>
+        </a:xfrm>
+      </p:grpSpPr>
+      <p:sp>
+        <p:nvSpPr>
+          <p:cNvPr id="2" name="Title 1"/>
+          <p:cNvSpPr>
+            <a:spLocks noGrp="1"/>
+          </p:cNvSpPr>
+          <p:nvPr>
+            <p:ph type="title"/>
+          </p:nvPr>
+        </p:nvSpPr>
+        <p:spPr/>
+        <p:txBody>
           <a:bodyPr/>
           <a:lstStyle/>
           <a:p>
@@ -5034,14 +5380,14 @@
             <p:ph idx="1"/>
             <p:extLst>
               <p:ext uri="{D42A27DB-BD31-4B8C-83A1-F6EECF244321}">
-                <p14:modId xmlns:p14="http://schemas.microsoft.com/office/powerpoint/2010/main" val="1589327572"/>
+                <p14:modId xmlns:p14="http://schemas.microsoft.com/office/powerpoint/2010/main" val="599122477"/>
               </p:ext>
             </p:extLst>
           </p:nvPr>
         </p:nvGraphicFramePr>
         <p:xfrm>
           <a:off x="457200" y="1600200"/>
-          <a:ext cx="8229600" cy="4241800"/>
+          <a:ext cx="8229600" cy="4485640"/>
         </p:xfrm>
         <a:graphic>
           <a:graphicData uri="http://schemas.openxmlformats.org/drawingml/2006/table">
@@ -5134,28 +5480,20 @@
                     <a:lstStyle/>
                     <a:p>
                       <a:r>
-                        <a:rPr lang="en-US" sz="1600" b="0" dirty="0" smtClean="0">
-                          <a:solidFill>
-                            <a:srgbClr val="002060"/>
-                          </a:solidFill>
-                        </a:rPr>
-                        <a:t>Places elements in a horizontal or vertical stack. This layout container is</a:t>
-                      </a:r>
-                      <a:r>
                         <a:rPr lang="ru-RU" sz="1600" b="0" dirty="0" smtClean="0">
                           <a:solidFill>
                             <a:srgbClr val="002060"/>
                           </a:solidFill>
                         </a:rPr>
-                        <a:t> </a:t>
+                        <a:t>Размещает элементы по горизонтали или по вертикали.</a:t>
                       </a:r>
                       <a:r>
-                        <a:rPr lang="en-US" sz="1600" b="0" dirty="0" smtClean="0">
+                        <a:rPr lang="ru-RU" sz="1600" b="0" baseline="0" dirty="0" smtClean="0">
                           <a:solidFill>
                             <a:srgbClr val="002060"/>
                           </a:solidFill>
                         </a:rPr>
-                        <a:t>typically used for small sections of a larger, more complex window.</a:t>
+                        <a:t> Этот контейнер обычно используется для отдельных частей более сложного окна.</a:t>
                       </a:r>
                       <a:endParaRPr lang="en-US" sz="1600" b="0" dirty="0">
                         <a:solidFill>
@@ -5293,94 +5631,22 @@
                     <a:lstStyle/>
                     <a:p>
                       <a:r>
-                        <a:rPr lang="en-US" sz="1600" b="0" dirty="0" smtClean="0">
-                          <a:solidFill>
-                            <a:srgbClr val="002060"/>
-                          </a:solidFill>
-                        </a:rPr>
-                        <a:t>Places elements in a series of wrapped lines. In horizontal orientation, the</a:t>
-                      </a:r>
-                      <a:r>
                         <a:rPr lang="ru-RU" sz="1600" b="0" dirty="0" smtClean="0">
                           <a:solidFill>
                             <a:srgbClr val="002060"/>
                           </a:solidFill>
                         </a:rPr>
-                        <a:t> </a:t>
+                        <a:t>Размещает элементы построчно, перенося их по мере необходимости. При </a:t>
                       </a:r>
                       <a:r>
-                        <a:rPr lang="en-US" sz="1600" b="0" dirty="0" err="1" smtClean="0">
+                        <a:rPr lang="ru-RU" sz="1600" b="0" baseline="0" dirty="0" smtClean="0">
                           <a:solidFill>
                             <a:srgbClr val="002060"/>
                           </a:solidFill>
                         </a:rPr>
-                        <a:t>WrapPanel</a:t>
+                        <a:t>горизонтальной ориентации элементы располагются слева направо с переносом на следующие строки. При вертикальной ориентации элементы располагаются сверху вниз формируя дополнительные колонки для размещения оставшихся элементов.</a:t>
                       </a:r>
-                      <a:r>
-                        <a:rPr lang="en-US" sz="1600" b="0" dirty="0" smtClean="0">
-                          <a:solidFill>
-                            <a:srgbClr val="002060"/>
-                          </a:solidFill>
-                        </a:rPr>
-                        <a:t> lays items out in a row from left to right and then onto subsequent</a:t>
-                      </a:r>
-                      <a:r>
-                        <a:rPr lang="ru-RU" sz="1600" b="0" dirty="0" smtClean="0">
-                          <a:solidFill>
-                            <a:srgbClr val="002060"/>
-                          </a:solidFill>
-                        </a:rPr>
-                        <a:t> </a:t>
-                      </a:r>
-                      <a:r>
-                        <a:rPr lang="en-US" sz="1600" b="0" dirty="0" smtClean="0">
-                          <a:solidFill>
-                            <a:srgbClr val="002060"/>
-                          </a:solidFill>
-                        </a:rPr>
-                        <a:t>lines. In vertical orientation, the</a:t>
-                      </a:r>
-                      <a:r>
-                        <a:rPr lang="ru-RU" sz="1600" b="0" dirty="0" smtClean="0">
-                          <a:solidFill>
-                            <a:srgbClr val="002060"/>
-                          </a:solidFill>
-                        </a:rPr>
-                        <a:t> </a:t>
-                      </a:r>
-                      <a:r>
-                        <a:rPr lang="en-US" sz="1600" b="0" dirty="0" err="1" smtClean="0">
-                          <a:solidFill>
-                            <a:srgbClr val="002060"/>
-                          </a:solidFill>
-                        </a:rPr>
-                        <a:t>WrapPanel</a:t>
-                      </a:r>
-                      <a:r>
-                        <a:rPr lang="en-US" sz="1600" b="0" dirty="0" smtClean="0">
-                          <a:solidFill>
-                            <a:srgbClr val="002060"/>
-                          </a:solidFill>
-                        </a:rPr>
-                        <a:t> lays out items in a top-to-bottom</a:t>
-                      </a:r>
-                      <a:r>
-                        <a:rPr lang="ru-RU" sz="1600" b="0" dirty="0" smtClean="0">
-                          <a:solidFill>
-                            <a:srgbClr val="002060"/>
-                          </a:solidFill>
-                        </a:rPr>
-                        <a:t> </a:t>
-                      </a:r>
-                      <a:r>
-                        <a:rPr lang="en-US" sz="1600" b="0" dirty="0" smtClean="0">
-                          <a:solidFill>
-                            <a:srgbClr val="002060"/>
-                          </a:solidFill>
-                        </a:rPr>
-                        <a:t>column and then uses additional columns to fit the remaining items</a:t>
-                      </a:r>
-                      <a:endParaRPr lang="en-US" sz="1600" b="0" dirty="0">
+                      <a:endParaRPr lang="ru-RU" sz="1600" b="0" dirty="0" smtClean="0">
                         <a:solidFill>
                           <a:srgbClr val="002060"/>
                         </a:solidFill>
@@ -5509,12 +5775,12 @@
                     <a:lstStyle/>
                     <a:p>
                       <a:r>
-                        <a:rPr lang="en-US" sz="1600" b="0" dirty="0" smtClean="0">
+                        <a:rPr lang="ru-RU" sz="1600" b="0" dirty="0" smtClean="0">
                           <a:solidFill>
                             <a:srgbClr val="002060"/>
                           </a:solidFill>
                         </a:rPr>
-                        <a:t>Aligns elements against an entire edge of the container.</a:t>
+                        <a:t>Выравнивает элементы границе контейнера.</a:t>
                       </a:r>
                       <a:endParaRPr lang="en-US" sz="1600" b="0" dirty="0">
                         <a:solidFill>
@@ -5662,28 +5928,20 @@
                     <a:lstStyle/>
                     <a:p>
                       <a:r>
-                        <a:rPr lang="en-US" sz="1600" b="0" dirty="0" smtClean="0">
-                          <a:solidFill>
-                            <a:srgbClr val="002060"/>
-                          </a:solidFill>
-                        </a:rPr>
-                        <a:t>Arranges elements in rows and columns according to an invisible table. This is</a:t>
-                      </a:r>
-                      <a:r>
                         <a:rPr lang="ru-RU" sz="1600" b="0" dirty="0" smtClean="0">
                           <a:solidFill>
                             <a:srgbClr val="002060"/>
                           </a:solidFill>
                         </a:rPr>
-                        <a:t> </a:t>
+                        <a:t>Размещает элементы</a:t>
                       </a:r>
                       <a:r>
-                        <a:rPr lang="en-US" sz="1600" b="0" dirty="0" smtClean="0">
+                        <a:rPr lang="ru-RU" sz="1600" b="0" baseline="0" dirty="0" smtClean="0">
                           <a:solidFill>
                             <a:srgbClr val="002060"/>
                           </a:solidFill>
                         </a:rPr>
-                        <a:t>one of the most flexible and commonly used layout containers.</a:t>
+                        <a:t> в строках и колонках невидимой таблицы. Это один из самых гибких и широко используемых контейнеров.</a:t>
                       </a:r>
                       <a:endParaRPr lang="en-US" sz="1600" b="0" dirty="0">
                         <a:solidFill>
@@ -5831,28 +6089,36 @@
                     <a:lstStyle/>
                     <a:p>
                       <a:r>
-                        <a:rPr lang="en-US" sz="1600" b="0" dirty="0" smtClean="0">
-                          <a:solidFill>
-                            <a:srgbClr val="002060"/>
-                          </a:solidFill>
-                        </a:rPr>
-                        <a:t>Places elements in an invisible table but forces all cells to have the same size.</a:t>
-                      </a:r>
-                      <a:r>
                         <a:rPr lang="ru-RU" sz="1600" b="0" dirty="0" smtClean="0">
                           <a:solidFill>
                             <a:srgbClr val="002060"/>
                           </a:solidFill>
                         </a:rPr>
-                        <a:t> </a:t>
+                        <a:t>Размещает элементы</a:t>
                       </a:r>
                       <a:r>
-                        <a:rPr lang="en-US" sz="1600" b="0" dirty="0" smtClean="0">
+                        <a:rPr lang="ru-RU" sz="1600" b="0" baseline="0" dirty="0" smtClean="0">
                           <a:solidFill>
                             <a:srgbClr val="002060"/>
                           </a:solidFill>
                         </a:rPr>
-                        <a:t>This layout container is used infrequently.</a:t>
+                        <a:t> в строках и колонках невидимой таблицы. В отличие от </a:t>
+                      </a:r>
+                      <a:r>
+                        <a:rPr lang="en-US" sz="1600" b="0" baseline="0" dirty="0" smtClean="0">
+                          <a:solidFill>
+                            <a:srgbClr val="002060"/>
+                          </a:solidFill>
+                        </a:rPr>
+                        <a:t>Grid </a:t>
+                      </a:r>
+                      <a:r>
+                        <a:rPr lang="ru-RU" sz="1600" b="0" baseline="0" dirty="0" smtClean="0">
+                          <a:solidFill>
+                            <a:srgbClr val="002060"/>
+                          </a:solidFill>
+                        </a:rPr>
+                        <a:t>все ячейки имеют одинаковый размер.</a:t>
                       </a:r>
                       <a:endParaRPr lang="en-US" sz="1600" b="0" dirty="0">
                         <a:solidFill>
@@ -6000,60 +6266,84 @@
                     <a:lstStyle/>
                     <a:p>
                       <a:r>
-                        <a:rPr lang="en-US" sz="1600" b="0" dirty="0" smtClean="0">
-                          <a:solidFill>
-                            <a:srgbClr val="002060"/>
-                          </a:solidFill>
-                        </a:rPr>
-                        <a:t>Allows elements to be positioned absolutely using fixed coordinates. This</a:t>
-                      </a:r>
-                      <a:r>
                         <a:rPr lang="ru-RU" sz="1600" b="0" dirty="0" smtClean="0">
                           <a:solidFill>
                             <a:srgbClr val="002060"/>
                           </a:solidFill>
                         </a:rPr>
-                        <a:t> </a:t>
+                        <a:t>Позволяет размещать элементы</a:t>
                       </a:r>
                       <a:r>
-                        <a:rPr lang="en-US" sz="1600" b="0" dirty="0" smtClean="0">
+                        <a:rPr lang="ru-RU" sz="1600" b="0" baseline="0" dirty="0" smtClean="0">
                           <a:solidFill>
                             <a:srgbClr val="002060"/>
                           </a:solidFill>
                         </a:rPr>
-                        <a:t>layout container is the most similar to traditional Windows Forms, but it</a:t>
+                        <a:t> используя абсолютные координаты. Эта схема размещения очень похожа на подход принятый в </a:t>
                       </a:r>
                       <a:r>
-                        <a:rPr lang="ru-RU" sz="1600" b="0" dirty="0" smtClean="0">
+                        <a:rPr lang="en-US" sz="1600" b="0" baseline="0" dirty="0" smtClean="0">
                           <a:solidFill>
                             <a:srgbClr val="002060"/>
                           </a:solidFill>
                         </a:rPr>
-                        <a:t> </a:t>
+                        <a:t>Windows Forms.</a:t>
                       </a:r>
                       <a:r>
-                        <a:rPr lang="en-US" sz="1600" b="0" dirty="0" smtClean="0">
+                        <a:rPr lang="ru-RU" sz="1600" b="0" baseline="0" dirty="0" smtClean="0">
                           <a:solidFill>
                             <a:srgbClr val="002060"/>
                           </a:solidFill>
                         </a:rPr>
-                        <a:t>doesn’t provide anchoring or docking features. As a result, it’s an unsuitable</a:t>
+                        <a:t> Однако</a:t>
                       </a:r>
                       <a:r>
-                        <a:rPr lang="ru-RU" sz="1600" b="0" dirty="0" smtClean="0">
+                        <a:rPr lang="en-US" sz="1600" b="0" baseline="0" dirty="0" smtClean="0">
                           <a:solidFill>
                             <a:srgbClr val="002060"/>
                           </a:solidFill>
                         </a:rPr>
-                        <a:t> </a:t>
+                        <a:t> Canvas </a:t>
                       </a:r>
                       <a:r>
-                        <a:rPr lang="en-US" sz="1600" b="0" dirty="0" smtClean="0">
+                        <a:rPr lang="ru-RU" sz="1600" b="0" baseline="0" dirty="0" smtClean="0">
                           <a:solidFill>
                             <a:srgbClr val="002060"/>
                           </a:solidFill>
                         </a:rPr>
-                        <a:t>choice for a resizable window unless you’re willing to do a fair bit of work.</a:t>
+                        <a:t>не поддерживает </a:t>
+                      </a:r>
+                      <a:r>
+                        <a:rPr lang="en-US" sz="1600" b="0" baseline="0" dirty="0" smtClean="0">
+                          <a:solidFill>
+                            <a:srgbClr val="002060"/>
+                          </a:solidFill>
+                        </a:rPr>
+                        <a:t>anchor </a:t>
+                      </a:r>
+                      <a:r>
+                        <a:rPr lang="ru-RU" sz="1600" b="0" baseline="0" dirty="0" smtClean="0">
+                          <a:solidFill>
+                            <a:srgbClr val="002060"/>
+                          </a:solidFill>
+                        </a:rPr>
+                        <a:t>и </a:t>
+                      </a:r>
+                      <a:r>
+                        <a:rPr lang="en-US" sz="1600" b="0" baseline="0" dirty="0" smtClean="0">
+                          <a:solidFill>
+                            <a:srgbClr val="002060"/>
+                          </a:solidFill>
+                        </a:rPr>
+                        <a:t>dock </a:t>
+                      </a:r>
+                      <a:r>
+                        <a:rPr lang="ru-RU" sz="1600" b="0" baseline="0" dirty="0" smtClean="0">
+                          <a:solidFill>
+                            <a:srgbClr val="002060"/>
+                          </a:solidFill>
+                        </a:rPr>
+                        <a:t>и поэтому не подходит для создания окон с изменяемым размером.</a:t>
                       </a:r>
                       <a:endParaRPr lang="en-US" sz="1600" b="0" dirty="0">
                         <a:solidFill>
@@ -6127,476 +6417,6 @@
 </p:sld>
 </file>
 
-<file path=ppt/slides/slide2.xml><?xml version="1.0" encoding="utf-8"?>
-<p:sld xmlns:a="http://schemas.openxmlformats.org/drawingml/2006/main" xmlns:r="http://schemas.openxmlformats.org/officeDocument/2006/relationships" xmlns:p="http://schemas.openxmlformats.org/presentationml/2006/main">
-  <p:cSld>
-    <p:spTree>
-      <p:nvGrpSpPr>
-        <p:cNvPr id="1" name=""/>
-        <p:cNvGrpSpPr/>
-        <p:nvPr/>
-      </p:nvGrpSpPr>
-      <p:grpSpPr>
-        <a:xfrm>
-          <a:off x="0" y="0"/>
-          <a:ext cx="0" cy="0"/>
-          <a:chOff x="0" y="0"/>
-          <a:chExt cx="0" cy="0"/>
-        </a:xfrm>
-      </p:grpSpPr>
-      <p:sp>
-        <p:nvSpPr>
-          <p:cNvPr id="2" name="Title 1"/>
-          <p:cNvSpPr>
-            <a:spLocks noGrp="1"/>
-          </p:cNvSpPr>
-          <p:nvPr>
-            <p:ph type="title"/>
-          </p:nvPr>
-        </p:nvSpPr>
-        <p:spPr/>
-        <p:txBody>
-          <a:bodyPr/>
-          <a:lstStyle/>
-          <a:p>
-            <a:r>
-              <a:rPr lang="ru-RU" dirty="0" smtClean="0"/>
-              <a:t>Литература</a:t>
-            </a:r>
-            <a:endParaRPr lang="en-US" dirty="0"/>
-          </a:p>
-        </p:txBody>
-      </p:sp>
-      <p:sp>
-        <p:nvSpPr>
-          <p:cNvPr id="3" name="Content Placeholder 2"/>
-          <p:cNvSpPr>
-            <a:spLocks noGrp="1"/>
-          </p:cNvSpPr>
-          <p:nvPr>
-            <p:ph idx="1"/>
-          </p:nvPr>
-        </p:nvSpPr>
-        <p:spPr/>
-        <p:txBody>
-          <a:bodyPr/>
-          <a:lstStyle/>
-          <a:p>
-            <a:r>
-              <a:rPr lang="en-US" dirty="0" smtClean="0"/>
-              <a:t>Pro WPF in C# 2010, Mathew McDonald, </a:t>
-            </a:r>
-            <a:r>
-              <a:rPr lang="en-US" dirty="0" err="1" smtClean="0"/>
-              <a:t>Apress</a:t>
-            </a:r>
-            <a:r>
-              <a:rPr lang="en-US" dirty="0" smtClean="0"/>
-              <a:t>; ISBN </a:t>
-            </a:r>
-            <a:r>
-              <a:rPr lang="en-US" dirty="0"/>
-              <a:t>978-1-4302-7205-2</a:t>
-            </a:r>
-          </a:p>
-        </p:txBody>
-      </p:sp>
-    </p:spTree>
-    <p:extLst>
-      <p:ext uri="{BB962C8B-B14F-4D97-AF65-F5344CB8AC3E}">
-        <p14:creationId xmlns:p14="http://schemas.microsoft.com/office/powerpoint/2010/main" val="3525476021"/>
-      </p:ext>
-    </p:extLst>
-  </p:cSld>
-  <p:clrMapOvr>
-    <a:masterClrMapping/>
-  </p:clrMapOvr>
-  <p:timing>
-    <p:tnLst>
-      <p:par>
-        <p:cTn id="1" dur="indefinite" restart="never" nodeType="tmRoot"/>
-      </p:par>
-    </p:tnLst>
-  </p:timing>
-</p:sld>
-</file>
-
-<file path=ppt/slides/slide20.xml><?xml version="1.0" encoding="utf-8"?>
-<p:sld xmlns:a="http://schemas.openxmlformats.org/drawingml/2006/main" xmlns:r="http://schemas.openxmlformats.org/officeDocument/2006/relationships" xmlns:p="http://schemas.openxmlformats.org/presentationml/2006/main">
-  <p:cSld>
-    <p:spTree>
-      <p:nvGrpSpPr>
-        <p:cNvPr id="1" name=""/>
-        <p:cNvGrpSpPr/>
-        <p:nvPr/>
-      </p:nvGrpSpPr>
-      <p:grpSpPr>
-        <a:xfrm>
-          <a:off x="0" y="0"/>
-          <a:ext cx="0" cy="0"/>
-          <a:chOff x="0" y="0"/>
-          <a:chExt cx="0" cy="0"/>
-        </a:xfrm>
-      </p:grpSpPr>
-      <p:sp>
-        <p:nvSpPr>
-          <p:cNvPr id="2" name="Title 1"/>
-          <p:cNvSpPr>
-            <a:spLocks noGrp="1"/>
-          </p:cNvSpPr>
-          <p:nvPr>
-            <p:ph type="title"/>
-          </p:nvPr>
-        </p:nvSpPr>
-        <p:spPr/>
-        <p:txBody>
-          <a:bodyPr/>
-          <a:lstStyle/>
-          <a:p>
-            <a:r>
-              <a:rPr lang="en-US" dirty="0"/>
-              <a:t>Dependency Properties</a:t>
-            </a:r>
-          </a:p>
-        </p:txBody>
-      </p:sp>
-      <p:sp>
-        <p:nvSpPr>
-          <p:cNvPr id="3" name="Content Placeholder 2"/>
-          <p:cNvSpPr>
-            <a:spLocks noGrp="1"/>
-          </p:cNvSpPr>
-          <p:nvPr>
-            <p:ph idx="1"/>
-          </p:nvPr>
-        </p:nvSpPr>
-        <p:spPr/>
-        <p:txBody>
-          <a:bodyPr>
-            <a:normAutofit fontScale="55000" lnSpcReduction="20000"/>
-          </a:bodyPr>
-          <a:lstStyle/>
-          <a:p>
-            <a:r>
-              <a:rPr lang="ru-RU" dirty="0" smtClean="0"/>
-              <a:t>Объявление</a:t>
-            </a:r>
-          </a:p>
-          <a:p>
-            <a:pPr lvl="1"/>
-            <a:r>
-              <a:rPr lang="en-US" dirty="0"/>
-              <a:t>public class </a:t>
-            </a:r>
-            <a:r>
-              <a:rPr lang="en-US" dirty="0" err="1"/>
-              <a:t>FrameworkElement</a:t>
-            </a:r>
-            <a:r>
-              <a:rPr lang="en-US" dirty="0"/>
-              <a:t>: </a:t>
-            </a:r>
-            <a:r>
-              <a:rPr lang="en-US" dirty="0" err="1"/>
-              <a:t>UIElement</a:t>
-            </a:r>
-            <a:r>
-              <a:rPr lang="en-US" dirty="0"/>
-              <a:t>, ...</a:t>
-            </a:r>
-            <a:r>
-              <a:rPr lang="ru-RU" dirty="0" smtClean="0"/>
-              <a:t/>
-            </a:r>
-            <a:br>
-              <a:rPr lang="ru-RU" dirty="0" smtClean="0"/>
-            </a:br>
-            <a:r>
-              <a:rPr lang="en-US" dirty="0" smtClean="0"/>
-              <a:t>{</a:t>
-            </a:r>
-            <a:br>
-              <a:rPr lang="en-US" dirty="0" smtClean="0"/>
-            </a:br>
-            <a:r>
-              <a:rPr lang="en-US" dirty="0" smtClean="0"/>
-              <a:t>public </a:t>
-            </a:r>
-            <a:r>
-              <a:rPr lang="en-US" dirty="0"/>
-              <a:t>static </a:t>
-            </a:r>
-            <a:r>
-              <a:rPr lang="en-US" dirty="0" err="1"/>
-              <a:t>readonly</a:t>
-            </a:r>
-            <a:r>
-              <a:rPr lang="en-US" dirty="0"/>
-              <a:t> </a:t>
-            </a:r>
-            <a:r>
-              <a:rPr lang="en-US" dirty="0" err="1">
-                <a:solidFill>
-                  <a:srgbClr val="FFFF00"/>
-                </a:solidFill>
-              </a:rPr>
-              <a:t>DependencyProperty</a:t>
-            </a:r>
-            <a:r>
-              <a:rPr lang="en-US" dirty="0"/>
-              <a:t> </a:t>
-            </a:r>
-            <a:r>
-              <a:rPr lang="en-US" dirty="0" err="1"/>
-              <a:t>Margin</a:t>
-            </a:r>
-            <a:r>
-              <a:rPr lang="en-US" dirty="0" err="1">
-                <a:solidFill>
-                  <a:srgbClr val="FFFF00"/>
-                </a:solidFill>
-              </a:rPr>
-              <a:t>Property</a:t>
-            </a:r>
-            <a:r>
-              <a:rPr lang="en-US" dirty="0" smtClean="0"/>
-              <a:t>;</a:t>
-            </a:r>
-            <a:br>
-              <a:rPr lang="en-US" dirty="0" smtClean="0"/>
-            </a:br>
-            <a:r>
-              <a:rPr lang="en-US" dirty="0" smtClean="0"/>
-              <a:t>}</a:t>
-            </a:r>
-            <a:endParaRPr lang="ru-RU" dirty="0" smtClean="0"/>
-          </a:p>
-          <a:p>
-            <a:r>
-              <a:rPr lang="ru-RU" dirty="0" smtClean="0"/>
-              <a:t>Регистрация</a:t>
-            </a:r>
-          </a:p>
-          <a:p>
-            <a:pPr lvl="1"/>
-            <a:r>
-              <a:rPr lang="en-US" dirty="0" err="1" smtClean="0"/>
-              <a:t>FrameworkPropertyMetadata</a:t>
-            </a:r>
-            <a:endParaRPr lang="ru-RU" dirty="0" smtClean="0"/>
-          </a:p>
-          <a:p>
-            <a:pPr lvl="1"/>
-            <a:r>
-              <a:rPr lang="en-US" dirty="0" err="1" smtClean="0"/>
-              <a:t>DependencyProperty.Register</a:t>
-            </a:r>
-            <a:endParaRPr lang="ru-RU" dirty="0" smtClean="0"/>
-          </a:p>
-          <a:p>
-            <a:r>
-              <a:rPr lang="ru-RU" dirty="0" smtClean="0"/>
-              <a:t>Объявление</a:t>
-            </a:r>
-          </a:p>
-          <a:p>
-            <a:pPr lvl="1"/>
-            <a:r>
-              <a:rPr lang="en-US" dirty="0"/>
-              <a:t>public Thickness </a:t>
-            </a:r>
-            <a:r>
-              <a:rPr lang="en-US" dirty="0" smtClean="0"/>
-              <a:t>Margin</a:t>
-            </a:r>
-            <a:r>
-              <a:rPr lang="ru-RU" dirty="0" smtClean="0"/>
-              <a:t/>
-            </a:r>
-            <a:br>
-              <a:rPr lang="ru-RU" dirty="0" smtClean="0"/>
-            </a:br>
-            <a:r>
-              <a:rPr lang="en-US" dirty="0" smtClean="0"/>
-              <a:t>{</a:t>
-            </a:r>
-            <a:r>
-              <a:rPr lang="ru-RU" dirty="0" smtClean="0"/>
-              <a:t/>
-            </a:r>
-            <a:br>
-              <a:rPr lang="ru-RU" dirty="0" smtClean="0"/>
-            </a:br>
-            <a:r>
-              <a:rPr lang="en-US" dirty="0" smtClean="0"/>
-              <a:t>set </a:t>
-            </a:r>
-            <a:r>
-              <a:rPr lang="en-US" dirty="0"/>
-              <a:t>{ </a:t>
-            </a:r>
-            <a:r>
-              <a:rPr lang="en-US" dirty="0" err="1"/>
-              <a:t>SetValue</a:t>
-            </a:r>
-            <a:r>
-              <a:rPr lang="en-US" dirty="0"/>
-              <a:t>(</a:t>
-            </a:r>
-            <a:r>
-              <a:rPr lang="en-US" dirty="0" err="1"/>
-              <a:t>MarginProperty</a:t>
-            </a:r>
-            <a:r>
-              <a:rPr lang="en-US" dirty="0"/>
-              <a:t>, value); </a:t>
-            </a:r>
-            <a:r>
-              <a:rPr lang="en-US" dirty="0" smtClean="0"/>
-              <a:t>}</a:t>
-            </a:r>
-            <a:r>
-              <a:rPr lang="ru-RU" dirty="0" smtClean="0"/>
-              <a:t/>
-            </a:r>
-            <a:br>
-              <a:rPr lang="ru-RU" dirty="0" smtClean="0"/>
-            </a:br>
-            <a:r>
-              <a:rPr lang="en-US" dirty="0" smtClean="0"/>
-              <a:t>get </a:t>
-            </a:r>
-            <a:r>
-              <a:rPr lang="en-US" dirty="0"/>
-              <a:t>{ return (Thickness)</a:t>
-            </a:r>
-            <a:r>
-              <a:rPr lang="en-US" dirty="0" err="1"/>
-              <a:t>GetValue</a:t>
-            </a:r>
-            <a:r>
-              <a:rPr lang="en-US" dirty="0"/>
-              <a:t>(</a:t>
-            </a:r>
-            <a:r>
-              <a:rPr lang="en-US" dirty="0" err="1"/>
-              <a:t>MarginProperty</a:t>
-            </a:r>
-            <a:r>
-              <a:rPr lang="en-US" dirty="0"/>
-              <a:t>); </a:t>
-            </a:r>
-            <a:r>
-              <a:rPr lang="en-US" dirty="0" smtClean="0"/>
-              <a:t>}</a:t>
-            </a:r>
-            <a:r>
-              <a:rPr lang="ru-RU" dirty="0" smtClean="0"/>
-              <a:t/>
-            </a:r>
-            <a:br>
-              <a:rPr lang="ru-RU" dirty="0" smtClean="0"/>
-            </a:br>
-            <a:r>
-              <a:rPr lang="en-US" dirty="0" smtClean="0"/>
-              <a:t>}</a:t>
-            </a:r>
-            <a:endParaRPr lang="ru-RU" dirty="0" smtClean="0"/>
-          </a:p>
-          <a:p>
-            <a:pPr lvl="1"/>
-            <a:r>
-              <a:rPr lang="ru-RU" dirty="0" smtClean="0">
-                <a:solidFill>
-                  <a:srgbClr val="FFFF00"/>
-                </a:solidFill>
-              </a:rPr>
-              <a:t>Только так! Ничего другого быть не должно!</a:t>
-            </a:r>
-            <a:r>
-              <a:rPr lang="ru-RU" dirty="0"/>
-              <a:t> </a:t>
-            </a:r>
-            <a:endParaRPr lang="ru-RU" dirty="0" smtClean="0"/>
-          </a:p>
-          <a:p>
-            <a:r>
-              <a:rPr lang="ru-RU" dirty="0" smtClean="0"/>
-              <a:t>Очистка</a:t>
-            </a:r>
-          </a:p>
-          <a:p>
-            <a:pPr lvl="1"/>
-            <a:r>
-              <a:rPr lang="en-US" dirty="0" err="1"/>
-              <a:t>myElement.ClearValue</a:t>
-            </a:r>
-            <a:r>
-              <a:rPr lang="en-US" dirty="0"/>
-              <a:t>(</a:t>
-            </a:r>
-            <a:r>
-              <a:rPr lang="en-US" dirty="0" err="1"/>
-              <a:t>FrameworkElement.MarginProperty</a:t>
-            </a:r>
-            <a:r>
-              <a:rPr lang="en-US" dirty="0" smtClean="0"/>
-              <a:t>);</a:t>
-            </a:r>
-            <a:endParaRPr lang="ru-RU" dirty="0" smtClean="0"/>
-          </a:p>
-          <a:p>
-            <a:r>
-              <a:rPr lang="ru-RU" dirty="0" smtClean="0">
-                <a:solidFill>
-                  <a:schemeClr val="bg1"/>
-                </a:solidFill>
-              </a:rPr>
-              <a:t>Достоинства</a:t>
-            </a:r>
-          </a:p>
-          <a:p>
-            <a:pPr lvl="1"/>
-            <a:r>
-              <a:rPr lang="ru-RU" dirty="0" smtClean="0">
-                <a:solidFill>
-                  <a:schemeClr val="bg1"/>
-                </a:solidFill>
-              </a:rPr>
-              <a:t>Тратят меньше памяти, если значение не было указано</a:t>
-            </a:r>
-          </a:p>
-          <a:p>
-            <a:pPr lvl="1"/>
-            <a:r>
-              <a:rPr lang="ru-RU" dirty="0" smtClean="0">
-                <a:solidFill>
-                  <a:schemeClr val="bg1"/>
-                </a:solidFill>
-              </a:rPr>
-              <a:t>Поддержка стилей</a:t>
-            </a:r>
-            <a:endParaRPr lang="en-US" dirty="0">
-              <a:solidFill>
-                <a:schemeClr val="bg1"/>
-              </a:solidFill>
-            </a:endParaRPr>
-          </a:p>
-        </p:txBody>
-      </p:sp>
-    </p:spTree>
-    <p:extLst>
-      <p:ext uri="{BB962C8B-B14F-4D97-AF65-F5344CB8AC3E}">
-        <p14:creationId xmlns:p14="http://schemas.microsoft.com/office/powerpoint/2010/main" val="205489790"/>
-      </p:ext>
-    </p:extLst>
-  </p:cSld>
-  <p:clrMapOvr>
-    <a:masterClrMapping/>
-  </p:clrMapOvr>
-</p:sld>
-</file>
-
 <file path=ppt/slides/slide21.xml><?xml version="1.0" encoding="utf-8"?>
 <p:sld xmlns:a="http://schemas.openxmlformats.org/drawingml/2006/main" xmlns:r="http://schemas.openxmlformats.org/officeDocument/2006/relationships" xmlns:p="http://schemas.openxmlformats.org/presentationml/2006/main">
   <p:cSld>
@@ -6630,6 +6450,382 @@
           <a:lstStyle/>
           <a:p>
             <a:r>
+              <a:rPr lang="en-US" dirty="0"/>
+              <a:t>Dependency Properties</a:t>
+            </a:r>
+          </a:p>
+        </p:txBody>
+      </p:sp>
+      <p:sp>
+        <p:nvSpPr>
+          <p:cNvPr id="3" name="Content Placeholder 2"/>
+          <p:cNvSpPr>
+            <a:spLocks noGrp="1"/>
+          </p:cNvSpPr>
+          <p:nvPr>
+            <p:ph idx="1"/>
+          </p:nvPr>
+        </p:nvSpPr>
+        <p:spPr/>
+        <p:txBody>
+          <a:bodyPr>
+            <a:normAutofit fontScale="55000" lnSpcReduction="20000"/>
+          </a:bodyPr>
+          <a:lstStyle/>
+          <a:p>
+            <a:r>
+              <a:rPr lang="ru-RU" dirty="0" smtClean="0"/>
+              <a:t>Объявление</a:t>
+            </a:r>
+          </a:p>
+          <a:p>
+            <a:pPr lvl="1"/>
+            <a:r>
+              <a:rPr lang="en-US" dirty="0"/>
+              <a:t>public class </a:t>
+            </a:r>
+            <a:r>
+              <a:rPr lang="en-US" dirty="0" err="1"/>
+              <a:t>FrameworkElement</a:t>
+            </a:r>
+            <a:r>
+              <a:rPr lang="en-US" dirty="0"/>
+              <a:t>: </a:t>
+            </a:r>
+            <a:r>
+              <a:rPr lang="en-US" dirty="0" err="1"/>
+              <a:t>UIElement</a:t>
+            </a:r>
+            <a:r>
+              <a:rPr lang="en-US" dirty="0"/>
+              <a:t>, ...</a:t>
+            </a:r>
+            <a:r>
+              <a:rPr lang="ru-RU" dirty="0" smtClean="0"/>
+              <a:t/>
+            </a:r>
+            <a:br>
+              <a:rPr lang="ru-RU" dirty="0" smtClean="0"/>
+            </a:br>
+            <a:r>
+              <a:rPr lang="en-US" dirty="0" smtClean="0"/>
+              <a:t>{</a:t>
+            </a:r>
+            <a:br>
+              <a:rPr lang="en-US" dirty="0" smtClean="0"/>
+            </a:br>
+            <a:r>
+              <a:rPr lang="en-US" dirty="0" smtClean="0"/>
+              <a:t>public </a:t>
+            </a:r>
+            <a:r>
+              <a:rPr lang="en-US" dirty="0"/>
+              <a:t>static </a:t>
+            </a:r>
+            <a:r>
+              <a:rPr lang="en-US" dirty="0" err="1"/>
+              <a:t>readonly</a:t>
+            </a:r>
+            <a:r>
+              <a:rPr lang="en-US" dirty="0"/>
+              <a:t> </a:t>
+            </a:r>
+            <a:r>
+              <a:rPr lang="en-US" dirty="0" err="1">
+                <a:solidFill>
+                  <a:srgbClr val="FFFF00"/>
+                </a:solidFill>
+              </a:rPr>
+              <a:t>DependencyProperty</a:t>
+            </a:r>
+            <a:r>
+              <a:rPr lang="en-US" dirty="0"/>
+              <a:t> </a:t>
+            </a:r>
+            <a:r>
+              <a:rPr lang="en-US" dirty="0" err="1"/>
+              <a:t>Margin</a:t>
+            </a:r>
+            <a:r>
+              <a:rPr lang="en-US" dirty="0" err="1">
+                <a:solidFill>
+                  <a:srgbClr val="FFFF00"/>
+                </a:solidFill>
+              </a:rPr>
+              <a:t>Property</a:t>
+            </a:r>
+            <a:r>
+              <a:rPr lang="en-US" dirty="0" smtClean="0"/>
+              <a:t>;</a:t>
+            </a:r>
+            <a:br>
+              <a:rPr lang="en-US" dirty="0" smtClean="0"/>
+            </a:br>
+            <a:r>
+              <a:rPr lang="en-US" dirty="0" smtClean="0"/>
+              <a:t>}</a:t>
+            </a:r>
+            <a:endParaRPr lang="ru-RU" dirty="0" smtClean="0"/>
+          </a:p>
+          <a:p>
+            <a:r>
+              <a:rPr lang="ru-RU" dirty="0" smtClean="0"/>
+              <a:t>Регистрация</a:t>
+            </a:r>
+          </a:p>
+          <a:p>
+            <a:pPr lvl="1"/>
+            <a:r>
+              <a:rPr lang="en-US" dirty="0" err="1" smtClean="0"/>
+              <a:t>FrameworkPropertyMetadata</a:t>
+            </a:r>
+            <a:endParaRPr lang="ru-RU" dirty="0" smtClean="0"/>
+          </a:p>
+          <a:p>
+            <a:pPr lvl="1"/>
+            <a:r>
+              <a:rPr lang="en-US" dirty="0" err="1" smtClean="0"/>
+              <a:t>DependencyProperty.Register</a:t>
+            </a:r>
+            <a:endParaRPr lang="ru-RU" dirty="0" smtClean="0"/>
+          </a:p>
+          <a:p>
+            <a:r>
+              <a:rPr lang="ru-RU" dirty="0" smtClean="0"/>
+              <a:t>Объявление</a:t>
+            </a:r>
+          </a:p>
+          <a:p>
+            <a:pPr lvl="1"/>
+            <a:r>
+              <a:rPr lang="en-US" dirty="0"/>
+              <a:t>public Thickness </a:t>
+            </a:r>
+            <a:r>
+              <a:rPr lang="en-US" dirty="0" smtClean="0"/>
+              <a:t>Margin</a:t>
+            </a:r>
+            <a:r>
+              <a:rPr lang="ru-RU" dirty="0" smtClean="0"/>
+              <a:t/>
+            </a:r>
+            <a:br>
+              <a:rPr lang="ru-RU" dirty="0" smtClean="0"/>
+            </a:br>
+            <a:r>
+              <a:rPr lang="en-US" dirty="0" smtClean="0"/>
+              <a:t>{</a:t>
+            </a:r>
+            <a:r>
+              <a:rPr lang="ru-RU" dirty="0" smtClean="0"/>
+              <a:t/>
+            </a:r>
+            <a:br>
+              <a:rPr lang="ru-RU" dirty="0" smtClean="0"/>
+            </a:br>
+            <a:r>
+              <a:rPr lang="en-US" dirty="0" smtClean="0"/>
+              <a:t>set </a:t>
+            </a:r>
+            <a:r>
+              <a:rPr lang="en-US" dirty="0"/>
+              <a:t>{ </a:t>
+            </a:r>
+            <a:r>
+              <a:rPr lang="en-US" dirty="0" err="1"/>
+              <a:t>SetValue</a:t>
+            </a:r>
+            <a:r>
+              <a:rPr lang="en-US" dirty="0"/>
+              <a:t>(</a:t>
+            </a:r>
+            <a:r>
+              <a:rPr lang="en-US" dirty="0" err="1"/>
+              <a:t>MarginProperty</a:t>
+            </a:r>
+            <a:r>
+              <a:rPr lang="en-US" dirty="0"/>
+              <a:t>, value); </a:t>
+            </a:r>
+            <a:r>
+              <a:rPr lang="en-US" dirty="0" smtClean="0"/>
+              <a:t>}</a:t>
+            </a:r>
+            <a:r>
+              <a:rPr lang="ru-RU" dirty="0" smtClean="0"/>
+              <a:t/>
+            </a:r>
+            <a:br>
+              <a:rPr lang="ru-RU" dirty="0" smtClean="0"/>
+            </a:br>
+            <a:r>
+              <a:rPr lang="en-US" dirty="0" smtClean="0"/>
+              <a:t>get </a:t>
+            </a:r>
+            <a:r>
+              <a:rPr lang="en-US" dirty="0"/>
+              <a:t>{ return (Thickness)</a:t>
+            </a:r>
+            <a:r>
+              <a:rPr lang="en-US" dirty="0" err="1"/>
+              <a:t>GetValue</a:t>
+            </a:r>
+            <a:r>
+              <a:rPr lang="en-US" dirty="0"/>
+              <a:t>(</a:t>
+            </a:r>
+            <a:r>
+              <a:rPr lang="en-US" dirty="0" err="1"/>
+              <a:t>MarginProperty</a:t>
+            </a:r>
+            <a:r>
+              <a:rPr lang="en-US" dirty="0"/>
+              <a:t>); </a:t>
+            </a:r>
+            <a:r>
+              <a:rPr lang="en-US" dirty="0" smtClean="0"/>
+              <a:t>}</a:t>
+            </a:r>
+            <a:r>
+              <a:rPr lang="ru-RU" dirty="0" smtClean="0"/>
+              <a:t/>
+            </a:r>
+            <a:br>
+              <a:rPr lang="ru-RU" dirty="0" smtClean="0"/>
+            </a:br>
+            <a:r>
+              <a:rPr lang="en-US" dirty="0" smtClean="0"/>
+              <a:t>}</a:t>
+            </a:r>
+            <a:endParaRPr lang="ru-RU" dirty="0" smtClean="0"/>
+          </a:p>
+          <a:p>
+            <a:pPr lvl="1"/>
+            <a:r>
+              <a:rPr lang="ru-RU" dirty="0" smtClean="0">
+                <a:solidFill>
+                  <a:srgbClr val="FFFF00"/>
+                </a:solidFill>
+              </a:rPr>
+              <a:t>Только так! Ничего другого быть не должно!</a:t>
+            </a:r>
+            <a:r>
+              <a:rPr lang="ru-RU" dirty="0"/>
+              <a:t> </a:t>
+            </a:r>
+            <a:endParaRPr lang="ru-RU" dirty="0" smtClean="0"/>
+          </a:p>
+          <a:p>
+            <a:r>
+              <a:rPr lang="ru-RU" dirty="0" smtClean="0"/>
+              <a:t>Очистка</a:t>
+            </a:r>
+          </a:p>
+          <a:p>
+            <a:pPr lvl="1"/>
+            <a:r>
+              <a:rPr lang="en-US" dirty="0" err="1"/>
+              <a:t>myElement.ClearValue</a:t>
+            </a:r>
+            <a:r>
+              <a:rPr lang="en-US" dirty="0"/>
+              <a:t>(</a:t>
+            </a:r>
+            <a:r>
+              <a:rPr lang="en-US" dirty="0" err="1"/>
+              <a:t>FrameworkElement.MarginProperty</a:t>
+            </a:r>
+            <a:r>
+              <a:rPr lang="en-US" dirty="0" smtClean="0"/>
+              <a:t>);</a:t>
+            </a:r>
+            <a:endParaRPr lang="ru-RU" dirty="0" smtClean="0"/>
+          </a:p>
+          <a:p>
+            <a:r>
+              <a:rPr lang="ru-RU" dirty="0" smtClean="0">
+                <a:solidFill>
+                  <a:schemeClr val="bg1"/>
+                </a:solidFill>
+              </a:rPr>
+              <a:t>Достоинства</a:t>
+            </a:r>
+          </a:p>
+          <a:p>
+            <a:pPr lvl="1"/>
+            <a:r>
+              <a:rPr lang="ru-RU" dirty="0" smtClean="0">
+                <a:solidFill>
+                  <a:schemeClr val="bg1"/>
+                </a:solidFill>
+              </a:rPr>
+              <a:t>Тратят меньше памяти, если значение не было указано</a:t>
+            </a:r>
+          </a:p>
+          <a:p>
+            <a:pPr lvl="1"/>
+            <a:r>
+              <a:rPr lang="ru-RU" dirty="0" smtClean="0">
+                <a:solidFill>
+                  <a:schemeClr val="bg1"/>
+                </a:solidFill>
+              </a:rPr>
+              <a:t>Поддержка стилей</a:t>
+            </a:r>
+            <a:endParaRPr lang="en-US" dirty="0">
+              <a:solidFill>
+                <a:schemeClr val="bg1"/>
+              </a:solidFill>
+            </a:endParaRPr>
+          </a:p>
+        </p:txBody>
+      </p:sp>
+    </p:spTree>
+    <p:extLst>
+      <p:ext uri="{BB962C8B-B14F-4D97-AF65-F5344CB8AC3E}">
+        <p14:creationId xmlns:p14="http://schemas.microsoft.com/office/powerpoint/2010/main" val="205489790"/>
+      </p:ext>
+    </p:extLst>
+  </p:cSld>
+  <p:clrMapOvr>
+    <a:masterClrMapping/>
+  </p:clrMapOvr>
+</p:sld>
+</file>
+
+<file path=ppt/slides/slide22.xml><?xml version="1.0" encoding="utf-8"?>
+<p:sld xmlns:a="http://schemas.openxmlformats.org/drawingml/2006/main" xmlns:r="http://schemas.openxmlformats.org/officeDocument/2006/relationships" xmlns:p="http://schemas.openxmlformats.org/presentationml/2006/main">
+  <p:cSld>
+    <p:spTree>
+      <p:nvGrpSpPr>
+        <p:cNvPr id="1" name=""/>
+        <p:cNvGrpSpPr/>
+        <p:nvPr/>
+      </p:nvGrpSpPr>
+      <p:grpSpPr>
+        <a:xfrm>
+          <a:off x="0" y="0"/>
+          <a:ext cx="0" cy="0"/>
+          <a:chOff x="0" y="0"/>
+          <a:chExt cx="0" cy="0"/>
+        </a:xfrm>
+      </p:grpSpPr>
+      <p:sp>
+        <p:nvSpPr>
+          <p:cNvPr id="2" name="Title 1"/>
+          <p:cNvSpPr>
+            <a:spLocks noGrp="1"/>
+          </p:cNvSpPr>
+          <p:nvPr>
+            <p:ph type="title"/>
+          </p:nvPr>
+        </p:nvSpPr>
+        <p:spPr/>
+        <p:txBody>
+          <a:bodyPr/>
+          <a:lstStyle/>
+          <a:p>
+            <a:r>
               <a:rPr lang="ru-RU" dirty="0" smtClean="0"/>
               <a:t>Валидация</a:t>
             </a:r>
@@ -6750,7 +6946,7 @@
 </p:sld>
 </file>
 
-<file path=ppt/slides/slide22.xml><?xml version="1.0" encoding="utf-8"?>
+<file path=ppt/slides/slide23.xml><?xml version="1.0" encoding="utf-8"?>
 <p:sld xmlns:a="http://schemas.openxmlformats.org/drawingml/2006/main" xmlns:r="http://schemas.openxmlformats.org/officeDocument/2006/relationships" xmlns:p="http://schemas.openxmlformats.org/presentationml/2006/main">
   <p:cSld>
     <p:spTree>

</xml_diff>

<commit_message>
Added Document Outline window into WPF presentation
</commit_message>
<xml_diff>
--- a/Presentation/lesson-12-wpf.pptx
+++ b/Presentation/lesson-12-wpf.pptx
@@ -5,7 +5,7 @@
     <p:sldMasterId id="2147483648" r:id="rId1"/>
   </p:sldMasterIdLst>
   <p:notesMasterIdLst>
-    <p:notesMasterId r:id="rId25"/>
+    <p:notesMasterId r:id="rId26"/>
   </p:notesMasterIdLst>
   <p:sldIdLst>
     <p:sldId id="256" r:id="rId2"/>
@@ -28,9 +28,10 @@
     <p:sldId id="273" r:id="rId19"/>
     <p:sldId id="279" r:id="rId20"/>
     <p:sldId id="274" r:id="rId21"/>
-    <p:sldId id="275" r:id="rId22"/>
-    <p:sldId id="276" r:id="rId23"/>
-    <p:sldId id="278" r:id="rId24"/>
+    <p:sldId id="280" r:id="rId22"/>
+    <p:sldId id="275" r:id="rId23"/>
+    <p:sldId id="276" r:id="rId24"/>
+    <p:sldId id="278" r:id="rId25"/>
   </p:sldIdLst>
   <p:sldSz cx="9144000" cy="6858000" type="screen4x3"/>
   <p:notesSz cx="6858000" cy="9144000"/>
@@ -214,7 +215,7 @@
           <a:p>
             <a:fld id="{B24A7054-7FFB-49F4-A126-5DF6E687FF53}" type="datetimeFigureOut">
               <a:rPr lang="ru-RU" smtClean="0"/>
-              <a:t>30.10.2013</a:t>
+              <a:t>14.11.2013</a:t>
             </a:fld>
             <a:endParaRPr lang="ru-RU"/>
           </a:p>
@@ -1277,7 +1278,7 @@
           <a:p>
             <a:fld id="{8E6E6A2A-E9D3-4A0D-B04A-ABDD367A1E08}" type="datetimeFigureOut">
               <a:rPr lang="ru-RU" smtClean="0"/>
-              <a:t>30.10.2013</a:t>
+              <a:t>14.11.2013</a:t>
             </a:fld>
             <a:endParaRPr lang="ru-RU"/>
           </a:p>
@@ -2725,7 +2726,7 @@
           <a:p>
             <a:fld id="{AC3D3127-B7C4-45E3-9797-C527EC9FDD78}" type="datetimeFigureOut">
               <a:rPr lang="ru-RU" smtClean="0"/>
-              <a:t>30.10.2013</a:t>
+              <a:t>14.11.2013</a:t>
             </a:fld>
             <a:endParaRPr lang="ru-RU"/>
           </a:p>
@@ -5208,8 +5209,12 @@
               <a:t>="</a:t>
             </a:r>
             <a:r>
+              <a:rPr lang="ru-RU" sz="2400" smtClean="0"/>
+              <a:t>одинаковый отступ </a:t>
+            </a:r>
+            <a:r>
               <a:rPr lang="ru-RU" sz="2400" dirty="0" smtClean="0"/>
-              <a:t>одинаковый отсуп со всех сторон</a:t>
+              <a:t>со всех сторон</a:t>
             </a:r>
             <a:r>
               <a:rPr lang="en-US" sz="2400" dirty="0" smtClean="0"/>
@@ -6450,9 +6455,10 @@
           <a:lstStyle/>
           <a:p>
             <a:r>
-              <a:rPr lang="en-US" dirty="0"/>
-              <a:t>Dependency Properties</a:t>
-            </a:r>
+              <a:rPr lang="en-US" dirty="0" smtClean="0"/>
+              <a:t>Document Outline</a:t>
+            </a:r>
+            <a:endParaRPr lang="en-US" dirty="0"/>
           </a:p>
         </p:txBody>
       </p:sp>
@@ -6466,324 +6472,131 @@
             <p:ph idx="1"/>
           </p:nvPr>
         </p:nvSpPr>
-        <p:spPr/>
+        <p:spPr>
+          <a:xfrm>
+            <a:off x="457200" y="1600201"/>
+            <a:ext cx="8229600" cy="1540768"/>
+          </a:xfrm>
+        </p:spPr>
         <p:txBody>
           <a:bodyPr>
-            <a:normAutofit fontScale="55000" lnSpcReduction="20000"/>
+            <a:normAutofit fontScale="70000" lnSpcReduction="20000"/>
           </a:bodyPr>
           <a:lstStyle/>
           <a:p>
+            <a:pPr marL="0" indent="0">
+              <a:buNone/>
+            </a:pPr>
             <a:r>
               <a:rPr lang="ru-RU" dirty="0" smtClean="0"/>
-              <a:t>Объявление</a:t>
-            </a:r>
-          </a:p>
-          <a:p>
-            <a:pPr lvl="1"/>
+              <a:t>Для упрощения работы с </a:t>
+            </a:r>
+            <a:r>
+              <a:rPr lang="en-US" dirty="0" smtClean="0"/>
+              <a:t>XAML </a:t>
+            </a:r>
+            <a:r>
+              <a:rPr lang="ru-RU" dirty="0" smtClean="0"/>
+              <a:t>«деревом» в </a:t>
+            </a:r>
+            <a:r>
+              <a:rPr lang="en-US" dirty="0" smtClean="0"/>
+              <a:t>Visual Studio </a:t>
+            </a:r>
+            <a:r>
+              <a:rPr lang="ru-RU" dirty="0" smtClean="0"/>
+              <a:t>есть окно </a:t>
+            </a:r>
             <a:r>
               <a:rPr lang="en-US" dirty="0"/>
-              <a:t>public class </a:t>
-            </a:r>
-            <a:r>
-              <a:rPr lang="en-US" dirty="0" err="1"/>
-              <a:t>FrameworkElement</a:t>
-            </a:r>
-            <a:r>
-              <a:rPr lang="en-US" dirty="0"/>
-              <a:t>: </a:t>
-            </a:r>
-            <a:r>
-              <a:rPr lang="en-US" dirty="0" err="1"/>
-              <a:t>UIElement</a:t>
-            </a:r>
-            <a:r>
-              <a:rPr lang="en-US" dirty="0"/>
-              <a:t>, ...</a:t>
+              <a:t>Document </a:t>
+            </a:r>
+            <a:r>
+              <a:rPr lang="en-US" dirty="0" smtClean="0"/>
+              <a:t>Outline</a:t>
             </a:r>
             <a:r>
               <a:rPr lang="ru-RU" dirty="0" smtClean="0"/>
-              <a:t/>
-            </a:r>
-            <a:br>
+              <a:t>. Вывести его можно из меню </a:t>
+            </a:r>
+            <a:r>
+              <a:rPr lang="en-US" dirty="0" smtClean="0"/>
+              <a:t>View -&gt; Other Windows -&gt; Document Outline. </a:t>
+            </a:r>
+            <a:r>
               <a:rPr lang="ru-RU" dirty="0" smtClean="0"/>
-            </a:br>
+              <a:t>Окно показывает элементы текущего </a:t>
+            </a:r>
             <a:r>
               <a:rPr lang="en-US" dirty="0" smtClean="0"/>
-              <a:t>{</a:t>
-            </a:r>
-            <a:br>
-              <a:rPr lang="en-US" dirty="0" smtClean="0"/>
-            </a:br>
-            <a:r>
-              <a:rPr lang="en-US" dirty="0" smtClean="0"/>
-              <a:t>public </a:t>
-            </a:r>
-            <a:r>
-              <a:rPr lang="en-US" dirty="0"/>
-              <a:t>static </a:t>
-            </a:r>
-            <a:r>
-              <a:rPr lang="en-US" dirty="0" err="1"/>
-              <a:t>readonly</a:t>
-            </a:r>
-            <a:r>
-              <a:rPr lang="en-US" dirty="0"/>
-              <a:t> </a:t>
-            </a:r>
-            <a:r>
-              <a:rPr lang="en-US" dirty="0" err="1">
-                <a:solidFill>
-                  <a:srgbClr val="FFFF00"/>
-                </a:solidFill>
-              </a:rPr>
-              <a:t>DependencyProperty</a:t>
-            </a:r>
-            <a:r>
-              <a:rPr lang="en-US" dirty="0"/>
-              <a:t> </a:t>
-            </a:r>
-            <a:r>
-              <a:rPr lang="en-US" dirty="0" err="1"/>
-              <a:t>Margin</a:t>
-            </a:r>
-            <a:r>
-              <a:rPr lang="en-US" dirty="0" err="1">
-                <a:solidFill>
-                  <a:srgbClr val="FFFF00"/>
-                </a:solidFill>
-              </a:rPr>
-              <a:t>Property</a:t>
-            </a:r>
-            <a:r>
-              <a:rPr lang="en-US" dirty="0" smtClean="0"/>
-              <a:t>;</a:t>
-            </a:r>
-            <a:br>
-              <a:rPr lang="en-US" dirty="0" smtClean="0"/>
-            </a:br>
-            <a:r>
-              <a:rPr lang="en-US" dirty="0" smtClean="0"/>
-              <a:t>}</a:t>
-            </a:r>
-            <a:endParaRPr lang="ru-RU" dirty="0" smtClean="0"/>
-          </a:p>
-          <a:p>
+              <a:t>XAML </a:t>
+            </a:r>
             <a:r>
               <a:rPr lang="ru-RU" dirty="0" smtClean="0"/>
-              <a:t>Регистрация</a:t>
-            </a:r>
-          </a:p>
-          <a:p>
-            <a:pPr lvl="1"/>
-            <a:r>
-              <a:rPr lang="en-US" dirty="0" err="1" smtClean="0"/>
-              <a:t>FrameworkPropertyMetadata</a:t>
-            </a:r>
-            <a:endParaRPr lang="ru-RU" dirty="0" smtClean="0"/>
-          </a:p>
-          <a:p>
-            <a:pPr lvl="1"/>
-            <a:r>
-              <a:rPr lang="en-US" dirty="0" err="1" smtClean="0"/>
-              <a:t>DependencyProperty.Register</a:t>
-            </a:r>
-            <a:endParaRPr lang="ru-RU" dirty="0" smtClean="0"/>
-          </a:p>
-          <a:p>
-            <a:r>
-              <a:rPr lang="ru-RU" dirty="0" smtClean="0"/>
-              <a:t>Объявление</a:t>
-            </a:r>
-          </a:p>
-          <a:p>
-            <a:pPr lvl="1"/>
-            <a:r>
-              <a:rPr lang="en-US" dirty="0"/>
-              <a:t>public Thickness </a:t>
-            </a:r>
-            <a:r>
-              <a:rPr lang="en-US" dirty="0" smtClean="0"/>
-              <a:t>Margin</a:t>
-            </a:r>
-            <a:r>
-              <a:rPr lang="ru-RU" dirty="0" smtClean="0"/>
-              <a:t/>
-            </a:r>
-            <a:br>
-              <a:rPr lang="ru-RU" dirty="0" smtClean="0"/>
-            </a:br>
-            <a:r>
-              <a:rPr lang="en-US" dirty="0" smtClean="0"/>
-              <a:t>{</a:t>
-            </a:r>
-            <a:r>
-              <a:rPr lang="ru-RU" dirty="0" smtClean="0"/>
-              <a:t/>
-            </a:r>
-            <a:br>
-              <a:rPr lang="ru-RU" dirty="0" smtClean="0"/>
-            </a:br>
-            <a:r>
-              <a:rPr lang="en-US" dirty="0" smtClean="0"/>
-              <a:t>set </a:t>
-            </a:r>
-            <a:r>
-              <a:rPr lang="en-US" dirty="0"/>
-              <a:t>{ </a:t>
-            </a:r>
-            <a:r>
-              <a:rPr lang="en-US" dirty="0" err="1"/>
-              <a:t>SetValue</a:t>
-            </a:r>
-            <a:r>
-              <a:rPr lang="en-US" dirty="0"/>
-              <a:t>(</a:t>
-            </a:r>
-            <a:r>
-              <a:rPr lang="en-US" dirty="0" err="1"/>
-              <a:t>MarginProperty</a:t>
-            </a:r>
-            <a:r>
-              <a:rPr lang="en-US" dirty="0"/>
-              <a:t>, value); </a:t>
-            </a:r>
-            <a:r>
-              <a:rPr lang="en-US" dirty="0" smtClean="0"/>
-              <a:t>}</a:t>
-            </a:r>
-            <a:r>
-              <a:rPr lang="ru-RU" dirty="0" smtClean="0"/>
-              <a:t/>
-            </a:r>
-            <a:br>
-              <a:rPr lang="ru-RU" dirty="0" smtClean="0"/>
-            </a:br>
-            <a:r>
-              <a:rPr lang="en-US" dirty="0" smtClean="0"/>
-              <a:t>get </a:t>
-            </a:r>
-            <a:r>
-              <a:rPr lang="en-US" dirty="0"/>
-              <a:t>{ return (Thickness)</a:t>
-            </a:r>
-            <a:r>
-              <a:rPr lang="en-US" dirty="0" err="1"/>
-              <a:t>GetValue</a:t>
-            </a:r>
-            <a:r>
-              <a:rPr lang="en-US" dirty="0"/>
-              <a:t>(</a:t>
-            </a:r>
-            <a:r>
-              <a:rPr lang="en-US" dirty="0" err="1"/>
-              <a:t>MarginProperty</a:t>
-            </a:r>
-            <a:r>
-              <a:rPr lang="en-US" dirty="0"/>
-              <a:t>); </a:t>
-            </a:r>
-            <a:r>
-              <a:rPr lang="en-US" dirty="0" smtClean="0"/>
-              <a:t>}</a:t>
-            </a:r>
-            <a:r>
-              <a:rPr lang="ru-RU" dirty="0" smtClean="0"/>
-              <a:t/>
-            </a:r>
-            <a:br>
-              <a:rPr lang="ru-RU" dirty="0" smtClean="0"/>
-            </a:br>
-            <a:r>
-              <a:rPr lang="en-US" dirty="0" smtClean="0"/>
-              <a:t>}</a:t>
-            </a:r>
-            <a:endParaRPr lang="ru-RU" dirty="0" smtClean="0"/>
-          </a:p>
-          <a:p>
-            <a:pPr lvl="1"/>
-            <a:r>
-              <a:rPr lang="ru-RU" dirty="0" smtClean="0">
-                <a:solidFill>
-                  <a:srgbClr val="FFFF00"/>
-                </a:solidFill>
-              </a:rPr>
-              <a:t>Только так! Ничего другого быть не должно!</a:t>
-            </a:r>
-            <a:r>
-              <a:rPr lang="ru-RU" dirty="0"/>
-              <a:t> </a:t>
-            </a:r>
-            <a:endParaRPr lang="ru-RU" dirty="0" smtClean="0"/>
-          </a:p>
-          <a:p>
-            <a:r>
-              <a:rPr lang="ru-RU" dirty="0" smtClean="0"/>
-              <a:t>Очистка</a:t>
-            </a:r>
-          </a:p>
-          <a:p>
-            <a:pPr lvl="1"/>
-            <a:r>
-              <a:rPr lang="en-US" dirty="0" err="1"/>
-              <a:t>myElement.ClearValue</a:t>
-            </a:r>
-            <a:r>
-              <a:rPr lang="en-US" dirty="0"/>
-              <a:t>(</a:t>
-            </a:r>
-            <a:r>
-              <a:rPr lang="en-US" dirty="0" err="1"/>
-              <a:t>FrameworkElement.MarginProperty</a:t>
-            </a:r>
-            <a:r>
-              <a:rPr lang="en-US" dirty="0" smtClean="0"/>
-              <a:t>);</a:t>
-            </a:r>
-            <a:endParaRPr lang="ru-RU" dirty="0" smtClean="0"/>
-          </a:p>
-          <a:p>
-            <a:r>
-              <a:rPr lang="ru-RU" dirty="0" smtClean="0">
-                <a:solidFill>
-                  <a:schemeClr val="bg1"/>
-                </a:solidFill>
-              </a:rPr>
-              <a:t>Достоинства</a:t>
-            </a:r>
-          </a:p>
-          <a:p>
-            <a:pPr lvl="1"/>
-            <a:r>
-              <a:rPr lang="ru-RU" dirty="0" smtClean="0">
-                <a:solidFill>
-                  <a:schemeClr val="bg1"/>
-                </a:solidFill>
-              </a:rPr>
-              <a:t>Тратят меньше памяти, если значение не было указано</a:t>
-            </a:r>
-          </a:p>
-          <a:p>
-            <a:pPr lvl="1"/>
-            <a:r>
-              <a:rPr lang="ru-RU" dirty="0" smtClean="0">
-                <a:solidFill>
-                  <a:schemeClr val="bg1"/>
-                </a:solidFill>
-              </a:rPr>
-              <a:t>Поддержка стилей</a:t>
-            </a:r>
-            <a:endParaRPr lang="en-US" dirty="0">
-              <a:solidFill>
-                <a:schemeClr val="bg1"/>
-              </a:solidFill>
-            </a:endParaRPr>
+              <a:t>документа в виде дерева. Выбор элемента в дереве выбирает его в визаульном дизайнере и окне свойств.</a:t>
+            </a:r>
+            <a:endParaRPr lang="en-US" dirty="0"/>
           </a:p>
         </p:txBody>
       </p:sp>
+      <p:pic>
+        <p:nvPicPr>
+          <p:cNvPr id="1026" name="Picture 2"/>
+          <p:cNvPicPr>
+            <a:picLocks noChangeAspect="1" noChangeArrowheads="1"/>
+          </p:cNvPicPr>
+          <p:nvPr/>
+        </p:nvPicPr>
+        <p:blipFill>
+          <a:blip r:embed="rId2">
+            <a:extLst>
+              <a:ext uri="{28A0092B-C50C-407E-A947-70E740481C1C}">
+                <a14:useLocalDpi xmlns:a14="http://schemas.microsoft.com/office/drawing/2010/main" val="0"/>
+              </a:ext>
+            </a:extLst>
+          </a:blip>
+          <a:srcRect/>
+          <a:stretch>
+            <a:fillRect/>
+          </a:stretch>
+        </p:blipFill>
+        <p:spPr bwMode="auto">
+          <a:xfrm>
+            <a:off x="3314700" y="3429000"/>
+            <a:ext cx="2514600" cy="2771775"/>
+          </a:xfrm>
+          <a:prstGeom prst="rect">
+            <a:avLst/>
+          </a:prstGeom>
+          <a:noFill/>
+          <a:ln>
+            <a:noFill/>
+          </a:ln>
+          <a:extLst>
+            <a:ext uri="{909E8E84-426E-40DD-AFC4-6F175D3DCCD1}">
+              <a14:hiddenFill xmlns:a14="http://schemas.microsoft.com/office/drawing/2010/main">
+                <a:solidFill>
+                  <a:schemeClr val="accent1"/>
+                </a:solidFill>
+              </a14:hiddenFill>
+            </a:ext>
+            <a:ext uri="{91240B29-F687-4F45-9708-019B960494DF}">
+              <a14:hiddenLine xmlns:a14="http://schemas.microsoft.com/office/drawing/2010/main" w="9525">
+                <a:solidFill>
+                  <a:schemeClr val="tx1"/>
+                </a:solidFill>
+                <a:miter lim="800000"/>
+                <a:headEnd/>
+                <a:tailEnd/>
+              </a14:hiddenLine>
+            </a:ext>
+          </a:extLst>
+        </p:spPr>
+      </p:pic>
     </p:spTree>
     <p:extLst>
       <p:ext uri="{BB962C8B-B14F-4D97-AF65-F5344CB8AC3E}">
-        <p14:creationId xmlns:p14="http://schemas.microsoft.com/office/powerpoint/2010/main" val="205489790"/>
+        <p14:creationId xmlns:p14="http://schemas.microsoft.com/office/powerpoint/2010/main" val="1313020148"/>
       </p:ext>
     </p:extLst>
   </p:cSld>
@@ -6826,6 +6639,382 @@
           <a:lstStyle/>
           <a:p>
             <a:r>
+              <a:rPr lang="en-US" dirty="0"/>
+              <a:t>Dependency Properties</a:t>
+            </a:r>
+          </a:p>
+        </p:txBody>
+      </p:sp>
+      <p:sp>
+        <p:nvSpPr>
+          <p:cNvPr id="3" name="Content Placeholder 2"/>
+          <p:cNvSpPr>
+            <a:spLocks noGrp="1"/>
+          </p:cNvSpPr>
+          <p:nvPr>
+            <p:ph idx="1"/>
+          </p:nvPr>
+        </p:nvSpPr>
+        <p:spPr/>
+        <p:txBody>
+          <a:bodyPr>
+            <a:normAutofit fontScale="55000" lnSpcReduction="20000"/>
+          </a:bodyPr>
+          <a:lstStyle/>
+          <a:p>
+            <a:r>
+              <a:rPr lang="ru-RU" dirty="0" smtClean="0"/>
+              <a:t>Объявление</a:t>
+            </a:r>
+          </a:p>
+          <a:p>
+            <a:pPr lvl="1"/>
+            <a:r>
+              <a:rPr lang="en-US" dirty="0"/>
+              <a:t>public class </a:t>
+            </a:r>
+            <a:r>
+              <a:rPr lang="en-US" dirty="0" err="1"/>
+              <a:t>FrameworkElement</a:t>
+            </a:r>
+            <a:r>
+              <a:rPr lang="en-US" dirty="0"/>
+              <a:t>: </a:t>
+            </a:r>
+            <a:r>
+              <a:rPr lang="en-US" dirty="0" err="1"/>
+              <a:t>UIElement</a:t>
+            </a:r>
+            <a:r>
+              <a:rPr lang="en-US" dirty="0"/>
+              <a:t>, ...</a:t>
+            </a:r>
+            <a:r>
+              <a:rPr lang="ru-RU" dirty="0" smtClean="0"/>
+              <a:t/>
+            </a:r>
+            <a:br>
+              <a:rPr lang="ru-RU" dirty="0" smtClean="0"/>
+            </a:br>
+            <a:r>
+              <a:rPr lang="en-US" dirty="0" smtClean="0"/>
+              <a:t>{</a:t>
+            </a:r>
+            <a:br>
+              <a:rPr lang="en-US" dirty="0" smtClean="0"/>
+            </a:br>
+            <a:r>
+              <a:rPr lang="en-US" dirty="0" smtClean="0"/>
+              <a:t>public </a:t>
+            </a:r>
+            <a:r>
+              <a:rPr lang="en-US" dirty="0"/>
+              <a:t>static </a:t>
+            </a:r>
+            <a:r>
+              <a:rPr lang="en-US" dirty="0" err="1"/>
+              <a:t>readonly</a:t>
+            </a:r>
+            <a:r>
+              <a:rPr lang="en-US" dirty="0"/>
+              <a:t> </a:t>
+            </a:r>
+            <a:r>
+              <a:rPr lang="en-US" dirty="0" err="1">
+                <a:solidFill>
+                  <a:srgbClr val="FFFF00"/>
+                </a:solidFill>
+              </a:rPr>
+              <a:t>DependencyProperty</a:t>
+            </a:r>
+            <a:r>
+              <a:rPr lang="en-US" dirty="0"/>
+              <a:t> </a:t>
+            </a:r>
+            <a:r>
+              <a:rPr lang="en-US" dirty="0" err="1"/>
+              <a:t>Margin</a:t>
+            </a:r>
+            <a:r>
+              <a:rPr lang="en-US" dirty="0" err="1">
+                <a:solidFill>
+                  <a:srgbClr val="FFFF00"/>
+                </a:solidFill>
+              </a:rPr>
+              <a:t>Property</a:t>
+            </a:r>
+            <a:r>
+              <a:rPr lang="en-US" dirty="0" smtClean="0"/>
+              <a:t>;</a:t>
+            </a:r>
+            <a:br>
+              <a:rPr lang="en-US" dirty="0" smtClean="0"/>
+            </a:br>
+            <a:r>
+              <a:rPr lang="en-US" dirty="0" smtClean="0"/>
+              <a:t>}</a:t>
+            </a:r>
+            <a:endParaRPr lang="ru-RU" dirty="0" smtClean="0"/>
+          </a:p>
+          <a:p>
+            <a:r>
+              <a:rPr lang="ru-RU" dirty="0" smtClean="0"/>
+              <a:t>Регистрация</a:t>
+            </a:r>
+          </a:p>
+          <a:p>
+            <a:pPr lvl="1"/>
+            <a:r>
+              <a:rPr lang="en-US" dirty="0" err="1" smtClean="0"/>
+              <a:t>FrameworkPropertyMetadata</a:t>
+            </a:r>
+            <a:endParaRPr lang="ru-RU" dirty="0" smtClean="0"/>
+          </a:p>
+          <a:p>
+            <a:pPr lvl="1"/>
+            <a:r>
+              <a:rPr lang="en-US" dirty="0" err="1" smtClean="0"/>
+              <a:t>DependencyProperty.Register</a:t>
+            </a:r>
+            <a:endParaRPr lang="ru-RU" dirty="0" smtClean="0"/>
+          </a:p>
+          <a:p>
+            <a:r>
+              <a:rPr lang="ru-RU" dirty="0" smtClean="0"/>
+              <a:t>Объявление</a:t>
+            </a:r>
+          </a:p>
+          <a:p>
+            <a:pPr lvl="1"/>
+            <a:r>
+              <a:rPr lang="en-US" dirty="0"/>
+              <a:t>public Thickness </a:t>
+            </a:r>
+            <a:r>
+              <a:rPr lang="en-US" dirty="0" smtClean="0"/>
+              <a:t>Margin</a:t>
+            </a:r>
+            <a:r>
+              <a:rPr lang="ru-RU" dirty="0" smtClean="0"/>
+              <a:t/>
+            </a:r>
+            <a:br>
+              <a:rPr lang="ru-RU" dirty="0" smtClean="0"/>
+            </a:br>
+            <a:r>
+              <a:rPr lang="en-US" dirty="0" smtClean="0"/>
+              <a:t>{</a:t>
+            </a:r>
+            <a:r>
+              <a:rPr lang="ru-RU" dirty="0" smtClean="0"/>
+              <a:t/>
+            </a:r>
+            <a:br>
+              <a:rPr lang="ru-RU" dirty="0" smtClean="0"/>
+            </a:br>
+            <a:r>
+              <a:rPr lang="en-US" dirty="0" smtClean="0"/>
+              <a:t>set </a:t>
+            </a:r>
+            <a:r>
+              <a:rPr lang="en-US" dirty="0"/>
+              <a:t>{ </a:t>
+            </a:r>
+            <a:r>
+              <a:rPr lang="en-US" dirty="0" err="1"/>
+              <a:t>SetValue</a:t>
+            </a:r>
+            <a:r>
+              <a:rPr lang="en-US" dirty="0"/>
+              <a:t>(</a:t>
+            </a:r>
+            <a:r>
+              <a:rPr lang="en-US" dirty="0" err="1"/>
+              <a:t>MarginProperty</a:t>
+            </a:r>
+            <a:r>
+              <a:rPr lang="en-US" dirty="0"/>
+              <a:t>, value); </a:t>
+            </a:r>
+            <a:r>
+              <a:rPr lang="en-US" dirty="0" smtClean="0"/>
+              <a:t>}</a:t>
+            </a:r>
+            <a:r>
+              <a:rPr lang="ru-RU" dirty="0" smtClean="0"/>
+              <a:t/>
+            </a:r>
+            <a:br>
+              <a:rPr lang="ru-RU" dirty="0" smtClean="0"/>
+            </a:br>
+            <a:r>
+              <a:rPr lang="en-US" dirty="0" smtClean="0"/>
+              <a:t>get </a:t>
+            </a:r>
+            <a:r>
+              <a:rPr lang="en-US" dirty="0"/>
+              <a:t>{ return (Thickness)</a:t>
+            </a:r>
+            <a:r>
+              <a:rPr lang="en-US" dirty="0" err="1"/>
+              <a:t>GetValue</a:t>
+            </a:r>
+            <a:r>
+              <a:rPr lang="en-US" dirty="0"/>
+              <a:t>(</a:t>
+            </a:r>
+            <a:r>
+              <a:rPr lang="en-US" dirty="0" err="1"/>
+              <a:t>MarginProperty</a:t>
+            </a:r>
+            <a:r>
+              <a:rPr lang="en-US" dirty="0"/>
+              <a:t>); </a:t>
+            </a:r>
+            <a:r>
+              <a:rPr lang="en-US" dirty="0" smtClean="0"/>
+              <a:t>}</a:t>
+            </a:r>
+            <a:r>
+              <a:rPr lang="ru-RU" dirty="0" smtClean="0"/>
+              <a:t/>
+            </a:r>
+            <a:br>
+              <a:rPr lang="ru-RU" dirty="0" smtClean="0"/>
+            </a:br>
+            <a:r>
+              <a:rPr lang="en-US" dirty="0" smtClean="0"/>
+              <a:t>}</a:t>
+            </a:r>
+            <a:endParaRPr lang="ru-RU" dirty="0" smtClean="0"/>
+          </a:p>
+          <a:p>
+            <a:pPr lvl="1"/>
+            <a:r>
+              <a:rPr lang="ru-RU" dirty="0" smtClean="0">
+                <a:solidFill>
+                  <a:srgbClr val="FFFF00"/>
+                </a:solidFill>
+              </a:rPr>
+              <a:t>Только так! Ничего другого быть не должно!</a:t>
+            </a:r>
+            <a:r>
+              <a:rPr lang="ru-RU" dirty="0"/>
+              <a:t> </a:t>
+            </a:r>
+            <a:endParaRPr lang="ru-RU" dirty="0" smtClean="0"/>
+          </a:p>
+          <a:p>
+            <a:r>
+              <a:rPr lang="ru-RU" dirty="0" smtClean="0"/>
+              <a:t>Очистка</a:t>
+            </a:r>
+          </a:p>
+          <a:p>
+            <a:pPr lvl="1"/>
+            <a:r>
+              <a:rPr lang="en-US" dirty="0" err="1"/>
+              <a:t>myElement.ClearValue</a:t>
+            </a:r>
+            <a:r>
+              <a:rPr lang="en-US" dirty="0"/>
+              <a:t>(</a:t>
+            </a:r>
+            <a:r>
+              <a:rPr lang="en-US" dirty="0" err="1"/>
+              <a:t>FrameworkElement.MarginProperty</a:t>
+            </a:r>
+            <a:r>
+              <a:rPr lang="en-US" dirty="0" smtClean="0"/>
+              <a:t>);</a:t>
+            </a:r>
+            <a:endParaRPr lang="ru-RU" dirty="0" smtClean="0"/>
+          </a:p>
+          <a:p>
+            <a:r>
+              <a:rPr lang="ru-RU" dirty="0" smtClean="0">
+                <a:solidFill>
+                  <a:schemeClr val="bg1"/>
+                </a:solidFill>
+              </a:rPr>
+              <a:t>Достоинства</a:t>
+            </a:r>
+          </a:p>
+          <a:p>
+            <a:pPr lvl="1"/>
+            <a:r>
+              <a:rPr lang="ru-RU" dirty="0" smtClean="0">
+                <a:solidFill>
+                  <a:schemeClr val="bg1"/>
+                </a:solidFill>
+              </a:rPr>
+              <a:t>Тратят меньше памяти, если значение не было указано</a:t>
+            </a:r>
+          </a:p>
+          <a:p>
+            <a:pPr lvl="1"/>
+            <a:r>
+              <a:rPr lang="ru-RU" dirty="0" smtClean="0">
+                <a:solidFill>
+                  <a:schemeClr val="bg1"/>
+                </a:solidFill>
+              </a:rPr>
+              <a:t>Поддержка стилей</a:t>
+            </a:r>
+            <a:endParaRPr lang="en-US" dirty="0">
+              <a:solidFill>
+                <a:schemeClr val="bg1"/>
+              </a:solidFill>
+            </a:endParaRPr>
+          </a:p>
+        </p:txBody>
+      </p:sp>
+    </p:spTree>
+    <p:extLst>
+      <p:ext uri="{BB962C8B-B14F-4D97-AF65-F5344CB8AC3E}">
+        <p14:creationId xmlns:p14="http://schemas.microsoft.com/office/powerpoint/2010/main" val="205489790"/>
+      </p:ext>
+    </p:extLst>
+  </p:cSld>
+  <p:clrMapOvr>
+    <a:masterClrMapping/>
+  </p:clrMapOvr>
+</p:sld>
+</file>
+
+<file path=ppt/slides/slide23.xml><?xml version="1.0" encoding="utf-8"?>
+<p:sld xmlns:a="http://schemas.openxmlformats.org/drawingml/2006/main" xmlns:r="http://schemas.openxmlformats.org/officeDocument/2006/relationships" xmlns:p="http://schemas.openxmlformats.org/presentationml/2006/main">
+  <p:cSld>
+    <p:spTree>
+      <p:nvGrpSpPr>
+        <p:cNvPr id="1" name=""/>
+        <p:cNvGrpSpPr/>
+        <p:nvPr/>
+      </p:nvGrpSpPr>
+      <p:grpSpPr>
+        <a:xfrm>
+          <a:off x="0" y="0"/>
+          <a:ext cx="0" cy="0"/>
+          <a:chOff x="0" y="0"/>
+          <a:chExt cx="0" cy="0"/>
+        </a:xfrm>
+      </p:grpSpPr>
+      <p:sp>
+        <p:nvSpPr>
+          <p:cNvPr id="2" name="Title 1"/>
+          <p:cNvSpPr>
+            <a:spLocks noGrp="1"/>
+          </p:cNvSpPr>
+          <p:nvPr>
+            <p:ph type="title"/>
+          </p:nvPr>
+        </p:nvSpPr>
+        <p:spPr/>
+        <p:txBody>
+          <a:bodyPr/>
+          <a:lstStyle/>
+          <a:p>
+            <a:r>
               <a:rPr lang="ru-RU" dirty="0" smtClean="0"/>
               <a:t>Валидация</a:t>
             </a:r>
@@ -6946,7 +7135,7 @@
 </p:sld>
 </file>
 
-<file path=ppt/slides/slide23.xml><?xml version="1.0" encoding="utf-8"?>
+<file path=ppt/slides/slide24.xml><?xml version="1.0" encoding="utf-8"?>
 <p:sld xmlns:a="http://schemas.openxmlformats.org/drawingml/2006/main" xmlns:r="http://schemas.openxmlformats.org/officeDocument/2006/relationships" xmlns:p="http://schemas.openxmlformats.org/presentationml/2006/main">
   <p:cSld>
     <p:spTree>

</xml_diff>

<commit_message>
Info about WPF vs Windows Forms
</commit_message>
<xml_diff>
--- a/Presentation/lesson-12-wpf.pptx
+++ b/Presentation/lesson-12-wpf.pptx
@@ -5,7 +5,7 @@
     <p:sldMasterId id="2147483648" r:id="rId1"/>
   </p:sldMasterIdLst>
   <p:notesMasterIdLst>
-    <p:notesMasterId r:id="rId26"/>
+    <p:notesMasterId r:id="rId27"/>
   </p:notesMasterIdLst>
   <p:sldIdLst>
     <p:sldId id="256" r:id="rId2"/>
@@ -13,25 +13,26 @@
     <p:sldId id="277" r:id="rId4"/>
     <p:sldId id="265" r:id="rId5"/>
     <p:sldId id="259" r:id="rId6"/>
-    <p:sldId id="258" r:id="rId7"/>
-    <p:sldId id="260" r:id="rId8"/>
-    <p:sldId id="261" r:id="rId9"/>
-    <p:sldId id="263" r:id="rId10"/>
-    <p:sldId id="262" r:id="rId11"/>
-    <p:sldId id="266" r:id="rId12"/>
-    <p:sldId id="267" r:id="rId13"/>
-    <p:sldId id="268" r:id="rId14"/>
-    <p:sldId id="269" r:id="rId15"/>
-    <p:sldId id="270" r:id="rId16"/>
-    <p:sldId id="271" r:id="rId17"/>
-    <p:sldId id="272" r:id="rId18"/>
-    <p:sldId id="273" r:id="rId19"/>
-    <p:sldId id="279" r:id="rId20"/>
-    <p:sldId id="274" r:id="rId21"/>
-    <p:sldId id="280" r:id="rId22"/>
-    <p:sldId id="275" r:id="rId23"/>
-    <p:sldId id="276" r:id="rId24"/>
-    <p:sldId id="278" r:id="rId25"/>
+    <p:sldId id="281" r:id="rId7"/>
+    <p:sldId id="258" r:id="rId8"/>
+    <p:sldId id="260" r:id="rId9"/>
+    <p:sldId id="261" r:id="rId10"/>
+    <p:sldId id="263" r:id="rId11"/>
+    <p:sldId id="262" r:id="rId12"/>
+    <p:sldId id="266" r:id="rId13"/>
+    <p:sldId id="267" r:id="rId14"/>
+    <p:sldId id="268" r:id="rId15"/>
+    <p:sldId id="269" r:id="rId16"/>
+    <p:sldId id="270" r:id="rId17"/>
+    <p:sldId id="271" r:id="rId18"/>
+    <p:sldId id="272" r:id="rId19"/>
+    <p:sldId id="273" r:id="rId20"/>
+    <p:sldId id="279" r:id="rId21"/>
+    <p:sldId id="274" r:id="rId22"/>
+    <p:sldId id="280" r:id="rId23"/>
+    <p:sldId id="275" r:id="rId24"/>
+    <p:sldId id="276" r:id="rId25"/>
+    <p:sldId id="278" r:id="rId26"/>
   </p:sldIdLst>
   <p:sldSz cx="9144000" cy="6858000" type="screen4x3"/>
   <p:notesSz cx="6858000" cy="9144000"/>
@@ -215,7 +216,7 @@
           <a:p>
             <a:fld id="{B24A7054-7FFB-49F4-A126-5DF6E687FF53}" type="datetimeFigureOut">
               <a:rPr lang="ru-RU" smtClean="0"/>
-              <a:t>14.11.2013</a:t>
+              <a:t>04.03.2014</a:t>
             </a:fld>
             <a:endParaRPr lang="ru-RU"/>
           </a:p>
@@ -1278,7 +1279,7 @@
           <a:p>
             <a:fld id="{8E6E6A2A-E9D3-4A0D-B04A-ABDD367A1E08}" type="datetimeFigureOut">
               <a:rPr lang="ru-RU" smtClean="0"/>
-              <a:t>14.11.2013</a:t>
+              <a:t>04.03.2014</a:t>
             </a:fld>
             <a:endParaRPr lang="ru-RU"/>
           </a:p>
@@ -2726,7 +2727,7 @@
           <a:p>
             <a:fld id="{AC3D3127-B7C4-45E3-9797-C527EC9FDD78}" type="datetimeFigureOut">
               <a:rPr lang="ru-RU" smtClean="0"/>
-              <a:t>14.11.2013</a:t>
+              <a:t>04.03.2014</a:t>
             </a:fld>
             <a:endParaRPr lang="ru-RU"/>
           </a:p>
@@ -3299,6 +3300,14 @@
 <file path=ppt/slides/slide10.xml><?xml version="1.0" encoding="utf-8"?>
 <p:sld xmlns:a="http://schemas.openxmlformats.org/drawingml/2006/main" xmlns:r="http://schemas.openxmlformats.org/officeDocument/2006/relationships" xmlns:p="http://schemas.openxmlformats.org/presentationml/2006/main">
   <p:cSld>
+    <p:bg>
+      <p:bgPr>
+        <a:solidFill>
+          <a:schemeClr val="accent1"/>
+        </a:solidFill>
+        <a:effectLst/>
+      </p:bgPr>
+    </p:bg>
     <p:spTree>
       <p:nvGrpSpPr>
         <p:cNvPr id="1" name=""/>
@@ -3331,138 +3340,136 @@
           <a:lstStyle/>
           <a:p>
             <a:r>
-              <a:rPr lang="en-US" dirty="0"/>
-              <a:t>Extensible Application Markup </a:t>
-            </a:r>
-            <a:r>
-              <a:rPr lang="en-US" dirty="0" smtClean="0"/>
-              <a:t>Language </a:t>
-            </a:r>
-            <a:r>
-              <a:rPr lang="ru-RU" dirty="0" smtClean="0"/>
-              <a:t>(</a:t>
-            </a:r>
-            <a:r>
-              <a:rPr lang="en-US" dirty="0"/>
-              <a:t>XAML</a:t>
-            </a:r>
-            <a:r>
-              <a:rPr lang="ru-RU" dirty="0" smtClean="0"/>
-              <a:t>)</a:t>
-            </a:r>
-            <a:endParaRPr lang="en-US" dirty="0"/>
+              <a:rPr lang="ru-RU" dirty="0" smtClean="0">
+                <a:solidFill>
+                  <a:srgbClr val="002060"/>
+                </a:solidFill>
+              </a:rPr>
+              <a:t>Иерархия классов </a:t>
+            </a:r>
+            <a:r>
+              <a:rPr lang="en-US" dirty="0" smtClean="0">
+                <a:solidFill>
+                  <a:srgbClr val="002060"/>
+                </a:solidFill>
+              </a:rPr>
+              <a:t>WPF</a:t>
+            </a:r>
+            <a:r>
+              <a:rPr lang="ru-RU" dirty="0">
+                <a:solidFill>
+                  <a:srgbClr val="002060"/>
+                </a:solidFill>
+              </a:rPr>
+              <a:t/>
+            </a:r>
+            <a:br>
+              <a:rPr lang="ru-RU" dirty="0">
+                <a:solidFill>
+                  <a:srgbClr val="002060"/>
+                </a:solidFill>
+              </a:rPr>
+            </a:br>
+            <a:r>
+              <a:rPr lang="en-US" dirty="0" err="1" smtClean="0">
+                <a:solidFill>
+                  <a:srgbClr val="002060"/>
+                </a:solidFill>
+              </a:rPr>
+              <a:t>System.Windows</a:t>
+            </a:r>
+            <a:r>
+              <a:rPr lang="ru-RU" dirty="0" smtClean="0">
+                <a:solidFill>
+                  <a:srgbClr val="002060"/>
+                </a:solidFill>
+              </a:rPr>
+              <a:t> </a:t>
+            </a:r>
+            <a:r>
+              <a:rPr lang="en-US" dirty="0" smtClean="0">
+                <a:solidFill>
+                  <a:srgbClr val="002060"/>
+                </a:solidFill>
+              </a:rPr>
+              <a:t>namespace</a:t>
+            </a:r>
+            <a:endParaRPr lang="en-US" dirty="0">
+              <a:solidFill>
+                <a:srgbClr val="002060"/>
+              </a:solidFill>
+            </a:endParaRPr>
           </a:p>
         </p:txBody>
       </p:sp>
-      <p:sp>
-        <p:nvSpPr>
-          <p:cNvPr id="3" name="Content Placeholder 2"/>
-          <p:cNvSpPr>
-            <a:spLocks noGrp="1"/>
-          </p:cNvSpPr>
-          <p:nvPr>
-            <p:ph idx="1"/>
-          </p:nvPr>
-        </p:nvSpPr>
-        <p:spPr/>
-        <p:txBody>
-          <a:bodyPr/>
-          <a:lstStyle/>
-          <a:p>
-            <a:r>
-              <a:rPr lang="ru-RU" dirty="0" smtClean="0"/>
-              <a:t>Произносится как «</a:t>
-            </a:r>
-            <a:r>
-              <a:rPr lang="en-US" dirty="0" err="1" smtClean="0"/>
-              <a:t>zammel</a:t>
-            </a:r>
-            <a:r>
-              <a:rPr lang="ru-RU" dirty="0" smtClean="0"/>
-              <a:t>»</a:t>
-            </a:r>
-          </a:p>
-          <a:p>
-            <a:r>
-              <a:rPr lang="ru-RU" dirty="0" smtClean="0"/>
-              <a:t>Язык описания </a:t>
-            </a:r>
-            <a:r>
-              <a:rPr lang="en-US" dirty="0" smtClean="0"/>
-              <a:t>UI </a:t>
-            </a:r>
-            <a:r>
-              <a:rPr lang="ru-RU" dirty="0" smtClean="0"/>
-              <a:t>на основе </a:t>
-            </a:r>
-            <a:r>
-              <a:rPr lang="en-US" dirty="0" smtClean="0"/>
-              <a:t>XML</a:t>
-            </a:r>
-            <a:endParaRPr lang="ru-RU" dirty="0" smtClean="0"/>
-          </a:p>
-          <a:p>
-            <a:pPr lvl="1"/>
-            <a:r>
-              <a:rPr lang="ru-RU" dirty="0" smtClean="0"/>
-              <a:t>Использует те же спецсимволы для </a:t>
-            </a:r>
-            <a:r>
-              <a:rPr lang="en-US" dirty="0" smtClean="0"/>
-              <a:t>&lt;, &gt; </a:t>
-            </a:r>
-            <a:r>
-              <a:rPr lang="ru-RU" dirty="0" smtClean="0"/>
-              <a:t>и </a:t>
-            </a:r>
-            <a:r>
-              <a:rPr lang="en-US" dirty="0" smtClean="0"/>
-              <a:t>&amp;</a:t>
-            </a:r>
-            <a:endParaRPr lang="ru-RU" dirty="0" smtClean="0"/>
-          </a:p>
-          <a:p>
-            <a:pPr lvl="1"/>
-            <a:r>
-              <a:rPr lang="en-US" dirty="0" err="1"/>
-              <a:t>xml:space</a:t>
-            </a:r>
-            <a:r>
-              <a:rPr lang="en-US" dirty="0"/>
-              <a:t>="preserve"</a:t>
-            </a:r>
-            <a:endParaRPr lang="en-US" dirty="0" smtClean="0"/>
-          </a:p>
-          <a:p>
-            <a:r>
-              <a:rPr lang="ru-RU" dirty="0" smtClean="0"/>
-              <a:t>Разделяет описание интерфейса от кода</a:t>
-            </a:r>
-          </a:p>
-          <a:p>
-            <a:r>
-              <a:rPr lang="en-US" dirty="0">
-                <a:hlinkClick r:id="rId2"/>
-              </a:rPr>
-              <a:t>http://</a:t>
-            </a:r>
-            <a:r>
-              <a:rPr lang="en-US" dirty="0" smtClean="0">
-                <a:hlinkClick r:id="rId2"/>
-              </a:rPr>
-              <a:t>windowsclient.net/wpf/white-papers/thenewiteration.aspx</a:t>
-            </a:r>
-            <a:endParaRPr lang="ru-RU" dirty="0" smtClean="0"/>
-          </a:p>
-          <a:p>
-            <a:endParaRPr lang="en-US" dirty="0"/>
-          </a:p>
-        </p:txBody>
-      </p:sp>
+      <p:pic>
+        <p:nvPicPr>
+          <p:cNvPr id="2050" name="Picture 2"/>
+          <p:cNvPicPr>
+            <a:picLocks noChangeAspect="1" noChangeArrowheads="1"/>
+          </p:cNvPicPr>
+          <p:nvPr/>
+        </p:nvPicPr>
+        <p:blipFill>
+          <a:blip r:embed="rId2">
+            <a:extLst>
+              <a:ext uri="{28A0092B-C50C-407E-A947-70E740481C1C}">
+                <a14:useLocalDpi xmlns:a14="http://schemas.microsoft.com/office/drawing/2010/main" val="0"/>
+              </a:ext>
+            </a:extLst>
+          </a:blip>
+          <a:srcRect/>
+          <a:stretch>
+            <a:fillRect/>
+          </a:stretch>
+        </p:blipFill>
+        <p:spPr bwMode="auto">
+          <a:xfrm>
+            <a:off x="2094548" y="1515576"/>
+            <a:ext cx="4954905" cy="4937760"/>
+          </a:xfrm>
+          <a:prstGeom prst="rect">
+            <a:avLst/>
+          </a:prstGeom>
+          <a:noFill/>
+          <a:ln>
+            <a:noFill/>
+          </a:ln>
+          <a:effectLst/>
+          <a:extLst>
+            <a:ext uri="{909E8E84-426E-40DD-AFC4-6F175D3DCCD1}">
+              <a14:hiddenFill xmlns:a14="http://schemas.microsoft.com/office/drawing/2010/main">
+                <a:solidFill>
+                  <a:schemeClr val="accent1"/>
+                </a:solidFill>
+              </a14:hiddenFill>
+            </a:ext>
+            <a:ext uri="{91240B29-F687-4F45-9708-019B960494DF}">
+              <a14:hiddenLine xmlns:a14="http://schemas.microsoft.com/office/drawing/2010/main" w="9525">
+                <a:solidFill>
+                  <a:schemeClr val="tx1"/>
+                </a:solidFill>
+                <a:miter lim="800000"/>
+                <a:headEnd/>
+                <a:tailEnd/>
+              </a14:hiddenLine>
+            </a:ext>
+            <a:ext uri="{AF507438-7753-43E0-B8FC-AC1667EBCBE1}">
+              <a14:hiddenEffects xmlns:a14="http://schemas.microsoft.com/office/drawing/2010/main">
+                <a:effectLst>
+                  <a:outerShdw dist="35921" dir="2700000" algn="ctr" rotWithShape="0">
+                    <a:schemeClr val="bg2"/>
+                  </a:outerShdw>
+                </a:effectLst>
+              </a14:hiddenEffects>
+            </a:ext>
+          </a:extLst>
+        </p:spPr>
+      </p:pic>
     </p:spTree>
     <p:extLst>
       <p:ext uri="{BB962C8B-B14F-4D97-AF65-F5344CB8AC3E}">
-        <p14:creationId xmlns:p14="http://schemas.microsoft.com/office/powerpoint/2010/main" val="1758403367"/>
+        <p14:creationId xmlns:p14="http://schemas.microsoft.com/office/powerpoint/2010/main" val="32627630"/>
       </p:ext>
     </p:extLst>
   </p:cSld>
@@ -3508,16 +3515,30 @@
         </p:nvSpPr>
         <p:spPr/>
         <p:txBody>
-          <a:bodyPr/>
+          <a:bodyPr>
+            <a:normAutofit fontScale="90000"/>
+          </a:bodyPr>
           <a:lstStyle/>
           <a:p>
             <a:r>
+              <a:rPr lang="en-US" dirty="0"/>
+              <a:t>Extensible Application Markup </a:t>
+            </a:r>
+            <a:r>
+              <a:rPr lang="en-US" dirty="0" smtClean="0"/>
+              <a:t>Language </a:t>
+            </a:r>
+            <a:r>
               <a:rPr lang="ru-RU" dirty="0" smtClean="0"/>
-              <a:t>Виды </a:t>
-            </a:r>
-            <a:r>
-              <a:rPr lang="en-US" dirty="0" smtClean="0"/>
+              <a:t>(</a:t>
+            </a:r>
+            <a:r>
+              <a:rPr lang="en-US" dirty="0"/>
               <a:t>XAML</a:t>
+            </a:r>
+            <a:r>
+              <a:rPr lang="ru-RU" dirty="0" smtClean="0"/>
+              <a:t>)</a:t>
             </a:r>
             <a:endParaRPr lang="en-US" dirty="0"/>
           </a:p>
@@ -3535,47 +3556,95 @@
         </p:nvSpPr>
         <p:spPr/>
         <p:txBody>
-          <a:bodyPr>
-            <a:normAutofit/>
-          </a:bodyPr>
+          <a:bodyPr/>
           <a:lstStyle/>
           <a:p>
             <a:r>
+              <a:rPr lang="ru-RU" dirty="0" smtClean="0"/>
+              <a:t>Произносится как «</a:t>
+            </a:r>
+            <a:r>
+              <a:rPr lang="en-US" dirty="0" err="1" smtClean="0"/>
+              <a:t>zammel</a:t>
+            </a:r>
+            <a:r>
+              <a:rPr lang="ru-RU" dirty="0" smtClean="0"/>
+              <a:t>»</a:t>
+            </a:r>
+          </a:p>
+          <a:p>
+            <a:r>
+              <a:rPr lang="ru-RU" dirty="0" smtClean="0"/>
+              <a:t>Язык описания </a:t>
+            </a:r>
+            <a:r>
+              <a:rPr lang="en-US" dirty="0" smtClean="0"/>
+              <a:t>UI </a:t>
+            </a:r>
+            <a:r>
+              <a:rPr lang="ru-RU" dirty="0" smtClean="0"/>
+              <a:t>на основе </a:t>
+            </a:r>
+            <a:r>
+              <a:rPr lang="en-US" dirty="0" smtClean="0"/>
+              <a:t>XML</a:t>
+            </a:r>
+            <a:endParaRPr lang="ru-RU" dirty="0" smtClean="0"/>
+          </a:p>
+          <a:p>
+            <a:pPr lvl="1"/>
+            <a:r>
+              <a:rPr lang="ru-RU" dirty="0" smtClean="0"/>
+              <a:t>Использует те же спецсимволы для </a:t>
+            </a:r>
+            <a:r>
+              <a:rPr lang="en-US" dirty="0" smtClean="0"/>
+              <a:t>&lt;, &gt; </a:t>
+            </a:r>
+            <a:r>
+              <a:rPr lang="ru-RU" dirty="0" smtClean="0"/>
+              <a:t>и </a:t>
+            </a:r>
+            <a:r>
+              <a:rPr lang="en-US" dirty="0" smtClean="0"/>
+              <a:t>&amp;</a:t>
+            </a:r>
+            <a:endParaRPr lang="ru-RU" dirty="0" smtClean="0"/>
+          </a:p>
+          <a:p>
+            <a:pPr lvl="1"/>
+            <a:r>
+              <a:rPr lang="en-US" dirty="0" err="1"/>
+              <a:t>xml:space</a:t>
+            </a:r>
+            <a:r>
               <a:rPr lang="en-US" dirty="0"/>
-              <a:t>WPF </a:t>
-            </a:r>
-            <a:r>
-              <a:rPr lang="en-US" dirty="0" smtClean="0"/>
-              <a:t>XAML</a:t>
-            </a:r>
-            <a:endParaRPr lang="en-US" dirty="0"/>
-          </a:p>
-          <a:p>
-            <a:r>
-              <a:rPr lang="en-US" dirty="0"/>
-              <a:t> XPS </a:t>
-            </a:r>
-            <a:r>
-              <a:rPr lang="en-US" dirty="0" smtClean="0"/>
-              <a:t>XAML</a:t>
-            </a:r>
-          </a:p>
-          <a:p>
-            <a:r>
-              <a:rPr lang="en-US" dirty="0" smtClean="0"/>
-              <a:t> Silverlight XAML</a:t>
-            </a:r>
-            <a:endParaRPr lang="en-US" dirty="0"/>
-          </a:p>
-          <a:p>
-            <a:r>
-              <a:rPr lang="en-US" dirty="0"/>
-              <a:t> WF </a:t>
-            </a:r>
-            <a:r>
-              <a:rPr lang="en-US" dirty="0" smtClean="0"/>
-              <a:t>XAML</a:t>
-            </a:r>
+              <a:t>="preserve"</a:t>
+            </a:r>
+            <a:endParaRPr lang="en-US" dirty="0" smtClean="0"/>
+          </a:p>
+          <a:p>
+            <a:r>
+              <a:rPr lang="ru-RU" dirty="0" smtClean="0"/>
+              <a:t>Разделяет описание интерфейса от кода</a:t>
+            </a:r>
+          </a:p>
+          <a:p>
+            <a:r>
+              <a:rPr lang="en-US" dirty="0">
+                <a:hlinkClick r:id="rId2"/>
+              </a:rPr>
+              <a:t>http://</a:t>
+            </a:r>
+            <a:r>
+              <a:rPr lang="en-US" dirty="0" smtClean="0">
+                <a:hlinkClick r:id="rId2"/>
+              </a:rPr>
+              <a:t>windowsclient.net/wpf/white-papers/thenewiteration.aspx</a:t>
+            </a:r>
+            <a:endParaRPr lang="ru-RU" dirty="0" smtClean="0"/>
+          </a:p>
+          <a:p>
             <a:endParaRPr lang="en-US" dirty="0"/>
           </a:p>
         </p:txBody>
@@ -3583,7 +3652,7 @@
     </p:spTree>
     <p:extLst>
       <p:ext uri="{BB962C8B-B14F-4D97-AF65-F5344CB8AC3E}">
-        <p14:creationId xmlns:p14="http://schemas.microsoft.com/office/powerpoint/2010/main" val="3879714524"/>
+        <p14:creationId xmlns:p14="http://schemas.microsoft.com/office/powerpoint/2010/main" val="1758403367"/>
       </p:ext>
     </p:extLst>
   </p:cSld>
@@ -3629,19 +3698,18 @@
         </p:nvSpPr>
         <p:spPr/>
         <p:txBody>
-          <a:bodyPr>
-            <a:normAutofit fontScale="90000"/>
-          </a:bodyPr>
+          <a:bodyPr/>
           <a:lstStyle/>
           <a:p>
             <a:r>
+              <a:rPr lang="ru-RU" dirty="0" smtClean="0"/>
+              <a:t>Виды </a:t>
+            </a:r>
+            <a:r>
               <a:rPr lang="en-US" dirty="0" smtClean="0"/>
-              <a:t>Binary </a:t>
-            </a:r>
-            <a:r>
-              <a:rPr lang="en-US" dirty="0"/>
-              <a:t>Application Markup Language (BAML).</a:t>
-            </a:r>
+              <a:t>XAML</a:t>
+            </a:r>
+            <a:endParaRPr lang="en-US" dirty="0"/>
           </a:p>
         </p:txBody>
       </p:sp>
@@ -3657,30 +3725,46 @@
         </p:nvSpPr>
         <p:spPr/>
         <p:txBody>
-          <a:bodyPr/>
+          <a:bodyPr>
+            <a:normAutofit/>
+          </a:bodyPr>
           <a:lstStyle/>
           <a:p>
             <a:r>
-              <a:rPr lang="ru-RU" dirty="0" smtClean="0"/>
-              <a:t>Компилированая версия </a:t>
+              <a:rPr lang="en-US" dirty="0"/>
+              <a:t>WPF </a:t>
             </a:r>
             <a:r>
               <a:rPr lang="en-US" dirty="0" smtClean="0"/>
               <a:t>XAML</a:t>
             </a:r>
-          </a:p>
-          <a:p>
-            <a:r>
-              <a:rPr lang="ru-RU" dirty="0" smtClean="0"/>
-              <a:t>Хранится </a:t>
-            </a:r>
-            <a:r>
-              <a:rPr lang="ru-RU" smtClean="0"/>
-              <a:t>в ресурсах </a:t>
-            </a:r>
-            <a:r>
-              <a:rPr lang="ru-RU" dirty="0" smtClean="0"/>
-              <a:t>сборки</a:t>
+            <a:endParaRPr lang="en-US" dirty="0"/>
+          </a:p>
+          <a:p>
+            <a:r>
+              <a:rPr lang="en-US" dirty="0"/>
+              <a:t> XPS </a:t>
+            </a:r>
+            <a:r>
+              <a:rPr lang="en-US" dirty="0" smtClean="0"/>
+              <a:t>XAML</a:t>
+            </a:r>
+          </a:p>
+          <a:p>
+            <a:r>
+              <a:rPr lang="en-US" dirty="0" smtClean="0"/>
+              <a:t> Silverlight XAML</a:t>
+            </a:r>
+            <a:endParaRPr lang="en-US" dirty="0"/>
+          </a:p>
+          <a:p>
+            <a:r>
+              <a:rPr lang="en-US" dirty="0"/>
+              <a:t> WF </a:t>
+            </a:r>
+            <a:r>
+              <a:rPr lang="en-US" dirty="0" smtClean="0"/>
+              <a:t>XAML</a:t>
             </a:r>
             <a:endParaRPr lang="en-US" dirty="0"/>
           </a:p>
@@ -3689,7 +3773,7 @@
     </p:spTree>
     <p:extLst>
       <p:ext uri="{BB962C8B-B14F-4D97-AF65-F5344CB8AC3E}">
-        <p14:creationId xmlns:p14="http://schemas.microsoft.com/office/powerpoint/2010/main" val="4123361945"/>
+        <p14:creationId xmlns:p14="http://schemas.microsoft.com/office/powerpoint/2010/main" val="3879714524"/>
       </p:ext>
     </p:extLst>
   </p:cSld>
@@ -3735,18 +3819,19 @@
         </p:nvSpPr>
         <p:spPr/>
         <p:txBody>
-          <a:bodyPr/>
+          <a:bodyPr>
+            <a:normAutofit fontScale="90000"/>
+          </a:bodyPr>
           <a:lstStyle/>
           <a:p>
             <a:r>
-              <a:rPr lang="ru-RU" dirty="0" smtClean="0"/>
-              <a:t>Пример </a:t>
-            </a:r>
-            <a:r>
               <a:rPr lang="en-US" dirty="0" smtClean="0"/>
-              <a:t>XAML</a:t>
-            </a:r>
-            <a:endParaRPr lang="en-US" dirty="0"/>
+              <a:t>Binary </a:t>
+            </a:r>
+            <a:r>
+              <a:rPr lang="en-US" dirty="0"/>
+              <a:t>Application Markup Language (BAML).</a:t>
+            </a:r>
           </a:p>
         </p:txBody>
       </p:sp>
@@ -3760,340 +3845,41 @@
             <p:ph idx="1"/>
           </p:nvPr>
         </p:nvSpPr>
-        <p:spPr>
-          <a:xfrm>
-            <a:off x="457200" y="1600201"/>
-            <a:ext cx="8229600" cy="2620888"/>
-          </a:xfrm>
-        </p:spPr>
+        <p:spPr/>
         <p:txBody>
-          <a:bodyPr>
-            <a:normAutofit/>
-          </a:bodyPr>
+          <a:bodyPr/>
           <a:lstStyle/>
           <a:p>
-            <a:pPr marL="0" indent="0">
-              <a:buNone/>
-            </a:pPr>
-            <a:r>
-              <a:rPr lang="en-US" sz="1400" dirty="0" smtClean="0">
-                <a:latin typeface="Courier New" pitchFamily="49" charset="0"/>
-                <a:cs typeface="Courier New" pitchFamily="49" charset="0"/>
-              </a:rPr>
-              <a:t>&lt;Window</a:t>
-            </a:r>
-            <a:br>
-              <a:rPr lang="en-US" sz="1400" dirty="0" smtClean="0">
-                <a:latin typeface="Courier New" pitchFamily="49" charset="0"/>
-                <a:cs typeface="Courier New" pitchFamily="49" charset="0"/>
-              </a:rPr>
-            </a:br>
-            <a:r>
-              <a:rPr lang="en-US" sz="1400" dirty="0" smtClean="0">
-                <a:latin typeface="Courier New" pitchFamily="49" charset="0"/>
-                <a:cs typeface="Courier New" pitchFamily="49" charset="0"/>
-              </a:rPr>
-              <a:t>     x:Class=“</a:t>
-            </a:r>
-            <a:r>
-              <a:rPr lang="en-US" sz="1400" dirty="0" smtClean="0">
-                <a:solidFill>
-                  <a:srgbClr val="FFFF00"/>
-                </a:solidFill>
-                <a:latin typeface="Courier New" pitchFamily="49" charset="0"/>
-                <a:cs typeface="Courier New" pitchFamily="49" charset="0"/>
-              </a:rPr>
-              <a:t>WindowsApplication1.Window1</a:t>
-            </a:r>
-            <a:r>
-              <a:rPr lang="en-US" sz="1400" dirty="0" smtClean="0">
-                <a:latin typeface="Courier New" pitchFamily="49" charset="0"/>
-                <a:cs typeface="Courier New" pitchFamily="49" charset="0"/>
-              </a:rPr>
-              <a:t>”</a:t>
-            </a:r>
-            <a:br>
-              <a:rPr lang="en-US" sz="1400" dirty="0" smtClean="0">
-                <a:latin typeface="Courier New" pitchFamily="49" charset="0"/>
-                <a:cs typeface="Courier New" pitchFamily="49" charset="0"/>
-              </a:rPr>
-            </a:br>
-            <a:r>
-              <a:rPr lang="en-US" sz="1400" dirty="0" smtClean="0">
-                <a:latin typeface="Courier New" pitchFamily="49" charset="0"/>
-                <a:cs typeface="Courier New" pitchFamily="49" charset="0"/>
-              </a:rPr>
-              <a:t>     </a:t>
-            </a:r>
-            <a:r>
-              <a:rPr lang="en-US" sz="1400" dirty="0" err="1" smtClean="0">
-                <a:latin typeface="Courier New" pitchFamily="49" charset="0"/>
-                <a:cs typeface="Courier New" pitchFamily="49" charset="0"/>
-              </a:rPr>
-              <a:t>xmlns</a:t>
-            </a:r>
-            <a:r>
-              <a:rPr lang="en-US" sz="1400" dirty="0" smtClean="0">
-                <a:latin typeface="Courier New" pitchFamily="49" charset="0"/>
-                <a:cs typeface="Courier New" pitchFamily="49" charset="0"/>
-              </a:rPr>
-              <a:t>=“http</a:t>
-            </a:r>
-            <a:r>
-              <a:rPr lang="en-US" sz="1400" dirty="0">
-                <a:latin typeface="Courier New" pitchFamily="49" charset="0"/>
-                <a:cs typeface="Courier New" pitchFamily="49" charset="0"/>
-              </a:rPr>
-              <a:t>://</a:t>
-            </a:r>
-            <a:r>
-              <a:rPr lang="en-US" sz="1400" dirty="0" smtClean="0">
-                <a:latin typeface="Courier New" pitchFamily="49" charset="0"/>
-                <a:cs typeface="Courier New" pitchFamily="49" charset="0"/>
-              </a:rPr>
-              <a:t>schemas.microsoft.com/</a:t>
-            </a:r>
-            <a:r>
-              <a:rPr lang="en-US" sz="1400" dirty="0" err="1" smtClean="0">
-                <a:latin typeface="Courier New" pitchFamily="49" charset="0"/>
-                <a:cs typeface="Courier New" pitchFamily="49" charset="0"/>
-              </a:rPr>
-              <a:t>winfx</a:t>
-            </a:r>
-            <a:r>
-              <a:rPr lang="en-US" sz="1400" dirty="0" smtClean="0">
-                <a:latin typeface="Courier New" pitchFamily="49" charset="0"/>
-                <a:cs typeface="Courier New" pitchFamily="49" charset="0"/>
-              </a:rPr>
-              <a:t>/2006/</a:t>
-            </a:r>
-            <a:r>
-              <a:rPr lang="en-US" sz="1400" dirty="0" err="1" smtClean="0">
-                <a:latin typeface="Courier New" pitchFamily="49" charset="0"/>
-                <a:cs typeface="Courier New" pitchFamily="49" charset="0"/>
-              </a:rPr>
-              <a:t>xaml</a:t>
-            </a:r>
-            <a:r>
-              <a:rPr lang="en-US" sz="1400" dirty="0" smtClean="0">
-                <a:latin typeface="Courier New" pitchFamily="49" charset="0"/>
-                <a:cs typeface="Courier New" pitchFamily="49" charset="0"/>
-              </a:rPr>
-              <a:t>/presentation”</a:t>
-            </a:r>
-            <a:br>
-              <a:rPr lang="en-US" sz="1400" dirty="0" smtClean="0">
-                <a:latin typeface="Courier New" pitchFamily="49" charset="0"/>
-                <a:cs typeface="Courier New" pitchFamily="49" charset="0"/>
-              </a:rPr>
-            </a:br>
-            <a:r>
-              <a:rPr lang="en-US" sz="1400" dirty="0" smtClean="0">
-                <a:latin typeface="Courier New" pitchFamily="49" charset="0"/>
-                <a:cs typeface="Courier New" pitchFamily="49" charset="0"/>
-              </a:rPr>
-              <a:t>     </a:t>
-            </a:r>
-            <a:r>
-              <a:rPr lang="en-US" sz="1400" dirty="0" err="1" smtClean="0">
-                <a:latin typeface="Courier New" pitchFamily="49" charset="0"/>
-                <a:cs typeface="Courier New" pitchFamily="49" charset="0"/>
-              </a:rPr>
-              <a:t>xmlns:x</a:t>
-            </a:r>
-            <a:r>
-              <a:rPr lang="en-US" sz="1400" dirty="0" smtClean="0">
-                <a:latin typeface="Courier New" pitchFamily="49" charset="0"/>
-                <a:cs typeface="Courier New" pitchFamily="49" charset="0"/>
-              </a:rPr>
-              <a:t>=“http</a:t>
-            </a:r>
-            <a:r>
-              <a:rPr lang="en-US" sz="1400" dirty="0">
-                <a:latin typeface="Courier New" pitchFamily="49" charset="0"/>
-                <a:cs typeface="Courier New" pitchFamily="49" charset="0"/>
-              </a:rPr>
-              <a:t>://</a:t>
-            </a:r>
-            <a:r>
-              <a:rPr lang="en-US" sz="1400" dirty="0" smtClean="0">
-                <a:latin typeface="Courier New" pitchFamily="49" charset="0"/>
-                <a:cs typeface="Courier New" pitchFamily="49" charset="0"/>
-              </a:rPr>
-              <a:t>schemas.microsoft.com/</a:t>
-            </a:r>
-            <a:r>
-              <a:rPr lang="en-US" sz="1400" dirty="0" err="1" smtClean="0">
-                <a:latin typeface="Courier New" pitchFamily="49" charset="0"/>
-                <a:cs typeface="Courier New" pitchFamily="49" charset="0"/>
-              </a:rPr>
-              <a:t>winfx</a:t>
-            </a:r>
-            <a:r>
-              <a:rPr lang="en-US" sz="1400" dirty="0" smtClean="0">
-                <a:latin typeface="Courier New" pitchFamily="49" charset="0"/>
-                <a:cs typeface="Courier New" pitchFamily="49" charset="0"/>
-              </a:rPr>
-              <a:t>/2006/</a:t>
-            </a:r>
-            <a:r>
-              <a:rPr lang="en-US" sz="1400" dirty="0" err="1" smtClean="0">
-                <a:latin typeface="Courier New" pitchFamily="49" charset="0"/>
-                <a:cs typeface="Courier New" pitchFamily="49" charset="0"/>
-              </a:rPr>
-              <a:t>xaml</a:t>
-            </a:r>
-            <a:r>
-              <a:rPr lang="en-US" sz="1400" dirty="0" smtClean="0">
-                <a:latin typeface="Courier New" pitchFamily="49" charset="0"/>
-                <a:cs typeface="Courier New" pitchFamily="49" charset="0"/>
-              </a:rPr>
-              <a:t>”</a:t>
-            </a:r>
-            <a:endParaRPr lang="en-US" sz="1400" dirty="0">
-              <a:latin typeface="Courier New" pitchFamily="49" charset="0"/>
-              <a:cs typeface="Courier New" pitchFamily="49" charset="0"/>
-            </a:endParaRPr>
-          </a:p>
-          <a:p>
-            <a:pPr marL="0" indent="0">
-              <a:buNone/>
-            </a:pPr>
-            <a:r>
-              <a:rPr lang="en-US" sz="1400" dirty="0" smtClean="0">
-                <a:latin typeface="Courier New" pitchFamily="49" charset="0"/>
-                <a:cs typeface="Courier New" pitchFamily="49" charset="0"/>
-              </a:rPr>
-              <a:t>     Title=“Window1”</a:t>
-            </a:r>
-          </a:p>
-          <a:p>
-            <a:pPr marL="0" indent="0">
-              <a:buNone/>
-            </a:pPr>
-            <a:r>
-              <a:rPr lang="en-US" sz="1400" dirty="0">
-                <a:latin typeface="Courier New" pitchFamily="49" charset="0"/>
-                <a:cs typeface="Courier New" pitchFamily="49" charset="0"/>
-              </a:rPr>
-              <a:t> </a:t>
-            </a:r>
-            <a:r>
-              <a:rPr lang="en-US" sz="1400" dirty="0" smtClean="0">
-                <a:latin typeface="Courier New" pitchFamily="49" charset="0"/>
-                <a:cs typeface="Courier New" pitchFamily="49" charset="0"/>
-              </a:rPr>
-              <a:t>    Height=“300” Width=“300”</a:t>
-            </a:r>
-          </a:p>
-          <a:p>
-            <a:pPr marL="0" indent="0">
-              <a:buNone/>
-            </a:pPr>
-            <a:r>
-              <a:rPr lang="en-US" sz="1400" dirty="0" smtClean="0">
-                <a:latin typeface="Courier New" pitchFamily="49" charset="0"/>
-                <a:cs typeface="Courier New" pitchFamily="49" charset="0"/>
-              </a:rPr>
-              <a:t>&gt;</a:t>
-            </a:r>
-            <a:endParaRPr lang="en-US" sz="1400" dirty="0">
-              <a:latin typeface="Courier New" pitchFamily="49" charset="0"/>
-              <a:cs typeface="Courier New" pitchFamily="49" charset="0"/>
-            </a:endParaRPr>
-          </a:p>
-          <a:p>
-            <a:pPr marL="0" indent="0">
-              <a:buNone/>
-            </a:pPr>
-            <a:r>
-              <a:rPr lang="en-US" sz="1400" dirty="0" smtClean="0">
-                <a:latin typeface="Courier New" pitchFamily="49" charset="0"/>
-                <a:cs typeface="Courier New" pitchFamily="49" charset="0"/>
-              </a:rPr>
-              <a:t>  &lt;</a:t>
-            </a:r>
-            <a:r>
-              <a:rPr lang="en-US" sz="1400" dirty="0">
-                <a:latin typeface="Courier New" pitchFamily="49" charset="0"/>
-                <a:cs typeface="Courier New" pitchFamily="49" charset="0"/>
-              </a:rPr>
-              <a:t>Grid&gt;</a:t>
-            </a:r>
-          </a:p>
-          <a:p>
-            <a:pPr marL="0" indent="0">
-              <a:buNone/>
-            </a:pPr>
-            <a:r>
-              <a:rPr lang="en-US" sz="1400" dirty="0" smtClean="0">
-                <a:latin typeface="Courier New" pitchFamily="49" charset="0"/>
-                <a:cs typeface="Courier New" pitchFamily="49" charset="0"/>
-              </a:rPr>
-              <a:t>  &lt;/</a:t>
-            </a:r>
-            <a:r>
-              <a:rPr lang="en-US" sz="1400" dirty="0">
-                <a:latin typeface="Courier New" pitchFamily="49" charset="0"/>
-                <a:cs typeface="Courier New" pitchFamily="49" charset="0"/>
-              </a:rPr>
-              <a:t>Grid&gt;</a:t>
-            </a:r>
-          </a:p>
-          <a:p>
-            <a:pPr marL="0" indent="0">
-              <a:buNone/>
-            </a:pPr>
-            <a:r>
-              <a:rPr lang="en-US" sz="1400" dirty="0" smtClean="0">
-                <a:latin typeface="Courier New" pitchFamily="49" charset="0"/>
-                <a:cs typeface="Courier New" pitchFamily="49" charset="0"/>
-              </a:rPr>
-              <a:t>&lt;/</a:t>
-            </a:r>
-            <a:r>
-              <a:rPr lang="en-US" sz="1400" dirty="0">
-                <a:latin typeface="Courier New" pitchFamily="49" charset="0"/>
-                <a:cs typeface="Courier New" pitchFamily="49" charset="0"/>
-              </a:rPr>
-              <a:t>Window&gt;</a:t>
-            </a:r>
-          </a:p>
-        </p:txBody>
-      </p:sp>
-      <p:sp>
-        <p:nvSpPr>
-          <p:cNvPr id="4" name="TextBox 3"/>
-          <p:cNvSpPr txBox="1"/>
-          <p:nvPr/>
-        </p:nvSpPr>
-        <p:spPr>
-          <a:xfrm>
-            <a:off x="107504" y="4951413"/>
-            <a:ext cx="8928992" cy="584775"/>
-          </a:xfrm>
-          <a:prstGeom prst="rect">
-            <a:avLst/>
-          </a:prstGeom>
-          <a:noFill/>
-        </p:spPr>
-        <p:txBody>
-          <a:bodyPr wrap="square" rtlCol="0">
-            <a:spAutoFit/>
-          </a:bodyPr>
-          <a:lstStyle/>
-          <a:p>
-            <a:r>
-              <a:rPr lang="en-US" sz="3200" dirty="0" smtClean="0"/>
-              <a:t>Window, Page, Application</a:t>
-            </a:r>
+            <a:r>
+              <a:rPr lang="ru-RU" dirty="0" smtClean="0"/>
+              <a:t>Компилированая версия </a:t>
+            </a:r>
+            <a:r>
+              <a:rPr lang="en-US" dirty="0" smtClean="0"/>
+              <a:t>XAML</a:t>
+            </a:r>
+          </a:p>
+          <a:p>
+            <a:r>
+              <a:rPr lang="ru-RU" dirty="0" smtClean="0"/>
+              <a:t>Хранится </a:t>
+            </a:r>
+            <a:r>
+              <a:rPr lang="ru-RU" smtClean="0"/>
+              <a:t>в ресурсах </a:t>
+            </a:r>
+            <a:r>
+              <a:rPr lang="ru-RU" dirty="0" smtClean="0"/>
+              <a:t>сборки</a:t>
+            </a:r>
+            <a:endParaRPr lang="en-US" dirty="0"/>
           </a:p>
         </p:txBody>
       </p:sp>
     </p:spTree>
     <p:extLst>
       <p:ext uri="{BB962C8B-B14F-4D97-AF65-F5344CB8AC3E}">
-        <p14:creationId xmlns:p14="http://schemas.microsoft.com/office/powerpoint/2010/main" val="1148772594"/>
+        <p14:creationId xmlns:p14="http://schemas.microsoft.com/office/powerpoint/2010/main" val="4123361945"/>
       </p:ext>
     </p:extLst>
   </p:cSld>
@@ -4144,7 +3930,11 @@
           <a:p>
             <a:r>
               <a:rPr lang="ru-RU" dirty="0" smtClean="0"/>
-              <a:t>Свойства</a:t>
+              <a:t>Пример </a:t>
+            </a:r>
+            <a:r>
+              <a:rPr lang="en-US" dirty="0" smtClean="0"/>
+              <a:t>XAML</a:t>
             </a:r>
             <a:endParaRPr lang="en-US" dirty="0"/>
           </a:p>
@@ -4160,192 +3950,340 @@
             <p:ph idx="1"/>
           </p:nvPr>
         </p:nvSpPr>
-        <p:spPr/>
+        <p:spPr>
+          <a:xfrm>
+            <a:off x="457200" y="1600201"/>
+            <a:ext cx="8229600" cy="2620888"/>
+          </a:xfrm>
+        </p:spPr>
         <p:txBody>
           <a:bodyPr>
-            <a:normAutofit fontScale="70000" lnSpcReduction="20000"/>
+            <a:normAutofit/>
           </a:bodyPr>
           <a:lstStyle/>
           <a:p>
-            <a:r>
-              <a:rPr lang="en-US" dirty="0"/>
-              <a:t>Simple Properties and Type </a:t>
-            </a:r>
-            <a:r>
-              <a:rPr lang="en-US" dirty="0" smtClean="0"/>
-              <a:t>Converters</a:t>
-            </a:r>
-            <a:endParaRPr lang="ru-RU" dirty="0" smtClean="0"/>
-          </a:p>
-          <a:p>
-            <a:pPr lvl="1"/>
-            <a:r>
-              <a:rPr lang="en-US" dirty="0" err="1" smtClean="0"/>
-              <a:t>TypeConverter</a:t>
-            </a:r>
-            <a:r>
-              <a:rPr lang="en-US" dirty="0" smtClean="0"/>
-              <a:t>(</a:t>
-            </a:r>
-            <a:r>
-              <a:rPr lang="en-US" dirty="0" err="1" smtClean="0"/>
-              <a:t>typeof</a:t>
-            </a:r>
-            <a:r>
-              <a:rPr lang="en-US" dirty="0" smtClean="0"/>
-              <a:t>(</a:t>
-            </a:r>
-            <a:r>
-              <a:rPr lang="ru-RU" dirty="0" smtClean="0"/>
-              <a:t>ИмяТипа</a:t>
-            </a:r>
-            <a:r>
-              <a:rPr lang="en-US" dirty="0" smtClean="0"/>
-              <a:t>))</a:t>
-            </a:r>
-            <a:endParaRPr lang="ru-RU" dirty="0" smtClean="0"/>
-          </a:p>
-          <a:p>
-            <a:r>
-              <a:rPr lang="en-US" dirty="0"/>
-              <a:t>Complex </a:t>
-            </a:r>
-            <a:r>
-              <a:rPr lang="en-US" dirty="0" smtClean="0"/>
-              <a:t>Properties</a:t>
-            </a:r>
-            <a:r>
-              <a:rPr lang="ru-RU" dirty="0" smtClean="0"/>
+            <a:pPr marL="0" indent="0">
+              <a:buNone/>
+            </a:pPr>
+            <a:r>
+              <a:rPr lang="en-US" sz="1400" dirty="0" smtClean="0">
+                <a:latin typeface="Courier New" pitchFamily="49" charset="0"/>
+                <a:cs typeface="Courier New" pitchFamily="49" charset="0"/>
+              </a:rPr>
+              <a:t>&lt;Window</a:t>
+            </a:r>
+            <a:br>
+              <a:rPr lang="en-US" sz="1400" dirty="0" smtClean="0">
+                <a:latin typeface="Courier New" pitchFamily="49" charset="0"/>
+                <a:cs typeface="Courier New" pitchFamily="49" charset="0"/>
+              </a:rPr>
+            </a:br>
+            <a:r>
+              <a:rPr lang="en-US" sz="1400" dirty="0" smtClean="0">
+                <a:latin typeface="Courier New" pitchFamily="49" charset="0"/>
+                <a:cs typeface="Courier New" pitchFamily="49" charset="0"/>
+              </a:rPr>
+              <a:t>     x:Class=“</a:t>
+            </a:r>
+            <a:r>
+              <a:rPr lang="en-US" sz="1400" dirty="0" smtClean="0">
+                <a:solidFill>
+                  <a:srgbClr val="FFFF00"/>
+                </a:solidFill>
+                <a:latin typeface="Courier New" pitchFamily="49" charset="0"/>
+                <a:cs typeface="Courier New" pitchFamily="49" charset="0"/>
+              </a:rPr>
+              <a:t>WindowsApplication1.Window1</a:t>
+            </a:r>
+            <a:r>
+              <a:rPr lang="en-US" sz="1400" dirty="0" smtClean="0">
+                <a:latin typeface="Courier New" pitchFamily="49" charset="0"/>
+                <a:cs typeface="Courier New" pitchFamily="49" charset="0"/>
+              </a:rPr>
+              <a:t>”</a:t>
+            </a:r>
+            <a:br>
+              <a:rPr lang="en-US" sz="1400" dirty="0" smtClean="0">
+                <a:latin typeface="Courier New" pitchFamily="49" charset="0"/>
+                <a:cs typeface="Courier New" pitchFamily="49" charset="0"/>
+              </a:rPr>
+            </a:br>
+            <a:r>
+              <a:rPr lang="en-US" sz="1400" dirty="0" smtClean="0">
+                <a:latin typeface="Courier New" pitchFamily="49" charset="0"/>
+                <a:cs typeface="Courier New" pitchFamily="49" charset="0"/>
+              </a:rPr>
+              <a:t>     </a:t>
+            </a:r>
+            <a:r>
+              <a:rPr lang="en-US" sz="1400" dirty="0" err="1" smtClean="0">
+                <a:latin typeface="Courier New" pitchFamily="49" charset="0"/>
+                <a:cs typeface="Courier New" pitchFamily="49" charset="0"/>
+              </a:rPr>
+              <a:t>xmlns</a:t>
+            </a:r>
+            <a:r>
+              <a:rPr lang="en-US" sz="1400" dirty="0" smtClean="0">
+                <a:latin typeface="Courier New" pitchFamily="49" charset="0"/>
+                <a:cs typeface="Courier New" pitchFamily="49" charset="0"/>
+              </a:rPr>
+              <a:t>=“http</a:t>
+            </a:r>
+            <a:r>
+              <a:rPr lang="en-US" sz="1400" dirty="0">
+                <a:latin typeface="Courier New" pitchFamily="49" charset="0"/>
+                <a:cs typeface="Courier New" pitchFamily="49" charset="0"/>
+              </a:rPr>
+              <a:t>://</a:t>
+            </a:r>
+            <a:r>
+              <a:rPr lang="en-US" sz="1400" dirty="0" smtClean="0">
+                <a:latin typeface="Courier New" pitchFamily="49" charset="0"/>
+                <a:cs typeface="Courier New" pitchFamily="49" charset="0"/>
+              </a:rPr>
+              <a:t>schemas.microsoft.com/</a:t>
+            </a:r>
+            <a:r>
+              <a:rPr lang="en-US" sz="1400" dirty="0" err="1" smtClean="0">
+                <a:latin typeface="Courier New" pitchFamily="49" charset="0"/>
+                <a:cs typeface="Courier New" pitchFamily="49" charset="0"/>
+              </a:rPr>
+              <a:t>winfx</a:t>
+            </a:r>
+            <a:r>
+              <a:rPr lang="en-US" sz="1400" dirty="0" smtClean="0">
+                <a:latin typeface="Courier New" pitchFamily="49" charset="0"/>
+                <a:cs typeface="Courier New" pitchFamily="49" charset="0"/>
+              </a:rPr>
+              <a:t>/2006/</a:t>
+            </a:r>
+            <a:r>
+              <a:rPr lang="en-US" sz="1400" dirty="0" err="1" smtClean="0">
+                <a:latin typeface="Courier New" pitchFamily="49" charset="0"/>
+                <a:cs typeface="Courier New" pitchFamily="49" charset="0"/>
+              </a:rPr>
+              <a:t>xaml</a:t>
+            </a:r>
+            <a:r>
+              <a:rPr lang="en-US" sz="1400" dirty="0" smtClean="0">
+                <a:latin typeface="Courier New" pitchFamily="49" charset="0"/>
+                <a:cs typeface="Courier New" pitchFamily="49" charset="0"/>
+              </a:rPr>
+              <a:t>/presentation”</a:t>
+            </a:r>
+            <a:br>
+              <a:rPr lang="en-US" sz="1400" dirty="0" smtClean="0">
+                <a:latin typeface="Courier New" pitchFamily="49" charset="0"/>
+                <a:cs typeface="Courier New" pitchFamily="49" charset="0"/>
+              </a:rPr>
+            </a:br>
+            <a:r>
+              <a:rPr lang="en-US" sz="1400" dirty="0" smtClean="0">
+                <a:latin typeface="Courier New" pitchFamily="49" charset="0"/>
+                <a:cs typeface="Courier New" pitchFamily="49" charset="0"/>
+              </a:rPr>
+              <a:t>     </a:t>
+            </a:r>
+            <a:r>
+              <a:rPr lang="en-US" sz="1400" dirty="0" err="1" smtClean="0">
+                <a:latin typeface="Courier New" pitchFamily="49" charset="0"/>
+                <a:cs typeface="Courier New" pitchFamily="49" charset="0"/>
+              </a:rPr>
+              <a:t>xmlns:x</a:t>
+            </a:r>
+            <a:r>
+              <a:rPr lang="en-US" sz="1400" dirty="0" smtClean="0">
+                <a:latin typeface="Courier New" pitchFamily="49" charset="0"/>
+                <a:cs typeface="Courier New" pitchFamily="49" charset="0"/>
+              </a:rPr>
+              <a:t>=“http</a:t>
+            </a:r>
+            <a:r>
+              <a:rPr lang="en-US" sz="1400" dirty="0">
+                <a:latin typeface="Courier New" pitchFamily="49" charset="0"/>
+                <a:cs typeface="Courier New" pitchFamily="49" charset="0"/>
+              </a:rPr>
+              <a:t>://</a:t>
+            </a:r>
+            <a:r>
+              <a:rPr lang="en-US" sz="1400" dirty="0" smtClean="0">
+                <a:latin typeface="Courier New" pitchFamily="49" charset="0"/>
+                <a:cs typeface="Courier New" pitchFamily="49" charset="0"/>
+              </a:rPr>
+              <a:t>schemas.microsoft.com/</a:t>
+            </a:r>
+            <a:r>
+              <a:rPr lang="en-US" sz="1400" dirty="0" err="1" smtClean="0">
+                <a:latin typeface="Courier New" pitchFamily="49" charset="0"/>
+                <a:cs typeface="Courier New" pitchFamily="49" charset="0"/>
+              </a:rPr>
+              <a:t>winfx</a:t>
+            </a:r>
+            <a:r>
+              <a:rPr lang="en-US" sz="1400" dirty="0" smtClean="0">
+                <a:latin typeface="Courier New" pitchFamily="49" charset="0"/>
+                <a:cs typeface="Courier New" pitchFamily="49" charset="0"/>
+              </a:rPr>
+              <a:t>/2006/</a:t>
+            </a:r>
+            <a:r>
+              <a:rPr lang="en-US" sz="1400" dirty="0" err="1" smtClean="0">
+                <a:latin typeface="Courier New" pitchFamily="49" charset="0"/>
+                <a:cs typeface="Courier New" pitchFamily="49" charset="0"/>
+              </a:rPr>
+              <a:t>xaml</a:t>
+            </a:r>
+            <a:r>
+              <a:rPr lang="en-US" sz="1400" dirty="0" smtClean="0">
+                <a:latin typeface="Courier New" pitchFamily="49" charset="0"/>
+                <a:cs typeface="Courier New" pitchFamily="49" charset="0"/>
+              </a:rPr>
+              <a:t>”</a:t>
+            </a:r>
+            <a:endParaRPr lang="en-US" sz="1400" dirty="0">
+              <a:latin typeface="Courier New" pitchFamily="49" charset="0"/>
+              <a:cs typeface="Courier New" pitchFamily="49" charset="0"/>
+            </a:endParaRPr>
+          </a:p>
+          <a:p>
+            <a:pPr marL="0" indent="0">
+              <a:buNone/>
+            </a:pPr>
+            <a:r>
+              <a:rPr lang="en-US" sz="1400" dirty="0" smtClean="0">
+                <a:latin typeface="Courier New" pitchFamily="49" charset="0"/>
+                <a:cs typeface="Courier New" pitchFamily="49" charset="0"/>
+              </a:rPr>
+              <a:t>     Title=“Window1”</a:t>
+            </a:r>
+          </a:p>
+          <a:p>
+            <a:pPr marL="0" indent="0">
+              <a:buNone/>
+            </a:pPr>
+            <a:r>
+              <a:rPr lang="en-US" sz="1400" dirty="0">
+                <a:latin typeface="Courier New" pitchFamily="49" charset="0"/>
+                <a:cs typeface="Courier New" pitchFamily="49" charset="0"/>
+              </a:rPr>
               <a:t> </a:t>
             </a:r>
             <a:r>
-              <a:rPr lang="en-US" dirty="0"/>
-              <a:t>and property-element </a:t>
-            </a:r>
-            <a:r>
-              <a:rPr lang="en-US" dirty="0" smtClean="0"/>
-              <a:t>syntax</a:t>
-            </a:r>
-          </a:p>
-          <a:p>
-            <a:pPr lvl="1"/>
-            <a:r>
-              <a:rPr lang="en-US" dirty="0" err="1" smtClean="0"/>
-              <a:t>EightBall</a:t>
-            </a:r>
-            <a:r>
-              <a:rPr lang="en-US" dirty="0" smtClean="0"/>
-              <a:t> demo (Chapter02)</a:t>
-            </a:r>
-          </a:p>
-          <a:p>
-            <a:r>
-              <a:rPr lang="en-US" dirty="0"/>
-              <a:t>Markup </a:t>
-            </a:r>
-            <a:r>
-              <a:rPr lang="en-US" dirty="0" smtClean="0"/>
-              <a:t>Extensions</a:t>
-            </a:r>
-          </a:p>
-          <a:p>
-            <a:pPr lvl="1"/>
-            <a:r>
-              <a:rPr lang="ru-RU" dirty="0" smtClean="0"/>
-              <a:t>Для ссылок на другие объекты или для подстановки динамических значений</a:t>
-            </a:r>
-          </a:p>
-          <a:p>
-            <a:pPr lvl="1"/>
-            <a:r>
-              <a:rPr lang="en-US" dirty="0"/>
-              <a:t>&lt;Button ... Foreground="{</a:t>
-            </a:r>
-            <a:r>
-              <a:rPr lang="en-US" dirty="0" err="1"/>
-              <a:t>x:Static</a:t>
-            </a:r>
-            <a:r>
-              <a:rPr lang="en-US" dirty="0"/>
-              <a:t> </a:t>
-            </a:r>
-            <a:r>
-              <a:rPr lang="en-US" dirty="0" err="1"/>
-              <a:t>SystemColors.ActiveCaptionBrush</a:t>
-            </a:r>
-            <a:r>
-              <a:rPr lang="en-US" dirty="0"/>
-              <a:t>}" &gt;</a:t>
-            </a:r>
-            <a:endParaRPr lang="ru-RU" dirty="0" smtClean="0"/>
-          </a:p>
-          <a:p>
-            <a:pPr lvl="1"/>
-            <a:r>
-              <a:rPr lang="en-US" dirty="0" err="1" smtClean="0"/>
-              <a:t>System.Windows.Markup.MarkupExtension</a:t>
-            </a:r>
-            <a:endParaRPr lang="ru-RU" dirty="0" smtClean="0"/>
-          </a:p>
-          <a:p>
-            <a:r>
-              <a:rPr lang="en-US" dirty="0" smtClean="0"/>
-              <a:t>Attached properties</a:t>
-            </a:r>
-          </a:p>
-          <a:p>
-            <a:pPr lvl="1"/>
-            <a:r>
-              <a:rPr lang="en-US" dirty="0"/>
-              <a:t>&lt;</a:t>
-            </a:r>
-            <a:r>
-              <a:rPr lang="en-US" dirty="0" err="1"/>
-              <a:t>TextBox</a:t>
-            </a:r>
-            <a:r>
-              <a:rPr lang="en-US" dirty="0"/>
-              <a:t> ... </a:t>
-            </a:r>
-            <a:r>
-              <a:rPr lang="en-US" dirty="0" err="1"/>
-              <a:t>Grid.Row</a:t>
-            </a:r>
-            <a:r>
-              <a:rPr lang="en-US" dirty="0"/>
-              <a:t>="0</a:t>
-            </a:r>
-            <a:r>
-              <a:rPr lang="en-US" dirty="0" smtClean="0"/>
-              <a:t>"&gt;</a:t>
-            </a:r>
-          </a:p>
-          <a:p>
-            <a:pPr lvl="1"/>
-            <a:r>
-              <a:rPr lang="ru-RU" dirty="0" smtClean="0"/>
-              <a:t>Транслируются в вызовы методов </a:t>
-            </a:r>
-            <a:r>
-              <a:rPr lang="en-US" dirty="0" err="1"/>
-              <a:t>DefiningType.SetPropertyName</a:t>
-            </a:r>
-            <a:r>
-              <a:rPr lang="en-US" dirty="0"/>
-              <a:t>()</a:t>
-            </a:r>
-            <a:endParaRPr lang="ru-RU" dirty="0" smtClean="0"/>
-          </a:p>
-          <a:p>
-            <a:pPr lvl="1"/>
-            <a:endParaRPr lang="en-US" dirty="0"/>
+              <a:rPr lang="en-US" sz="1400" dirty="0" smtClean="0">
+                <a:latin typeface="Courier New" pitchFamily="49" charset="0"/>
+                <a:cs typeface="Courier New" pitchFamily="49" charset="0"/>
+              </a:rPr>
+              <a:t>    Height=“300” Width=“300”</a:t>
+            </a:r>
+          </a:p>
+          <a:p>
+            <a:pPr marL="0" indent="0">
+              <a:buNone/>
+            </a:pPr>
+            <a:r>
+              <a:rPr lang="en-US" sz="1400" dirty="0" smtClean="0">
+                <a:latin typeface="Courier New" pitchFamily="49" charset="0"/>
+                <a:cs typeface="Courier New" pitchFamily="49" charset="0"/>
+              </a:rPr>
+              <a:t>&gt;</a:t>
+            </a:r>
+            <a:endParaRPr lang="en-US" sz="1400" dirty="0">
+              <a:latin typeface="Courier New" pitchFamily="49" charset="0"/>
+              <a:cs typeface="Courier New" pitchFamily="49" charset="0"/>
+            </a:endParaRPr>
+          </a:p>
+          <a:p>
+            <a:pPr marL="0" indent="0">
+              <a:buNone/>
+            </a:pPr>
+            <a:r>
+              <a:rPr lang="en-US" sz="1400" dirty="0" smtClean="0">
+                <a:latin typeface="Courier New" pitchFamily="49" charset="0"/>
+                <a:cs typeface="Courier New" pitchFamily="49" charset="0"/>
+              </a:rPr>
+              <a:t>  &lt;</a:t>
+            </a:r>
+            <a:r>
+              <a:rPr lang="en-US" sz="1400" dirty="0">
+                <a:latin typeface="Courier New" pitchFamily="49" charset="0"/>
+                <a:cs typeface="Courier New" pitchFamily="49" charset="0"/>
+              </a:rPr>
+              <a:t>Grid&gt;</a:t>
+            </a:r>
+          </a:p>
+          <a:p>
+            <a:pPr marL="0" indent="0">
+              <a:buNone/>
+            </a:pPr>
+            <a:r>
+              <a:rPr lang="en-US" sz="1400" dirty="0" smtClean="0">
+                <a:latin typeface="Courier New" pitchFamily="49" charset="0"/>
+                <a:cs typeface="Courier New" pitchFamily="49" charset="0"/>
+              </a:rPr>
+              <a:t>  &lt;/</a:t>
+            </a:r>
+            <a:r>
+              <a:rPr lang="en-US" sz="1400" dirty="0">
+                <a:latin typeface="Courier New" pitchFamily="49" charset="0"/>
+                <a:cs typeface="Courier New" pitchFamily="49" charset="0"/>
+              </a:rPr>
+              <a:t>Grid&gt;</a:t>
+            </a:r>
+          </a:p>
+          <a:p>
+            <a:pPr marL="0" indent="0">
+              <a:buNone/>
+            </a:pPr>
+            <a:r>
+              <a:rPr lang="en-US" sz="1400" dirty="0" smtClean="0">
+                <a:latin typeface="Courier New" pitchFamily="49" charset="0"/>
+                <a:cs typeface="Courier New" pitchFamily="49" charset="0"/>
+              </a:rPr>
+              <a:t>&lt;/</a:t>
+            </a:r>
+            <a:r>
+              <a:rPr lang="en-US" sz="1400" dirty="0">
+                <a:latin typeface="Courier New" pitchFamily="49" charset="0"/>
+                <a:cs typeface="Courier New" pitchFamily="49" charset="0"/>
+              </a:rPr>
+              <a:t>Window&gt;</a:t>
+            </a:r>
+          </a:p>
+        </p:txBody>
+      </p:sp>
+      <p:sp>
+        <p:nvSpPr>
+          <p:cNvPr id="4" name="TextBox 3"/>
+          <p:cNvSpPr txBox="1"/>
+          <p:nvPr/>
+        </p:nvSpPr>
+        <p:spPr>
+          <a:xfrm>
+            <a:off x="107504" y="4951413"/>
+            <a:ext cx="8928992" cy="584775"/>
+          </a:xfrm>
+          <a:prstGeom prst="rect">
+            <a:avLst/>
+          </a:prstGeom>
+          <a:noFill/>
+        </p:spPr>
+        <p:txBody>
+          <a:bodyPr wrap="square" rtlCol="0">
+            <a:spAutoFit/>
+          </a:bodyPr>
+          <a:lstStyle/>
+          <a:p>
+            <a:r>
+              <a:rPr lang="en-US" sz="3200" dirty="0" smtClean="0"/>
+              <a:t>Window, Page, Application</a:t>
+            </a:r>
           </a:p>
         </p:txBody>
       </p:sp>
     </p:spTree>
     <p:extLst>
       <p:ext uri="{BB962C8B-B14F-4D97-AF65-F5344CB8AC3E}">
-        <p14:creationId xmlns:p14="http://schemas.microsoft.com/office/powerpoint/2010/main" val="3238612866"/>
+        <p14:creationId xmlns:p14="http://schemas.microsoft.com/office/powerpoint/2010/main" val="1148772594"/>
       </p:ext>
     </p:extLst>
   </p:cSld>
@@ -4396,7 +4334,7 @@
           <a:p>
             <a:r>
               <a:rPr lang="ru-RU" dirty="0" smtClean="0"/>
-              <a:t>Типы из других сборок</a:t>
+              <a:t>Свойства</a:t>
             </a:r>
             <a:endParaRPr lang="en-US" dirty="0"/>
           </a:p>
@@ -4414,126 +4352,179 @@
         </p:nvSpPr>
         <p:spPr/>
         <p:txBody>
-          <a:bodyPr/>
+          <a:bodyPr>
+            <a:normAutofit fontScale="70000" lnSpcReduction="20000"/>
+          </a:bodyPr>
           <a:lstStyle/>
           <a:p>
             <a:r>
-              <a:rPr lang="en-US" sz="2000" dirty="0" err="1"/>
-              <a:t>xmlns:Prefix</a:t>
-            </a:r>
-            <a:r>
-              <a:rPr lang="en-US" sz="2000" dirty="0"/>
-              <a:t>="</a:t>
-            </a:r>
-            <a:r>
-              <a:rPr lang="en-US" sz="2000" dirty="0" err="1" smtClean="0"/>
-              <a:t>clr-namespace:Namespace;assembly</a:t>
-            </a:r>
-            <a:r>
-              <a:rPr lang="en-US" sz="2000" dirty="0" smtClean="0"/>
-              <a:t>=</a:t>
-            </a:r>
-            <a:r>
-              <a:rPr lang="en-US" sz="2000" dirty="0" err="1" smtClean="0"/>
-              <a:t>AssemblyName</a:t>
-            </a:r>
-            <a:r>
-              <a:rPr lang="en-US" sz="2000" dirty="0" smtClean="0"/>
-              <a:t>“</a:t>
-            </a:r>
+              <a:rPr lang="en-US" dirty="0"/>
+              <a:t>Simple Properties and Type </a:t>
+            </a:r>
+            <a:r>
+              <a:rPr lang="en-US" dirty="0" smtClean="0"/>
+              <a:t>Converters</a:t>
+            </a:r>
+            <a:endParaRPr lang="ru-RU" dirty="0" smtClean="0"/>
           </a:p>
           <a:p>
             <a:pPr lvl="1"/>
             <a:r>
-              <a:rPr lang="en-US" sz="2000" dirty="0" err="1"/>
-              <a:t>xmlns:sys</a:t>
-            </a:r>
-            <a:r>
-              <a:rPr lang="en-US" sz="2000" dirty="0"/>
-              <a:t>="</a:t>
-            </a:r>
-            <a:r>
-              <a:rPr lang="en-US" sz="2000" dirty="0" err="1" smtClean="0"/>
-              <a:t>clr-namespace:System;assembly</a:t>
-            </a:r>
-            <a:r>
-              <a:rPr lang="en-US" sz="2000" dirty="0" smtClean="0"/>
-              <a:t>=</a:t>
-            </a:r>
-            <a:r>
-              <a:rPr lang="en-US" sz="2000" dirty="0" err="1" smtClean="0"/>
-              <a:t>mscorlib</a:t>
-            </a:r>
-            <a:r>
-              <a:rPr lang="en-US" sz="2000" dirty="0" smtClean="0"/>
-              <a:t>“</a:t>
-            </a:r>
-          </a:p>
-          <a:p>
-            <a:pPr lvl="2"/>
-            <a:r>
-              <a:rPr lang="en-US" sz="2000" dirty="0"/>
+              <a:rPr lang="en-US" dirty="0" err="1" smtClean="0"/>
+              <a:t>TypeConverter</a:t>
+            </a:r>
+            <a:r>
+              <a:rPr lang="en-US" dirty="0" smtClean="0"/>
+              <a:t>(</a:t>
+            </a:r>
+            <a:r>
+              <a:rPr lang="en-US" dirty="0" err="1" smtClean="0"/>
+              <a:t>typeof</a:t>
+            </a:r>
+            <a:r>
+              <a:rPr lang="en-US" dirty="0" smtClean="0"/>
+              <a:t>(</a:t>
+            </a:r>
+            <a:r>
+              <a:rPr lang="ru-RU" dirty="0" smtClean="0"/>
+              <a:t>ИмяТипа</a:t>
+            </a:r>
+            <a:r>
+              <a:rPr lang="en-US" dirty="0" smtClean="0"/>
+              <a:t>))</a:t>
+            </a:r>
+            <a:endParaRPr lang="ru-RU" dirty="0" smtClean="0"/>
+          </a:p>
+          <a:p>
+            <a:r>
+              <a:rPr lang="en-US" dirty="0"/>
+              <a:t>Complex </a:t>
+            </a:r>
+            <a:r>
+              <a:rPr lang="en-US" dirty="0" smtClean="0"/>
+              <a:t>Properties</a:t>
+            </a:r>
+            <a:r>
+              <a:rPr lang="ru-RU" dirty="0" smtClean="0"/>
+              <a:t> </a:t>
+            </a:r>
+            <a:r>
+              <a:rPr lang="en-US" dirty="0"/>
+              <a:t>and property-element </a:t>
+            </a:r>
+            <a:r>
+              <a:rPr lang="en-US" dirty="0" smtClean="0"/>
+              <a:t>syntax</a:t>
+            </a:r>
+          </a:p>
+          <a:p>
+            <a:pPr lvl="1"/>
+            <a:r>
+              <a:rPr lang="en-US" dirty="0" err="1" smtClean="0"/>
+              <a:t>EightBall</a:t>
+            </a:r>
+            <a:r>
+              <a:rPr lang="en-US" dirty="0" smtClean="0"/>
+              <a:t> demo (Chapter02)</a:t>
+            </a:r>
+          </a:p>
+          <a:p>
+            <a:r>
+              <a:rPr lang="en-US" dirty="0"/>
+              <a:t>Markup </a:t>
+            </a:r>
+            <a:r>
+              <a:rPr lang="en-US" dirty="0" smtClean="0"/>
+              <a:t>Extensions</a:t>
+            </a:r>
+          </a:p>
+          <a:p>
+            <a:pPr lvl="1"/>
+            <a:r>
+              <a:rPr lang="ru-RU" dirty="0" smtClean="0"/>
+              <a:t>Для ссылок на другие объекты или для подстановки динамических значений</a:t>
+            </a:r>
+          </a:p>
+          <a:p>
+            <a:pPr lvl="1"/>
+            <a:r>
+              <a:rPr lang="en-US" dirty="0"/>
+              <a:t>&lt;Button ... Foreground="{</a:t>
+            </a:r>
+            <a:r>
+              <a:rPr lang="en-US" dirty="0" err="1"/>
+              <a:t>x:Static</a:t>
+            </a:r>
+            <a:r>
+              <a:rPr lang="en-US" dirty="0"/>
+              <a:t> </a:t>
+            </a:r>
+            <a:r>
+              <a:rPr lang="en-US" dirty="0" err="1"/>
+              <a:t>SystemColors.ActiveCaptionBrush</a:t>
+            </a:r>
+            <a:r>
+              <a:rPr lang="en-US" dirty="0"/>
+              <a:t>}" &gt;</a:t>
+            </a:r>
+            <a:endParaRPr lang="ru-RU" dirty="0" smtClean="0"/>
+          </a:p>
+          <a:p>
+            <a:pPr lvl="1"/>
+            <a:r>
+              <a:rPr lang="en-US" dirty="0" err="1" smtClean="0"/>
+              <a:t>System.Windows.Markup.MarkupExtension</a:t>
+            </a:r>
+            <a:endParaRPr lang="ru-RU" dirty="0" smtClean="0"/>
+          </a:p>
+          <a:p>
+            <a:r>
+              <a:rPr lang="en-US" dirty="0" smtClean="0"/>
+              <a:t>Attached properties</a:t>
+            </a:r>
+          </a:p>
+          <a:p>
+            <a:pPr lvl="1"/>
+            <a:r>
+              <a:rPr lang="en-US" dirty="0"/>
               <a:t>&lt;</a:t>
             </a:r>
             <a:r>
-              <a:rPr lang="en-US" sz="2000" dirty="0" err="1"/>
-              <a:t>sys:DateTime</a:t>
-            </a:r>
-            <a:r>
-              <a:rPr lang="en-US" sz="2000" dirty="0"/>
-              <a:t>&gt;10/30/2010 4:30 PM&lt;/</a:t>
-            </a:r>
-            <a:r>
-              <a:rPr lang="en-US" sz="2000" dirty="0" err="1"/>
-              <a:t>sys:DateTime</a:t>
-            </a:r>
-            <a:r>
-              <a:rPr lang="en-US" sz="2000" dirty="0"/>
-              <a:t>&gt;</a:t>
+              <a:rPr lang="en-US" dirty="0" err="1"/>
+              <a:t>TextBox</a:t>
+            </a:r>
+            <a:r>
+              <a:rPr lang="en-US" dirty="0"/>
+              <a:t> ... </a:t>
+            </a:r>
+            <a:r>
+              <a:rPr lang="en-US" dirty="0" err="1"/>
+              <a:t>Grid.Row</a:t>
+            </a:r>
+            <a:r>
+              <a:rPr lang="en-US" dirty="0"/>
+              <a:t>="0</a:t>
+            </a:r>
+            <a:r>
+              <a:rPr lang="en-US" dirty="0" smtClean="0"/>
+              <a:t>"&gt;</a:t>
             </a:r>
           </a:p>
           <a:p>
             <a:pPr lvl="1"/>
             <a:r>
-              <a:rPr lang="en-US" sz="2000" dirty="0" err="1" smtClean="0"/>
-              <a:t>xmlns:local</a:t>
-            </a:r>
-            <a:r>
-              <a:rPr lang="en-US" sz="2000" dirty="0"/>
-              <a:t>="</a:t>
-            </a:r>
-            <a:r>
-              <a:rPr lang="en-US" sz="2000" dirty="0" err="1" smtClean="0"/>
-              <a:t>clr-namespace:MyNamespace</a:t>
-            </a:r>
-            <a:r>
-              <a:rPr lang="en-US" sz="2000" dirty="0" smtClean="0"/>
-              <a:t>“</a:t>
-            </a:r>
-          </a:p>
-          <a:p>
-            <a:pPr lvl="2"/>
-            <a:r>
-              <a:rPr lang="en-US" sz="2000" dirty="0" smtClean="0"/>
-              <a:t>&lt;</a:t>
-            </a:r>
-            <a:r>
-              <a:rPr lang="en-US" sz="2000" dirty="0" err="1"/>
-              <a:t>local:MyObject</a:t>
-            </a:r>
-            <a:r>
-              <a:rPr lang="en-US" sz="2000" dirty="0"/>
-              <a:t> ...&gt;&lt;/</a:t>
-            </a:r>
-            <a:r>
-              <a:rPr lang="en-US" sz="2000" dirty="0" err="1"/>
-              <a:t>local:MyObject</a:t>
-            </a:r>
-            <a:r>
-              <a:rPr lang="en-US" sz="2000" dirty="0"/>
-              <a:t>&gt;</a:t>
-            </a:r>
-            <a:endParaRPr lang="ru-RU" sz="2000" dirty="0" smtClean="0"/>
+              <a:rPr lang="ru-RU" dirty="0" smtClean="0"/>
+              <a:t>Транслируются в вызовы методов </a:t>
+            </a:r>
+            <a:r>
+              <a:rPr lang="en-US" dirty="0" err="1"/>
+              <a:t>DefiningType.SetPropertyName</a:t>
+            </a:r>
+            <a:r>
+              <a:rPr lang="en-US" dirty="0"/>
+              <a:t>()</a:t>
+            </a:r>
+            <a:endParaRPr lang="ru-RU" dirty="0" smtClean="0"/>
           </a:p>
           <a:p>
             <a:pPr lvl="1"/>
@@ -4544,7 +4535,7 @@
     </p:spTree>
     <p:extLst>
       <p:ext uri="{BB962C8B-B14F-4D97-AF65-F5344CB8AC3E}">
-        <p14:creationId xmlns:p14="http://schemas.microsoft.com/office/powerpoint/2010/main" val="2666370571"/>
+        <p14:creationId xmlns:p14="http://schemas.microsoft.com/office/powerpoint/2010/main" val="3238612866"/>
       </p:ext>
     </p:extLst>
   </p:cSld>
@@ -4595,11 +4586,7 @@
           <a:p>
             <a:r>
               <a:rPr lang="ru-RU" dirty="0" smtClean="0"/>
-              <a:t>Модели работы с </a:t>
-            </a:r>
-            <a:r>
-              <a:rPr lang="en-US" dirty="0" smtClean="0"/>
-              <a:t>XAML</a:t>
+              <a:t>Типы из других сборок</a:t>
             </a:r>
             <a:endParaRPr lang="en-US" dirty="0"/>
           </a:p>
@@ -4617,89 +4604,129 @@
         </p:nvSpPr>
         <p:spPr/>
         <p:txBody>
-          <a:bodyPr>
-            <a:normAutofit lnSpcReduction="10000"/>
-          </a:bodyPr>
+          <a:bodyPr/>
           <a:lstStyle/>
           <a:p>
             <a:r>
-              <a:rPr lang="en-US" dirty="0"/>
-              <a:t>Code and compiled markup (BAML)</a:t>
+              <a:rPr lang="en-US" sz="2000" dirty="0" err="1"/>
+              <a:t>xmlns:Prefix</a:t>
+            </a:r>
+            <a:r>
+              <a:rPr lang="en-US" sz="2000" dirty="0"/>
+              <a:t>="</a:t>
+            </a:r>
+            <a:r>
+              <a:rPr lang="en-US" sz="2000" dirty="0" err="1" smtClean="0"/>
+              <a:t>clr-namespace:Namespace;assembly</a:t>
+            </a:r>
+            <a:r>
+              <a:rPr lang="en-US" sz="2000" dirty="0" smtClean="0"/>
+              <a:t>=</a:t>
+            </a:r>
+            <a:r>
+              <a:rPr lang="en-US" sz="2000" dirty="0" err="1" smtClean="0"/>
+              <a:t>AssemblyName</a:t>
+            </a:r>
+            <a:r>
+              <a:rPr lang="en-US" sz="2000" dirty="0" smtClean="0"/>
+              <a:t>“</a:t>
             </a:r>
           </a:p>
           <a:p>
             <a:pPr lvl="1"/>
             <a:r>
-              <a:rPr lang="ru-RU" dirty="0"/>
-              <a:t>Предпочтительный подход используемый по </a:t>
-            </a:r>
-            <a:r>
-              <a:rPr lang="ru-RU" dirty="0" smtClean="0"/>
-              <a:t>умолчанию</a:t>
-            </a:r>
-          </a:p>
-          <a:p>
-            <a:r>
-              <a:rPr lang="en-US" dirty="0"/>
-              <a:t>Code and </a:t>
-            </a:r>
-            <a:r>
-              <a:rPr lang="en-US" dirty="0" err="1"/>
-              <a:t>uncompiled</a:t>
-            </a:r>
-            <a:r>
-              <a:rPr lang="en-US" dirty="0"/>
-              <a:t> markup (XAML)</a:t>
+              <a:rPr lang="en-US" sz="2000" dirty="0" err="1"/>
+              <a:t>xmlns:sys</a:t>
+            </a:r>
+            <a:r>
+              <a:rPr lang="en-US" sz="2000" dirty="0"/>
+              <a:t>="</a:t>
+            </a:r>
+            <a:r>
+              <a:rPr lang="en-US" sz="2000" dirty="0" err="1" smtClean="0"/>
+              <a:t>clr-namespace:System;assembly</a:t>
+            </a:r>
+            <a:r>
+              <a:rPr lang="en-US" sz="2000" dirty="0" smtClean="0"/>
+              <a:t>=</a:t>
+            </a:r>
+            <a:r>
+              <a:rPr lang="en-US" sz="2000" dirty="0" err="1" smtClean="0"/>
+              <a:t>mscorlib</a:t>
+            </a:r>
+            <a:r>
+              <a:rPr lang="en-US" sz="2000" dirty="0" smtClean="0"/>
+              <a:t>“</a:t>
+            </a:r>
+          </a:p>
+          <a:p>
+            <a:pPr lvl="2"/>
+            <a:r>
+              <a:rPr lang="en-US" sz="2000" dirty="0"/>
+              <a:t>&lt;</a:t>
+            </a:r>
+            <a:r>
+              <a:rPr lang="en-US" sz="2000" dirty="0" err="1"/>
+              <a:t>sys:DateTime</a:t>
+            </a:r>
+            <a:r>
+              <a:rPr lang="en-US" sz="2000" dirty="0"/>
+              <a:t>&gt;10/30/2010 4:30 PM&lt;/</a:t>
+            </a:r>
+            <a:r>
+              <a:rPr lang="en-US" sz="2000" dirty="0" err="1"/>
+              <a:t>sys:DateTime</a:t>
+            </a:r>
+            <a:r>
+              <a:rPr lang="en-US" sz="2000" dirty="0"/>
+              <a:t>&gt;</a:t>
             </a:r>
           </a:p>
           <a:p>
             <a:pPr lvl="1"/>
             <a:r>
-              <a:rPr lang="ru-RU" dirty="0"/>
-              <a:t>Полезен для динамических интерфейсов. Читаем </a:t>
-            </a:r>
-            <a:r>
-              <a:rPr lang="en-US" dirty="0"/>
-              <a:t>XAML c </a:t>
-            </a:r>
-            <a:r>
-              <a:rPr lang="ru-RU" dirty="0"/>
-              <a:t>помощью класса </a:t>
-            </a:r>
-            <a:r>
-              <a:rPr lang="en-US" dirty="0" err="1"/>
-              <a:t>System.Windows.Markup</a:t>
-            </a:r>
-            <a:r>
-              <a:rPr lang="ru-RU" dirty="0"/>
-              <a:t>.</a:t>
-            </a:r>
-            <a:r>
-              <a:rPr lang="en-US" dirty="0" err="1" smtClean="0"/>
-              <a:t>XamlReader</a:t>
-            </a:r>
-            <a:endParaRPr lang="ru-RU" dirty="0" smtClean="0"/>
-          </a:p>
-          <a:p>
-            <a:r>
-              <a:rPr lang="en-US" dirty="0" smtClean="0"/>
-              <a:t>Code-only</a:t>
-            </a:r>
-            <a:endParaRPr lang="ru-RU" dirty="0" smtClean="0"/>
+              <a:rPr lang="en-US" sz="2000" dirty="0" err="1" smtClean="0"/>
+              <a:t>xmlns:local</a:t>
+            </a:r>
+            <a:r>
+              <a:rPr lang="en-US" sz="2000" dirty="0"/>
+              <a:t>="</a:t>
+            </a:r>
+            <a:r>
+              <a:rPr lang="en-US" sz="2000" dirty="0" err="1" smtClean="0"/>
+              <a:t>clr-namespace:MyNamespace</a:t>
+            </a:r>
+            <a:r>
+              <a:rPr lang="en-US" sz="2000" dirty="0" smtClean="0"/>
+              <a:t>“</a:t>
+            </a:r>
+          </a:p>
+          <a:p>
+            <a:pPr lvl="2"/>
+            <a:r>
+              <a:rPr lang="en-US" sz="2000" dirty="0" smtClean="0"/>
+              <a:t>&lt;</a:t>
+            </a:r>
+            <a:r>
+              <a:rPr lang="en-US" sz="2000" dirty="0" err="1"/>
+              <a:t>local:MyObject</a:t>
+            </a:r>
+            <a:r>
+              <a:rPr lang="en-US" sz="2000" dirty="0"/>
+              <a:t> ...&gt;&lt;/</a:t>
+            </a:r>
+            <a:r>
+              <a:rPr lang="en-US" sz="2000" dirty="0" err="1"/>
+              <a:t>local:MyObject</a:t>
+            </a:r>
+            <a:r>
+              <a:rPr lang="en-US" sz="2000" dirty="0"/>
+              <a:t>&gt;</a:t>
+            </a:r>
+            <a:endParaRPr lang="ru-RU" sz="2000" dirty="0" smtClean="0"/>
           </a:p>
           <a:p>
             <a:pPr lvl="1"/>
-            <a:r>
-              <a:rPr lang="ru-RU" dirty="0" smtClean="0"/>
-              <a:t>Традиционный подход из </a:t>
-            </a:r>
-            <a:r>
-              <a:rPr lang="en-US" dirty="0" err="1" smtClean="0"/>
-              <a:t>WinForms</a:t>
-            </a:r>
-            <a:endParaRPr lang="en-US" dirty="0" smtClean="0"/>
-          </a:p>
-          <a:p>
             <a:endParaRPr lang="en-US" dirty="0"/>
           </a:p>
         </p:txBody>
@@ -4707,13 +4734,20 @@
     </p:spTree>
     <p:extLst>
       <p:ext uri="{BB962C8B-B14F-4D97-AF65-F5344CB8AC3E}">
-        <p14:creationId xmlns:p14="http://schemas.microsoft.com/office/powerpoint/2010/main" val="3561738914"/>
+        <p14:creationId xmlns:p14="http://schemas.microsoft.com/office/powerpoint/2010/main" val="2666370571"/>
       </p:ext>
     </p:extLst>
   </p:cSld>
   <p:clrMapOvr>
     <a:masterClrMapping/>
   </p:clrMapOvr>
+  <p:timing>
+    <p:tnLst>
+      <p:par>
+        <p:cTn id="1" dur="indefinite" restart="never" nodeType="tmRoot"/>
+      </p:par>
+    </p:tnLst>
+  </p:timing>
 </p:sld>
 </file>
 
@@ -4750,16 +4784,12 @@
           <a:lstStyle/>
           <a:p>
             <a:r>
+              <a:rPr lang="ru-RU" dirty="0" smtClean="0"/>
+              <a:t>Модели работы с </a:t>
+            </a:r>
+            <a:r>
               <a:rPr lang="en-US" dirty="0" smtClean="0"/>
-              <a:t>Layout</a:t>
-            </a:r>
-            <a:r>
-              <a:rPr lang="ru-RU" dirty="0" smtClean="0"/>
-              <a:t> в </a:t>
-            </a:r>
-            <a:r>
-              <a:rPr lang="en-US" dirty="0" smtClean="0"/>
-              <a:t>Windows Forms</a:t>
+              <a:t>XAML</a:t>
             </a:r>
             <a:endParaRPr lang="en-US" dirty="0"/>
           </a:p>
@@ -4777,71 +4807,89 @@
         </p:nvSpPr>
         <p:spPr/>
         <p:txBody>
-          <a:bodyPr/>
+          <a:bodyPr>
+            <a:normAutofit lnSpcReduction="10000"/>
+          </a:bodyPr>
           <a:lstStyle/>
           <a:p>
             <a:r>
+              <a:rPr lang="en-US" dirty="0"/>
+              <a:t>Code and compiled markup (BAML)</a:t>
+            </a:r>
+          </a:p>
+          <a:p>
+            <a:pPr lvl="1"/>
+            <a:r>
+              <a:rPr lang="ru-RU" dirty="0"/>
+              <a:t>Предпочтительный подход используемый по </a:t>
+            </a:r>
+            <a:r>
               <a:rPr lang="ru-RU" dirty="0" smtClean="0"/>
-              <a:t>Жестко заданные координаты и размеры элементов управления</a:t>
+              <a:t>умолчанию</a:t>
+            </a:r>
+          </a:p>
+          <a:p>
+            <a:r>
+              <a:rPr lang="en-US" dirty="0"/>
+              <a:t>Code and </a:t>
+            </a:r>
+            <a:r>
+              <a:rPr lang="en-US" dirty="0" err="1"/>
+              <a:t>uncompiled</a:t>
+            </a:r>
+            <a:r>
+              <a:rPr lang="en-US" dirty="0"/>
+              <a:t> markup (XAML)</a:t>
+            </a:r>
+          </a:p>
+          <a:p>
+            <a:pPr lvl="1"/>
+            <a:r>
+              <a:rPr lang="ru-RU" dirty="0"/>
+              <a:t>Полезен для динамических интерфейсов. Читаем </a:t>
+            </a:r>
+            <a:r>
+              <a:rPr lang="en-US" dirty="0"/>
+              <a:t>XAML c </a:t>
+            </a:r>
+            <a:r>
+              <a:rPr lang="ru-RU" dirty="0"/>
+              <a:t>помощью класса </a:t>
+            </a:r>
+            <a:r>
+              <a:rPr lang="en-US" dirty="0" err="1"/>
+              <a:t>System.Windows.Markup</a:t>
+            </a:r>
+            <a:r>
+              <a:rPr lang="ru-RU" dirty="0"/>
+              <a:t>.</a:t>
+            </a:r>
+            <a:r>
+              <a:rPr lang="en-US" dirty="0" err="1" smtClean="0"/>
+              <a:t>XamlReader</a:t>
+            </a:r>
+            <a:endParaRPr lang="ru-RU" dirty="0" smtClean="0"/>
+          </a:p>
+          <a:p>
+            <a:r>
+              <a:rPr lang="en-US" dirty="0" smtClean="0"/>
+              <a:t>Code-only</a:t>
+            </a:r>
+            <a:endParaRPr lang="ru-RU" dirty="0" smtClean="0"/>
+          </a:p>
+          <a:p>
+            <a:pPr lvl="1"/>
+            <a:r>
+              <a:rPr lang="ru-RU" dirty="0" smtClean="0"/>
+              <a:t>Традиционный подход из </a:t>
+            </a:r>
+            <a:r>
+              <a:rPr lang="en-US" dirty="0" err="1" smtClean="0"/>
+              <a:t>WinForms</a:t>
             </a:r>
             <a:endParaRPr lang="en-US" dirty="0" smtClean="0"/>
           </a:p>
           <a:p>
-            <a:r>
-              <a:rPr lang="ru-RU" dirty="0" smtClean="0"/>
-              <a:t>В </a:t>
-            </a:r>
-            <a:r>
-              <a:rPr lang="en-US" dirty="0" smtClean="0"/>
-              <a:t>.NET 1 </a:t>
-            </a:r>
-            <a:r>
-              <a:rPr lang="ru-RU" dirty="0" smtClean="0"/>
-              <a:t>был доступен только </a:t>
-            </a:r>
-            <a:r>
-              <a:rPr lang="en-US" dirty="0" smtClean="0"/>
-              <a:t>anchoring</a:t>
-            </a:r>
-            <a:r>
-              <a:rPr lang="ru-RU" dirty="0" smtClean="0"/>
-              <a:t> и</a:t>
-            </a:r>
-            <a:r>
-              <a:rPr lang="en-US" dirty="0" smtClean="0"/>
-              <a:t> docking</a:t>
-            </a:r>
-            <a:endParaRPr lang="ru-RU" dirty="0" smtClean="0"/>
-          </a:p>
-          <a:p>
-            <a:r>
-              <a:rPr lang="ru-RU" dirty="0" smtClean="0"/>
-              <a:t>В </a:t>
-            </a:r>
-            <a:r>
-              <a:rPr lang="en-US" dirty="0" smtClean="0"/>
-              <a:t>.NET 2 </a:t>
-            </a:r>
-            <a:r>
-              <a:rPr lang="ru-RU" dirty="0" smtClean="0"/>
-              <a:t>добавили </a:t>
-            </a:r>
-            <a:r>
-              <a:rPr lang="en-US" dirty="0" err="1" smtClean="0"/>
-              <a:t>FlowLayoutPanel</a:t>
-            </a:r>
-            <a:r>
-              <a:rPr lang="ru-RU" dirty="0" smtClean="0"/>
-              <a:t> и</a:t>
-            </a:r>
-            <a:r>
-              <a:rPr lang="en-US" dirty="0" smtClean="0"/>
-              <a:t> </a:t>
-            </a:r>
-            <a:r>
-              <a:rPr lang="en-US" dirty="0" err="1" smtClean="0"/>
-              <a:t>TableLayoutPanel</a:t>
-            </a:r>
             <a:endParaRPr lang="en-US" dirty="0"/>
           </a:p>
         </p:txBody>
@@ -4849,13 +4897,20 @@
     </p:spTree>
     <p:extLst>
       <p:ext uri="{BB962C8B-B14F-4D97-AF65-F5344CB8AC3E}">
-        <p14:creationId xmlns:p14="http://schemas.microsoft.com/office/powerpoint/2010/main" val="1607687639"/>
+        <p14:creationId xmlns:p14="http://schemas.microsoft.com/office/powerpoint/2010/main" val="3561738914"/>
       </p:ext>
     </p:extLst>
   </p:cSld>
   <p:clrMapOvr>
     <a:masterClrMapping/>
   </p:clrMapOvr>
+  <p:timing>
+    <p:tnLst>
+      <p:par>
+        <p:cTn id="1" dur="indefinite" restart="never" nodeType="tmRoot"/>
+      </p:par>
+    </p:tnLst>
+  </p:timing>
 </p:sld>
 </file>
 
@@ -4901,7 +4956,7 @@
             </a:r>
             <a:r>
               <a:rPr lang="en-US" dirty="0" smtClean="0"/>
-              <a:t>WPF</a:t>
+              <a:t>Windows Forms</a:t>
             </a:r>
             <a:endParaRPr lang="en-US" dirty="0"/>
           </a:p>
@@ -4924,6 +4979,155 @@
           <a:p>
             <a:r>
               <a:rPr lang="ru-RU" dirty="0" smtClean="0"/>
+              <a:t>Жестко заданные координаты и размеры элементов управления</a:t>
+            </a:r>
+            <a:endParaRPr lang="en-US" dirty="0" smtClean="0"/>
+          </a:p>
+          <a:p>
+            <a:r>
+              <a:rPr lang="ru-RU" dirty="0" smtClean="0"/>
+              <a:t>В </a:t>
+            </a:r>
+            <a:r>
+              <a:rPr lang="en-US" dirty="0" smtClean="0"/>
+              <a:t>.NET 1 </a:t>
+            </a:r>
+            <a:r>
+              <a:rPr lang="ru-RU" dirty="0" smtClean="0"/>
+              <a:t>был доступен только </a:t>
+            </a:r>
+            <a:r>
+              <a:rPr lang="en-US" dirty="0" smtClean="0"/>
+              <a:t>anchoring</a:t>
+            </a:r>
+            <a:r>
+              <a:rPr lang="ru-RU" dirty="0" smtClean="0"/>
+              <a:t> и</a:t>
+            </a:r>
+            <a:r>
+              <a:rPr lang="en-US" dirty="0" smtClean="0"/>
+              <a:t> docking</a:t>
+            </a:r>
+            <a:endParaRPr lang="ru-RU" dirty="0" smtClean="0"/>
+          </a:p>
+          <a:p>
+            <a:r>
+              <a:rPr lang="ru-RU" dirty="0" smtClean="0"/>
+              <a:t>В </a:t>
+            </a:r>
+            <a:r>
+              <a:rPr lang="en-US" dirty="0" smtClean="0"/>
+              <a:t>.NET 2 </a:t>
+            </a:r>
+            <a:r>
+              <a:rPr lang="ru-RU" dirty="0" smtClean="0"/>
+              <a:t>добавили </a:t>
+            </a:r>
+            <a:r>
+              <a:rPr lang="en-US" dirty="0" err="1" smtClean="0"/>
+              <a:t>FlowLayoutPanel</a:t>
+            </a:r>
+            <a:r>
+              <a:rPr lang="ru-RU" dirty="0" smtClean="0"/>
+              <a:t> и</a:t>
+            </a:r>
+            <a:r>
+              <a:rPr lang="en-US" dirty="0" smtClean="0"/>
+              <a:t> </a:t>
+            </a:r>
+            <a:r>
+              <a:rPr lang="en-US" dirty="0" err="1" smtClean="0"/>
+              <a:t>TableLayoutPanel</a:t>
+            </a:r>
+            <a:endParaRPr lang="en-US" dirty="0"/>
+          </a:p>
+        </p:txBody>
+      </p:sp>
+    </p:spTree>
+    <p:extLst>
+      <p:ext uri="{BB962C8B-B14F-4D97-AF65-F5344CB8AC3E}">
+        <p14:creationId xmlns:p14="http://schemas.microsoft.com/office/powerpoint/2010/main" val="1607687639"/>
+      </p:ext>
+    </p:extLst>
+  </p:cSld>
+  <p:clrMapOvr>
+    <a:masterClrMapping/>
+  </p:clrMapOvr>
+  <p:timing>
+    <p:tnLst>
+      <p:par>
+        <p:cTn id="1" dur="indefinite" restart="never" nodeType="tmRoot"/>
+      </p:par>
+    </p:tnLst>
+  </p:timing>
+</p:sld>
+</file>
+
+<file path=ppt/slides/slide19.xml><?xml version="1.0" encoding="utf-8"?>
+<p:sld xmlns:a="http://schemas.openxmlformats.org/drawingml/2006/main" xmlns:r="http://schemas.openxmlformats.org/officeDocument/2006/relationships" xmlns:p="http://schemas.openxmlformats.org/presentationml/2006/main">
+  <p:cSld>
+    <p:spTree>
+      <p:nvGrpSpPr>
+        <p:cNvPr id="1" name=""/>
+        <p:cNvGrpSpPr/>
+        <p:nvPr/>
+      </p:nvGrpSpPr>
+      <p:grpSpPr>
+        <a:xfrm>
+          <a:off x="0" y="0"/>
+          <a:ext cx="0" cy="0"/>
+          <a:chOff x="0" y="0"/>
+          <a:chExt cx="0" cy="0"/>
+        </a:xfrm>
+      </p:grpSpPr>
+      <p:sp>
+        <p:nvSpPr>
+          <p:cNvPr id="2" name="Title 1"/>
+          <p:cNvSpPr>
+            <a:spLocks noGrp="1"/>
+          </p:cNvSpPr>
+          <p:nvPr>
+            <p:ph type="title"/>
+          </p:nvPr>
+        </p:nvSpPr>
+        <p:spPr/>
+        <p:txBody>
+          <a:bodyPr/>
+          <a:lstStyle/>
+          <a:p>
+            <a:r>
+              <a:rPr lang="en-US" dirty="0" smtClean="0"/>
+              <a:t>Layout</a:t>
+            </a:r>
+            <a:r>
+              <a:rPr lang="ru-RU" dirty="0" smtClean="0"/>
+              <a:t> в </a:t>
+            </a:r>
+            <a:r>
+              <a:rPr lang="en-US" dirty="0" smtClean="0"/>
+              <a:t>WPF</a:t>
+            </a:r>
+            <a:endParaRPr lang="en-US" dirty="0"/>
+          </a:p>
+        </p:txBody>
+      </p:sp>
+      <p:sp>
+        <p:nvSpPr>
+          <p:cNvPr id="3" name="Content Placeholder 2"/>
+          <p:cNvSpPr>
+            <a:spLocks noGrp="1"/>
+          </p:cNvSpPr>
+          <p:nvPr>
+            <p:ph idx="1"/>
+          </p:nvPr>
+        </p:nvSpPr>
+        <p:spPr/>
+        <p:txBody>
+          <a:bodyPr/>
+          <a:lstStyle/>
+          <a:p>
+            <a:r>
+              <a:rPr lang="ru-RU" dirty="0" smtClean="0"/>
               <a:t>В идеале:</a:t>
             </a:r>
           </a:p>
@@ -4983,10 +5187,111 @@
   <p:clrMapOvr>
     <a:masterClrMapping/>
   </p:clrMapOvr>
+  <p:timing>
+    <p:tnLst>
+      <p:par>
+        <p:cTn id="1" dur="indefinite" restart="never" nodeType="tmRoot"/>
+      </p:par>
+    </p:tnLst>
+  </p:timing>
 </p:sld>
 </file>
 
-<file path=ppt/slides/slide19.xml><?xml version="1.0" encoding="utf-8"?>
+<file path=ppt/slides/slide2.xml><?xml version="1.0" encoding="utf-8"?>
+<p:sld xmlns:a="http://schemas.openxmlformats.org/drawingml/2006/main" xmlns:r="http://schemas.openxmlformats.org/officeDocument/2006/relationships" xmlns:p="http://schemas.openxmlformats.org/presentationml/2006/main">
+  <p:cSld>
+    <p:spTree>
+      <p:nvGrpSpPr>
+        <p:cNvPr id="1" name=""/>
+        <p:cNvGrpSpPr/>
+        <p:nvPr/>
+      </p:nvGrpSpPr>
+      <p:grpSpPr>
+        <a:xfrm>
+          <a:off x="0" y="0"/>
+          <a:ext cx="0" cy="0"/>
+          <a:chOff x="0" y="0"/>
+          <a:chExt cx="0" cy="0"/>
+        </a:xfrm>
+      </p:grpSpPr>
+      <p:sp>
+        <p:nvSpPr>
+          <p:cNvPr id="2" name="Title 1"/>
+          <p:cNvSpPr>
+            <a:spLocks noGrp="1"/>
+          </p:cNvSpPr>
+          <p:nvPr>
+            <p:ph type="title"/>
+          </p:nvPr>
+        </p:nvSpPr>
+        <p:spPr/>
+        <p:txBody>
+          <a:bodyPr/>
+          <a:lstStyle/>
+          <a:p>
+            <a:r>
+              <a:rPr lang="ru-RU" dirty="0" smtClean="0"/>
+              <a:t>Литература</a:t>
+            </a:r>
+            <a:endParaRPr lang="en-US" dirty="0"/>
+          </a:p>
+        </p:txBody>
+      </p:sp>
+      <p:sp>
+        <p:nvSpPr>
+          <p:cNvPr id="3" name="Content Placeholder 2"/>
+          <p:cNvSpPr>
+            <a:spLocks noGrp="1"/>
+          </p:cNvSpPr>
+          <p:nvPr>
+            <p:ph idx="1"/>
+          </p:nvPr>
+        </p:nvSpPr>
+        <p:spPr/>
+        <p:txBody>
+          <a:bodyPr/>
+          <a:lstStyle/>
+          <a:p>
+            <a:r>
+              <a:rPr lang="en-US" dirty="0" smtClean="0"/>
+              <a:t>Pro WPF in C# 2010, Mathew McDonald, </a:t>
+            </a:r>
+            <a:r>
+              <a:rPr lang="en-US" dirty="0" err="1" smtClean="0"/>
+              <a:t>Apress</a:t>
+            </a:r>
+            <a:r>
+              <a:rPr lang="en-US" dirty="0" smtClean="0"/>
+              <a:t>; ISBN </a:t>
+            </a:r>
+            <a:r>
+              <a:rPr lang="en-US" dirty="0"/>
+              <a:t>978-1-4302-7205-2</a:t>
+            </a:r>
+          </a:p>
+        </p:txBody>
+      </p:sp>
+    </p:spTree>
+    <p:extLst>
+      <p:ext uri="{BB962C8B-B14F-4D97-AF65-F5344CB8AC3E}">
+        <p14:creationId xmlns:p14="http://schemas.microsoft.com/office/powerpoint/2010/main" val="3525476021"/>
+      </p:ext>
+    </p:extLst>
+  </p:cSld>
+  <p:clrMapOvr>
+    <a:masterClrMapping/>
+  </p:clrMapOvr>
+  <p:timing>
+    <p:tnLst>
+      <p:par>
+        <p:cTn id="1" dur="indefinite" restart="never" nodeType="tmRoot"/>
+      </p:par>
+    </p:tnLst>
+  </p:timing>
+</p:sld>
+</file>
+
+<file path=ppt/slides/slide20.xml><?xml version="1.0" encoding="utf-8"?>
 <p:sld xmlns:a="http://schemas.openxmlformats.org/drawingml/2006/main" xmlns:r="http://schemas.openxmlformats.org/officeDocument/2006/relationships" xmlns:p="http://schemas.openxmlformats.org/presentationml/2006/main">
   <p:cSld>
     <p:spTree>
@@ -5238,93 +5543,6 @@
   <p:clrMapOvr>
     <a:masterClrMapping/>
   </p:clrMapOvr>
-</p:sld>
-</file>
-
-<file path=ppt/slides/slide2.xml><?xml version="1.0" encoding="utf-8"?>
-<p:sld xmlns:a="http://schemas.openxmlformats.org/drawingml/2006/main" xmlns:r="http://schemas.openxmlformats.org/officeDocument/2006/relationships" xmlns:p="http://schemas.openxmlformats.org/presentationml/2006/main">
-  <p:cSld>
-    <p:spTree>
-      <p:nvGrpSpPr>
-        <p:cNvPr id="1" name=""/>
-        <p:cNvGrpSpPr/>
-        <p:nvPr/>
-      </p:nvGrpSpPr>
-      <p:grpSpPr>
-        <a:xfrm>
-          <a:off x="0" y="0"/>
-          <a:ext cx="0" cy="0"/>
-          <a:chOff x="0" y="0"/>
-          <a:chExt cx="0" cy="0"/>
-        </a:xfrm>
-      </p:grpSpPr>
-      <p:sp>
-        <p:nvSpPr>
-          <p:cNvPr id="2" name="Title 1"/>
-          <p:cNvSpPr>
-            <a:spLocks noGrp="1"/>
-          </p:cNvSpPr>
-          <p:nvPr>
-            <p:ph type="title"/>
-          </p:nvPr>
-        </p:nvSpPr>
-        <p:spPr/>
-        <p:txBody>
-          <a:bodyPr/>
-          <a:lstStyle/>
-          <a:p>
-            <a:r>
-              <a:rPr lang="ru-RU" dirty="0" smtClean="0"/>
-              <a:t>Литература</a:t>
-            </a:r>
-            <a:endParaRPr lang="en-US" dirty="0"/>
-          </a:p>
-        </p:txBody>
-      </p:sp>
-      <p:sp>
-        <p:nvSpPr>
-          <p:cNvPr id="3" name="Content Placeholder 2"/>
-          <p:cNvSpPr>
-            <a:spLocks noGrp="1"/>
-          </p:cNvSpPr>
-          <p:nvPr>
-            <p:ph idx="1"/>
-          </p:nvPr>
-        </p:nvSpPr>
-        <p:spPr/>
-        <p:txBody>
-          <a:bodyPr/>
-          <a:lstStyle/>
-          <a:p>
-            <a:r>
-              <a:rPr lang="en-US" dirty="0" smtClean="0"/>
-              <a:t>Pro WPF in C# 2010, Mathew McDonald, </a:t>
-            </a:r>
-            <a:r>
-              <a:rPr lang="en-US" dirty="0" err="1" smtClean="0"/>
-              <a:t>Apress</a:t>
-            </a:r>
-            <a:r>
-              <a:rPr lang="en-US" dirty="0" smtClean="0"/>
-              <a:t>; ISBN </a:t>
-            </a:r>
-            <a:r>
-              <a:rPr lang="en-US" dirty="0"/>
-              <a:t>978-1-4302-7205-2</a:t>
-            </a:r>
-          </a:p>
-        </p:txBody>
-      </p:sp>
-    </p:spTree>
-    <p:extLst>
-      <p:ext uri="{BB962C8B-B14F-4D97-AF65-F5344CB8AC3E}">
-        <p14:creationId xmlns:p14="http://schemas.microsoft.com/office/powerpoint/2010/main" val="3525476021"/>
-      </p:ext>
-    </p:extLst>
-  </p:cSld>
-  <p:clrMapOvr>
-    <a:masterClrMapping/>
-  </p:clrMapOvr>
   <p:timing>
     <p:tnLst>
       <p:par>
@@ -5335,7 +5553,7 @@
 </p:sld>
 </file>
 
-<file path=ppt/slides/slide20.xml><?xml version="1.0" encoding="utf-8"?>
+<file path=ppt/slides/slide21.xml><?xml version="1.0" encoding="utf-8"?>
 <p:sld xmlns:a="http://schemas.openxmlformats.org/drawingml/2006/main" xmlns:r="http://schemas.openxmlformats.org/officeDocument/2006/relationships" xmlns:p="http://schemas.openxmlformats.org/presentationml/2006/main">
   <p:cSld>
     <p:spTree>
@@ -6419,10 +6637,17 @@
   <p:clrMapOvr>
     <a:masterClrMapping/>
   </p:clrMapOvr>
+  <p:timing>
+    <p:tnLst>
+      <p:par>
+        <p:cTn id="1" dur="indefinite" restart="never" nodeType="tmRoot"/>
+      </p:par>
+    </p:tnLst>
+  </p:timing>
 </p:sld>
 </file>
 
-<file path=ppt/slides/slide21.xml><?xml version="1.0" encoding="utf-8"?>
+<file path=ppt/slides/slide22.xml><?xml version="1.0" encoding="utf-8"?>
 <p:sld xmlns:a="http://schemas.openxmlformats.org/drawingml/2006/main" xmlns:r="http://schemas.openxmlformats.org/officeDocument/2006/relationships" xmlns:p="http://schemas.openxmlformats.org/presentationml/2006/main">
   <p:cSld>
     <p:spTree>
@@ -6603,382 +6828,13 @@
   <p:clrMapOvr>
     <a:masterClrMapping/>
   </p:clrMapOvr>
-</p:sld>
-</file>
-
-<file path=ppt/slides/slide22.xml><?xml version="1.0" encoding="utf-8"?>
-<p:sld xmlns:a="http://schemas.openxmlformats.org/drawingml/2006/main" xmlns:r="http://schemas.openxmlformats.org/officeDocument/2006/relationships" xmlns:p="http://schemas.openxmlformats.org/presentationml/2006/main">
-  <p:cSld>
-    <p:spTree>
-      <p:nvGrpSpPr>
-        <p:cNvPr id="1" name=""/>
-        <p:cNvGrpSpPr/>
-        <p:nvPr/>
-      </p:nvGrpSpPr>
-      <p:grpSpPr>
-        <a:xfrm>
-          <a:off x="0" y="0"/>
-          <a:ext cx="0" cy="0"/>
-          <a:chOff x="0" y="0"/>
-          <a:chExt cx="0" cy="0"/>
-        </a:xfrm>
-      </p:grpSpPr>
-      <p:sp>
-        <p:nvSpPr>
-          <p:cNvPr id="2" name="Title 1"/>
-          <p:cNvSpPr>
-            <a:spLocks noGrp="1"/>
-          </p:cNvSpPr>
-          <p:nvPr>
-            <p:ph type="title"/>
-          </p:nvPr>
-        </p:nvSpPr>
-        <p:spPr/>
-        <p:txBody>
-          <a:bodyPr/>
-          <a:lstStyle/>
-          <a:p>
-            <a:r>
-              <a:rPr lang="en-US" dirty="0"/>
-              <a:t>Dependency Properties</a:t>
-            </a:r>
-          </a:p>
-        </p:txBody>
-      </p:sp>
-      <p:sp>
-        <p:nvSpPr>
-          <p:cNvPr id="3" name="Content Placeholder 2"/>
-          <p:cNvSpPr>
-            <a:spLocks noGrp="1"/>
-          </p:cNvSpPr>
-          <p:nvPr>
-            <p:ph idx="1"/>
-          </p:nvPr>
-        </p:nvSpPr>
-        <p:spPr/>
-        <p:txBody>
-          <a:bodyPr>
-            <a:normAutofit fontScale="55000" lnSpcReduction="20000"/>
-          </a:bodyPr>
-          <a:lstStyle/>
-          <a:p>
-            <a:r>
-              <a:rPr lang="ru-RU" dirty="0" smtClean="0"/>
-              <a:t>Объявление</a:t>
-            </a:r>
-          </a:p>
-          <a:p>
-            <a:pPr lvl="1"/>
-            <a:r>
-              <a:rPr lang="en-US" dirty="0"/>
-              <a:t>public class </a:t>
-            </a:r>
-            <a:r>
-              <a:rPr lang="en-US" dirty="0" err="1"/>
-              <a:t>FrameworkElement</a:t>
-            </a:r>
-            <a:r>
-              <a:rPr lang="en-US" dirty="0"/>
-              <a:t>: </a:t>
-            </a:r>
-            <a:r>
-              <a:rPr lang="en-US" dirty="0" err="1"/>
-              <a:t>UIElement</a:t>
-            </a:r>
-            <a:r>
-              <a:rPr lang="en-US" dirty="0"/>
-              <a:t>, ...</a:t>
-            </a:r>
-            <a:r>
-              <a:rPr lang="ru-RU" dirty="0" smtClean="0"/>
-              <a:t/>
-            </a:r>
-            <a:br>
-              <a:rPr lang="ru-RU" dirty="0" smtClean="0"/>
-            </a:br>
-            <a:r>
-              <a:rPr lang="en-US" dirty="0" smtClean="0"/>
-              <a:t>{</a:t>
-            </a:r>
-            <a:br>
-              <a:rPr lang="en-US" dirty="0" smtClean="0"/>
-            </a:br>
-            <a:r>
-              <a:rPr lang="en-US" dirty="0" smtClean="0"/>
-              <a:t>public </a:t>
-            </a:r>
-            <a:r>
-              <a:rPr lang="en-US" dirty="0"/>
-              <a:t>static </a:t>
-            </a:r>
-            <a:r>
-              <a:rPr lang="en-US" dirty="0" err="1"/>
-              <a:t>readonly</a:t>
-            </a:r>
-            <a:r>
-              <a:rPr lang="en-US" dirty="0"/>
-              <a:t> </a:t>
-            </a:r>
-            <a:r>
-              <a:rPr lang="en-US" dirty="0" err="1">
-                <a:solidFill>
-                  <a:srgbClr val="FFFF00"/>
-                </a:solidFill>
-              </a:rPr>
-              <a:t>DependencyProperty</a:t>
-            </a:r>
-            <a:r>
-              <a:rPr lang="en-US" dirty="0"/>
-              <a:t> </a:t>
-            </a:r>
-            <a:r>
-              <a:rPr lang="en-US" dirty="0" err="1"/>
-              <a:t>Margin</a:t>
-            </a:r>
-            <a:r>
-              <a:rPr lang="en-US" dirty="0" err="1">
-                <a:solidFill>
-                  <a:srgbClr val="FFFF00"/>
-                </a:solidFill>
-              </a:rPr>
-              <a:t>Property</a:t>
-            </a:r>
-            <a:r>
-              <a:rPr lang="en-US" dirty="0" smtClean="0"/>
-              <a:t>;</a:t>
-            </a:r>
-            <a:br>
-              <a:rPr lang="en-US" dirty="0" smtClean="0"/>
-            </a:br>
-            <a:r>
-              <a:rPr lang="en-US" dirty="0" smtClean="0"/>
-              <a:t>}</a:t>
-            </a:r>
-            <a:endParaRPr lang="ru-RU" dirty="0" smtClean="0"/>
-          </a:p>
-          <a:p>
-            <a:r>
-              <a:rPr lang="ru-RU" dirty="0" smtClean="0"/>
-              <a:t>Регистрация</a:t>
-            </a:r>
-          </a:p>
-          <a:p>
-            <a:pPr lvl="1"/>
-            <a:r>
-              <a:rPr lang="en-US" dirty="0" err="1" smtClean="0"/>
-              <a:t>FrameworkPropertyMetadata</a:t>
-            </a:r>
-            <a:endParaRPr lang="ru-RU" dirty="0" smtClean="0"/>
-          </a:p>
-          <a:p>
-            <a:pPr lvl="1"/>
-            <a:r>
-              <a:rPr lang="en-US" dirty="0" err="1" smtClean="0"/>
-              <a:t>DependencyProperty.Register</a:t>
-            </a:r>
-            <a:endParaRPr lang="ru-RU" dirty="0" smtClean="0"/>
-          </a:p>
-          <a:p>
-            <a:r>
-              <a:rPr lang="ru-RU" dirty="0" smtClean="0"/>
-              <a:t>Объявление</a:t>
-            </a:r>
-          </a:p>
-          <a:p>
-            <a:pPr lvl="1"/>
-            <a:r>
-              <a:rPr lang="en-US" dirty="0"/>
-              <a:t>public Thickness </a:t>
-            </a:r>
-            <a:r>
-              <a:rPr lang="en-US" dirty="0" smtClean="0"/>
-              <a:t>Margin</a:t>
-            </a:r>
-            <a:r>
-              <a:rPr lang="ru-RU" dirty="0" smtClean="0"/>
-              <a:t/>
-            </a:r>
-            <a:br>
-              <a:rPr lang="ru-RU" dirty="0" smtClean="0"/>
-            </a:br>
-            <a:r>
-              <a:rPr lang="en-US" dirty="0" smtClean="0"/>
-              <a:t>{</a:t>
-            </a:r>
-            <a:r>
-              <a:rPr lang="ru-RU" dirty="0" smtClean="0"/>
-              <a:t/>
-            </a:r>
-            <a:br>
-              <a:rPr lang="ru-RU" dirty="0" smtClean="0"/>
-            </a:br>
-            <a:r>
-              <a:rPr lang="en-US" dirty="0" smtClean="0"/>
-              <a:t>set </a:t>
-            </a:r>
-            <a:r>
-              <a:rPr lang="en-US" dirty="0"/>
-              <a:t>{ </a:t>
-            </a:r>
-            <a:r>
-              <a:rPr lang="en-US" dirty="0" err="1"/>
-              <a:t>SetValue</a:t>
-            </a:r>
-            <a:r>
-              <a:rPr lang="en-US" dirty="0"/>
-              <a:t>(</a:t>
-            </a:r>
-            <a:r>
-              <a:rPr lang="en-US" dirty="0" err="1"/>
-              <a:t>MarginProperty</a:t>
-            </a:r>
-            <a:r>
-              <a:rPr lang="en-US" dirty="0"/>
-              <a:t>, value); </a:t>
-            </a:r>
-            <a:r>
-              <a:rPr lang="en-US" dirty="0" smtClean="0"/>
-              <a:t>}</a:t>
-            </a:r>
-            <a:r>
-              <a:rPr lang="ru-RU" dirty="0" smtClean="0"/>
-              <a:t/>
-            </a:r>
-            <a:br>
-              <a:rPr lang="ru-RU" dirty="0" smtClean="0"/>
-            </a:br>
-            <a:r>
-              <a:rPr lang="en-US" dirty="0" smtClean="0"/>
-              <a:t>get </a:t>
-            </a:r>
-            <a:r>
-              <a:rPr lang="en-US" dirty="0"/>
-              <a:t>{ return (Thickness)</a:t>
-            </a:r>
-            <a:r>
-              <a:rPr lang="en-US" dirty="0" err="1"/>
-              <a:t>GetValue</a:t>
-            </a:r>
-            <a:r>
-              <a:rPr lang="en-US" dirty="0"/>
-              <a:t>(</a:t>
-            </a:r>
-            <a:r>
-              <a:rPr lang="en-US" dirty="0" err="1"/>
-              <a:t>MarginProperty</a:t>
-            </a:r>
-            <a:r>
-              <a:rPr lang="en-US" dirty="0"/>
-              <a:t>); </a:t>
-            </a:r>
-            <a:r>
-              <a:rPr lang="en-US" dirty="0" smtClean="0"/>
-              <a:t>}</a:t>
-            </a:r>
-            <a:r>
-              <a:rPr lang="ru-RU" dirty="0" smtClean="0"/>
-              <a:t/>
-            </a:r>
-            <a:br>
-              <a:rPr lang="ru-RU" dirty="0" smtClean="0"/>
-            </a:br>
-            <a:r>
-              <a:rPr lang="en-US" dirty="0" smtClean="0"/>
-              <a:t>}</a:t>
-            </a:r>
-            <a:endParaRPr lang="ru-RU" dirty="0" smtClean="0"/>
-          </a:p>
-          <a:p>
-            <a:pPr lvl="1"/>
-            <a:r>
-              <a:rPr lang="ru-RU" dirty="0" smtClean="0">
-                <a:solidFill>
-                  <a:srgbClr val="FFFF00"/>
-                </a:solidFill>
-              </a:rPr>
-              <a:t>Только так! Ничего другого быть не должно!</a:t>
-            </a:r>
-            <a:r>
-              <a:rPr lang="ru-RU" dirty="0"/>
-              <a:t> </a:t>
-            </a:r>
-            <a:endParaRPr lang="ru-RU" dirty="0" smtClean="0"/>
-          </a:p>
-          <a:p>
-            <a:r>
-              <a:rPr lang="ru-RU" dirty="0" smtClean="0"/>
-              <a:t>Очистка</a:t>
-            </a:r>
-          </a:p>
-          <a:p>
-            <a:pPr lvl="1"/>
-            <a:r>
-              <a:rPr lang="en-US" dirty="0" err="1"/>
-              <a:t>myElement.ClearValue</a:t>
-            </a:r>
-            <a:r>
-              <a:rPr lang="en-US" dirty="0"/>
-              <a:t>(</a:t>
-            </a:r>
-            <a:r>
-              <a:rPr lang="en-US" dirty="0" err="1"/>
-              <a:t>FrameworkElement.MarginProperty</a:t>
-            </a:r>
-            <a:r>
-              <a:rPr lang="en-US" dirty="0" smtClean="0"/>
-              <a:t>);</a:t>
-            </a:r>
-            <a:endParaRPr lang="ru-RU" dirty="0" smtClean="0"/>
-          </a:p>
-          <a:p>
-            <a:r>
-              <a:rPr lang="ru-RU" dirty="0" smtClean="0">
-                <a:solidFill>
-                  <a:schemeClr val="bg1"/>
-                </a:solidFill>
-              </a:rPr>
-              <a:t>Достоинства</a:t>
-            </a:r>
-          </a:p>
-          <a:p>
-            <a:pPr lvl="1"/>
-            <a:r>
-              <a:rPr lang="ru-RU" dirty="0" smtClean="0">
-                <a:solidFill>
-                  <a:schemeClr val="bg1"/>
-                </a:solidFill>
-              </a:rPr>
-              <a:t>Тратят меньше памяти, если значение не было указано</a:t>
-            </a:r>
-          </a:p>
-          <a:p>
-            <a:pPr lvl="1"/>
-            <a:r>
-              <a:rPr lang="ru-RU" dirty="0" smtClean="0">
-                <a:solidFill>
-                  <a:schemeClr val="bg1"/>
-                </a:solidFill>
-              </a:rPr>
-              <a:t>Поддержка стилей</a:t>
-            </a:r>
-            <a:endParaRPr lang="en-US" dirty="0">
-              <a:solidFill>
-                <a:schemeClr val="bg1"/>
-              </a:solidFill>
-            </a:endParaRPr>
-          </a:p>
-        </p:txBody>
-      </p:sp>
-    </p:spTree>
-    <p:extLst>
-      <p:ext uri="{BB962C8B-B14F-4D97-AF65-F5344CB8AC3E}">
-        <p14:creationId xmlns:p14="http://schemas.microsoft.com/office/powerpoint/2010/main" val="205489790"/>
-      </p:ext>
-    </p:extLst>
-  </p:cSld>
-  <p:clrMapOvr>
-    <a:masterClrMapping/>
-  </p:clrMapOvr>
+  <p:timing>
+    <p:tnLst>
+      <p:par>
+        <p:cTn id="1" dur="indefinite" restart="never" nodeType="tmRoot"/>
+      </p:par>
+    </p:tnLst>
+  </p:timing>
 </p:sld>
 </file>
 
@@ -7015,6 +6871,389 @@
           <a:lstStyle/>
           <a:p>
             <a:r>
+              <a:rPr lang="en-US" dirty="0"/>
+              <a:t>Dependency Properties</a:t>
+            </a:r>
+          </a:p>
+        </p:txBody>
+      </p:sp>
+      <p:sp>
+        <p:nvSpPr>
+          <p:cNvPr id="3" name="Content Placeholder 2"/>
+          <p:cNvSpPr>
+            <a:spLocks noGrp="1"/>
+          </p:cNvSpPr>
+          <p:nvPr>
+            <p:ph idx="1"/>
+          </p:nvPr>
+        </p:nvSpPr>
+        <p:spPr/>
+        <p:txBody>
+          <a:bodyPr>
+            <a:normAutofit fontScale="55000" lnSpcReduction="20000"/>
+          </a:bodyPr>
+          <a:lstStyle/>
+          <a:p>
+            <a:r>
+              <a:rPr lang="ru-RU" dirty="0" smtClean="0"/>
+              <a:t>Объявление</a:t>
+            </a:r>
+          </a:p>
+          <a:p>
+            <a:pPr lvl="1"/>
+            <a:r>
+              <a:rPr lang="en-US" dirty="0"/>
+              <a:t>public class </a:t>
+            </a:r>
+            <a:r>
+              <a:rPr lang="en-US" dirty="0" err="1"/>
+              <a:t>FrameworkElement</a:t>
+            </a:r>
+            <a:r>
+              <a:rPr lang="en-US" dirty="0"/>
+              <a:t>: </a:t>
+            </a:r>
+            <a:r>
+              <a:rPr lang="en-US" dirty="0" err="1"/>
+              <a:t>UIElement</a:t>
+            </a:r>
+            <a:r>
+              <a:rPr lang="en-US" dirty="0"/>
+              <a:t>, ...</a:t>
+            </a:r>
+            <a:r>
+              <a:rPr lang="ru-RU" dirty="0" smtClean="0"/>
+              <a:t/>
+            </a:r>
+            <a:br>
+              <a:rPr lang="ru-RU" dirty="0" smtClean="0"/>
+            </a:br>
+            <a:r>
+              <a:rPr lang="en-US" dirty="0" smtClean="0"/>
+              <a:t>{</a:t>
+            </a:r>
+            <a:br>
+              <a:rPr lang="en-US" dirty="0" smtClean="0"/>
+            </a:br>
+            <a:r>
+              <a:rPr lang="en-US" dirty="0" smtClean="0"/>
+              <a:t>public </a:t>
+            </a:r>
+            <a:r>
+              <a:rPr lang="en-US" dirty="0"/>
+              <a:t>static </a:t>
+            </a:r>
+            <a:r>
+              <a:rPr lang="en-US" dirty="0" err="1"/>
+              <a:t>readonly</a:t>
+            </a:r>
+            <a:r>
+              <a:rPr lang="en-US" dirty="0"/>
+              <a:t> </a:t>
+            </a:r>
+            <a:r>
+              <a:rPr lang="en-US" dirty="0" err="1">
+                <a:solidFill>
+                  <a:srgbClr val="FFFF00"/>
+                </a:solidFill>
+              </a:rPr>
+              <a:t>DependencyProperty</a:t>
+            </a:r>
+            <a:r>
+              <a:rPr lang="en-US" dirty="0"/>
+              <a:t> </a:t>
+            </a:r>
+            <a:r>
+              <a:rPr lang="en-US" dirty="0" err="1"/>
+              <a:t>Margin</a:t>
+            </a:r>
+            <a:r>
+              <a:rPr lang="en-US" dirty="0" err="1">
+                <a:solidFill>
+                  <a:srgbClr val="FFFF00"/>
+                </a:solidFill>
+              </a:rPr>
+              <a:t>Property</a:t>
+            </a:r>
+            <a:r>
+              <a:rPr lang="en-US" dirty="0" smtClean="0"/>
+              <a:t>;</a:t>
+            </a:r>
+            <a:br>
+              <a:rPr lang="en-US" dirty="0" smtClean="0"/>
+            </a:br>
+            <a:r>
+              <a:rPr lang="en-US" dirty="0" smtClean="0"/>
+              <a:t>}</a:t>
+            </a:r>
+            <a:endParaRPr lang="ru-RU" dirty="0" smtClean="0"/>
+          </a:p>
+          <a:p>
+            <a:r>
+              <a:rPr lang="ru-RU" dirty="0" smtClean="0"/>
+              <a:t>Регистрация</a:t>
+            </a:r>
+          </a:p>
+          <a:p>
+            <a:pPr lvl="1"/>
+            <a:r>
+              <a:rPr lang="en-US" dirty="0" err="1" smtClean="0"/>
+              <a:t>FrameworkPropertyMetadata</a:t>
+            </a:r>
+            <a:endParaRPr lang="ru-RU" dirty="0" smtClean="0"/>
+          </a:p>
+          <a:p>
+            <a:pPr lvl="1"/>
+            <a:r>
+              <a:rPr lang="en-US" dirty="0" err="1" smtClean="0"/>
+              <a:t>DependencyProperty.Register</a:t>
+            </a:r>
+            <a:endParaRPr lang="ru-RU" dirty="0" smtClean="0"/>
+          </a:p>
+          <a:p>
+            <a:r>
+              <a:rPr lang="ru-RU" dirty="0" smtClean="0"/>
+              <a:t>Объявление</a:t>
+            </a:r>
+          </a:p>
+          <a:p>
+            <a:pPr lvl="1"/>
+            <a:r>
+              <a:rPr lang="en-US" dirty="0"/>
+              <a:t>public Thickness </a:t>
+            </a:r>
+            <a:r>
+              <a:rPr lang="en-US" dirty="0" smtClean="0"/>
+              <a:t>Margin</a:t>
+            </a:r>
+            <a:r>
+              <a:rPr lang="ru-RU" dirty="0" smtClean="0"/>
+              <a:t/>
+            </a:r>
+            <a:br>
+              <a:rPr lang="ru-RU" dirty="0" smtClean="0"/>
+            </a:br>
+            <a:r>
+              <a:rPr lang="en-US" dirty="0" smtClean="0"/>
+              <a:t>{</a:t>
+            </a:r>
+            <a:r>
+              <a:rPr lang="ru-RU" dirty="0" smtClean="0"/>
+              <a:t/>
+            </a:r>
+            <a:br>
+              <a:rPr lang="ru-RU" dirty="0" smtClean="0"/>
+            </a:br>
+            <a:r>
+              <a:rPr lang="en-US" dirty="0" smtClean="0"/>
+              <a:t>set </a:t>
+            </a:r>
+            <a:r>
+              <a:rPr lang="en-US" dirty="0"/>
+              <a:t>{ </a:t>
+            </a:r>
+            <a:r>
+              <a:rPr lang="en-US" dirty="0" err="1"/>
+              <a:t>SetValue</a:t>
+            </a:r>
+            <a:r>
+              <a:rPr lang="en-US" dirty="0"/>
+              <a:t>(</a:t>
+            </a:r>
+            <a:r>
+              <a:rPr lang="en-US" dirty="0" err="1"/>
+              <a:t>MarginProperty</a:t>
+            </a:r>
+            <a:r>
+              <a:rPr lang="en-US" dirty="0"/>
+              <a:t>, value); </a:t>
+            </a:r>
+            <a:r>
+              <a:rPr lang="en-US" dirty="0" smtClean="0"/>
+              <a:t>}</a:t>
+            </a:r>
+            <a:r>
+              <a:rPr lang="ru-RU" dirty="0" smtClean="0"/>
+              <a:t/>
+            </a:r>
+            <a:br>
+              <a:rPr lang="ru-RU" dirty="0" smtClean="0"/>
+            </a:br>
+            <a:r>
+              <a:rPr lang="en-US" dirty="0" smtClean="0"/>
+              <a:t>get </a:t>
+            </a:r>
+            <a:r>
+              <a:rPr lang="en-US" dirty="0"/>
+              <a:t>{ return (Thickness)</a:t>
+            </a:r>
+            <a:r>
+              <a:rPr lang="en-US" dirty="0" err="1"/>
+              <a:t>GetValue</a:t>
+            </a:r>
+            <a:r>
+              <a:rPr lang="en-US" dirty="0"/>
+              <a:t>(</a:t>
+            </a:r>
+            <a:r>
+              <a:rPr lang="en-US" dirty="0" err="1"/>
+              <a:t>MarginProperty</a:t>
+            </a:r>
+            <a:r>
+              <a:rPr lang="en-US" dirty="0"/>
+              <a:t>); </a:t>
+            </a:r>
+            <a:r>
+              <a:rPr lang="en-US" dirty="0" smtClean="0"/>
+              <a:t>}</a:t>
+            </a:r>
+            <a:r>
+              <a:rPr lang="ru-RU" dirty="0" smtClean="0"/>
+              <a:t/>
+            </a:r>
+            <a:br>
+              <a:rPr lang="ru-RU" dirty="0" smtClean="0"/>
+            </a:br>
+            <a:r>
+              <a:rPr lang="en-US" dirty="0" smtClean="0"/>
+              <a:t>}</a:t>
+            </a:r>
+            <a:endParaRPr lang="ru-RU" dirty="0" smtClean="0"/>
+          </a:p>
+          <a:p>
+            <a:pPr lvl="1"/>
+            <a:r>
+              <a:rPr lang="ru-RU" dirty="0" smtClean="0">
+                <a:solidFill>
+                  <a:srgbClr val="FFFF00"/>
+                </a:solidFill>
+              </a:rPr>
+              <a:t>Только так! Ничего другого быть не должно!</a:t>
+            </a:r>
+            <a:r>
+              <a:rPr lang="ru-RU" dirty="0"/>
+              <a:t> </a:t>
+            </a:r>
+            <a:endParaRPr lang="ru-RU" dirty="0" smtClean="0"/>
+          </a:p>
+          <a:p>
+            <a:r>
+              <a:rPr lang="ru-RU" dirty="0" smtClean="0"/>
+              <a:t>Очистка</a:t>
+            </a:r>
+          </a:p>
+          <a:p>
+            <a:pPr lvl="1"/>
+            <a:r>
+              <a:rPr lang="en-US" dirty="0" err="1"/>
+              <a:t>myElement.ClearValue</a:t>
+            </a:r>
+            <a:r>
+              <a:rPr lang="en-US" dirty="0"/>
+              <a:t>(</a:t>
+            </a:r>
+            <a:r>
+              <a:rPr lang="en-US" dirty="0" err="1"/>
+              <a:t>FrameworkElement.MarginProperty</a:t>
+            </a:r>
+            <a:r>
+              <a:rPr lang="en-US" dirty="0" smtClean="0"/>
+              <a:t>);</a:t>
+            </a:r>
+            <a:endParaRPr lang="ru-RU" dirty="0" smtClean="0"/>
+          </a:p>
+          <a:p>
+            <a:r>
+              <a:rPr lang="ru-RU" dirty="0" smtClean="0">
+                <a:solidFill>
+                  <a:schemeClr val="bg1"/>
+                </a:solidFill>
+              </a:rPr>
+              <a:t>Достоинства</a:t>
+            </a:r>
+          </a:p>
+          <a:p>
+            <a:pPr lvl="1"/>
+            <a:r>
+              <a:rPr lang="ru-RU" dirty="0" smtClean="0">
+                <a:solidFill>
+                  <a:schemeClr val="bg1"/>
+                </a:solidFill>
+              </a:rPr>
+              <a:t>Тратят меньше памяти, если значение не было указано</a:t>
+            </a:r>
+          </a:p>
+          <a:p>
+            <a:pPr lvl="1"/>
+            <a:r>
+              <a:rPr lang="ru-RU" dirty="0" smtClean="0">
+                <a:solidFill>
+                  <a:schemeClr val="bg1"/>
+                </a:solidFill>
+              </a:rPr>
+              <a:t>Поддержка стилей</a:t>
+            </a:r>
+            <a:endParaRPr lang="en-US" dirty="0">
+              <a:solidFill>
+                <a:schemeClr val="bg1"/>
+              </a:solidFill>
+            </a:endParaRPr>
+          </a:p>
+        </p:txBody>
+      </p:sp>
+    </p:spTree>
+    <p:extLst>
+      <p:ext uri="{BB962C8B-B14F-4D97-AF65-F5344CB8AC3E}">
+        <p14:creationId xmlns:p14="http://schemas.microsoft.com/office/powerpoint/2010/main" val="205489790"/>
+      </p:ext>
+    </p:extLst>
+  </p:cSld>
+  <p:clrMapOvr>
+    <a:masterClrMapping/>
+  </p:clrMapOvr>
+  <p:timing>
+    <p:tnLst>
+      <p:par>
+        <p:cTn id="1" dur="indefinite" restart="never" nodeType="tmRoot"/>
+      </p:par>
+    </p:tnLst>
+  </p:timing>
+</p:sld>
+</file>
+
+<file path=ppt/slides/slide24.xml><?xml version="1.0" encoding="utf-8"?>
+<p:sld xmlns:a="http://schemas.openxmlformats.org/drawingml/2006/main" xmlns:r="http://schemas.openxmlformats.org/officeDocument/2006/relationships" xmlns:p="http://schemas.openxmlformats.org/presentationml/2006/main">
+  <p:cSld>
+    <p:spTree>
+      <p:nvGrpSpPr>
+        <p:cNvPr id="1" name=""/>
+        <p:cNvGrpSpPr/>
+        <p:nvPr/>
+      </p:nvGrpSpPr>
+      <p:grpSpPr>
+        <a:xfrm>
+          <a:off x="0" y="0"/>
+          <a:ext cx="0" cy="0"/>
+          <a:chOff x="0" y="0"/>
+          <a:chExt cx="0" cy="0"/>
+        </a:xfrm>
+      </p:grpSpPr>
+      <p:sp>
+        <p:nvSpPr>
+          <p:cNvPr id="2" name="Title 1"/>
+          <p:cNvSpPr>
+            <a:spLocks noGrp="1"/>
+          </p:cNvSpPr>
+          <p:nvPr>
+            <p:ph type="title"/>
+          </p:nvPr>
+        </p:nvSpPr>
+        <p:spPr/>
+        <p:txBody>
+          <a:bodyPr/>
+          <a:lstStyle/>
+          <a:p>
+            <a:r>
               <a:rPr lang="ru-RU" dirty="0" smtClean="0"/>
               <a:t>Валидация</a:t>
             </a:r>
@@ -7132,10 +7371,17 @@
   <p:clrMapOvr>
     <a:masterClrMapping/>
   </p:clrMapOvr>
+  <p:timing>
+    <p:tnLst>
+      <p:par>
+        <p:cTn id="1" dur="indefinite" restart="never" nodeType="tmRoot"/>
+      </p:par>
+    </p:tnLst>
+  </p:timing>
 </p:sld>
 </file>
 
-<file path=ppt/slides/slide24.xml><?xml version="1.0" encoding="utf-8"?>
+<file path=ppt/slides/slide25.xml><?xml version="1.0" encoding="utf-8"?>
 <p:sld xmlns:a="http://schemas.openxmlformats.org/drawingml/2006/main" xmlns:r="http://schemas.openxmlformats.org/officeDocument/2006/relationships" xmlns:p="http://schemas.openxmlformats.org/presentationml/2006/main">
   <p:cSld>
     <p:spTree>
@@ -7239,6 +7485,13 @@
   <p:clrMapOvr>
     <a:masterClrMapping/>
   </p:clrMapOvr>
+  <p:timing>
+    <p:tnLst>
+      <p:par>
+        <p:cTn id="1" dur="indefinite" restart="never" nodeType="tmRoot"/>
+      </p:par>
+    </p:tnLst>
+  </p:timing>
 </p:sld>
 </file>
 
@@ -7417,6 +7670,13 @@
   <p:clrMapOvr>
     <a:masterClrMapping/>
   </p:clrMapOvr>
+  <p:timing>
+    <p:tnLst>
+      <p:par>
+        <p:cTn id="1" dur="indefinite" restart="never" nodeType="tmRoot"/>
+      </p:par>
+    </p:tnLst>
+  </p:timing>
 </p:sld>
 </file>
 
@@ -7689,9 +7949,9 @@
           <a:p>
             <a:r>
               <a:rPr lang="en-US" dirty="0" smtClean="0"/>
-              <a:t>WPF</a:t>
-            </a:r>
-            <a:endParaRPr lang="en-US" dirty="0"/>
+              <a:t>WPF vs Windows Forms</a:t>
+            </a:r>
+            <a:endParaRPr lang="ru-RU" dirty="0"/>
           </a:p>
         </p:txBody>
       </p:sp>
@@ -7707,145 +7967,92 @@
         </p:nvSpPr>
         <p:spPr/>
         <p:txBody>
-          <a:bodyPr>
-            <a:normAutofit fontScale="92500" lnSpcReduction="10000"/>
-          </a:bodyPr>
+          <a:bodyPr/>
           <a:lstStyle/>
           <a:p>
             <a:r>
+              <a:rPr lang="en-US" dirty="0" smtClean="0"/>
+              <a:t>WPF </a:t>
+            </a:r>
+            <a:r>
               <a:rPr lang="ru-RU" dirty="0" smtClean="0"/>
-              <a:t>Работает через </a:t>
+              <a:t>не </a:t>
+            </a:r>
+            <a:r>
+              <a:rPr lang="ru-RU" dirty="0"/>
+              <a:t>заменяет, а дополняет </a:t>
+            </a:r>
+            <a:r>
+              <a:rPr lang="en-US" dirty="0"/>
+              <a:t>Windows </a:t>
             </a:r>
             <a:r>
               <a:rPr lang="en-US" dirty="0" smtClean="0"/>
-              <a:t>DirectX </a:t>
+              <a:t>Forms</a:t>
+            </a:r>
+            <a:endParaRPr lang="ru-RU" dirty="0" smtClean="0"/>
+          </a:p>
+          <a:p>
+            <a:r>
+              <a:rPr lang="en-US" dirty="0" smtClean="0"/>
+              <a:t>Windows Store </a:t>
+            </a:r>
+            <a:r>
+              <a:rPr lang="ru-RU" dirty="0"/>
+              <a:t>п</a:t>
             </a:r>
             <a:r>
               <a:rPr lang="ru-RU" dirty="0" smtClean="0"/>
-              <a:t>т.е. использует аппаратную акселерацию</a:t>
-            </a:r>
-            <a:endParaRPr lang="en-US" dirty="0" smtClean="0"/>
-          </a:p>
-          <a:p>
-            <a:pPr lvl="1"/>
-            <a:r>
-              <a:rPr lang="en-US" dirty="0"/>
-              <a:t>Rendering Tier 0. </a:t>
+              <a:t>риложения для </a:t>
+            </a:r>
+            <a:r>
+              <a:rPr lang="en-US" dirty="0" smtClean="0"/>
+              <a:t>Windows 8.x</a:t>
+            </a:r>
+            <a:r>
+              <a:rPr lang="ru-RU" dirty="0"/>
+              <a:t> </a:t>
             </a:r>
             <a:r>
               <a:rPr lang="ru-RU" dirty="0" smtClean="0"/>
-              <a:t>Аппаратное ускорение отсутствует</a:t>
+              <a:t>пишутся с использованием </a:t>
             </a:r>
             <a:r>
               <a:rPr lang="en-US" dirty="0" smtClean="0"/>
-              <a:t>. DirectX &lt; 7.0</a:t>
-            </a:r>
-            <a:endParaRPr lang="en-US" dirty="0"/>
-          </a:p>
-          <a:p>
-            <a:pPr lvl="1"/>
+              <a:t>WPF</a:t>
+            </a:r>
+          </a:p>
+          <a:p>
+            <a:r>
+              <a:rPr lang="ru-RU" dirty="0" smtClean="0"/>
+              <a:t>Технология </a:t>
+            </a:r>
             <a:r>
               <a:rPr lang="en-US" dirty="0" smtClean="0"/>
-              <a:t>Rendering </a:t>
-            </a:r>
-            <a:r>
-              <a:rPr lang="en-US" dirty="0"/>
-              <a:t>Tier </a:t>
-            </a:r>
-            <a:r>
-              <a:rPr lang="en-US" dirty="0" smtClean="0"/>
-              <a:t>1. </a:t>
+              <a:t>WPF </a:t>
             </a:r>
             <a:r>
               <a:rPr lang="ru-RU" dirty="0" smtClean="0"/>
-              <a:t>Частичное аппаратное ускорение</a:t>
-            </a:r>
-            <a:r>
-              <a:rPr lang="en-US" dirty="0" smtClean="0"/>
-              <a:t>. </a:t>
-            </a:r>
-            <a:r>
-              <a:rPr lang="en-US" dirty="0"/>
-              <a:t>7.0 </a:t>
-            </a:r>
-            <a:r>
-              <a:rPr lang="en-US" dirty="0" smtClean="0"/>
-              <a:t>&lt;= DirectX  &lt; 9.0</a:t>
-            </a:r>
-            <a:r>
-              <a:rPr lang="en-US" dirty="0"/>
-              <a:t>.</a:t>
-            </a:r>
-          </a:p>
-          <a:p>
-            <a:pPr lvl="1"/>
-            <a:r>
-              <a:rPr lang="en-US" dirty="0" smtClean="0"/>
-              <a:t>Rendering </a:t>
-            </a:r>
-            <a:r>
-              <a:rPr lang="en-US" dirty="0"/>
-              <a:t>Tier 2</a:t>
-            </a:r>
-            <a:r>
-              <a:rPr lang="en-US" dirty="0" smtClean="0"/>
-              <a:t>.</a:t>
-            </a:r>
-            <a:r>
-              <a:rPr lang="ru-RU" dirty="0" smtClean="0"/>
-              <a:t> Полное аппаратное ускорение</a:t>
-            </a:r>
-            <a:r>
-              <a:rPr lang="en-US" dirty="0" smtClean="0"/>
-              <a:t>. DirectX &gt;</a:t>
-            </a:r>
-            <a:r>
-              <a:rPr lang="ru-RU" dirty="0" smtClean="0"/>
-              <a:t>= </a:t>
-            </a:r>
-            <a:r>
-              <a:rPr lang="en-US" dirty="0" smtClean="0"/>
-              <a:t>9.0</a:t>
-            </a:r>
-          </a:p>
-          <a:p>
-            <a:pPr lvl="1"/>
-            <a:r>
-              <a:rPr lang="en-US" dirty="0" err="1" smtClean="0"/>
-              <a:t>System.Windows.Media.RenderCapability</a:t>
-            </a:r>
-            <a:endParaRPr lang="en-US" dirty="0" smtClean="0"/>
-          </a:p>
-          <a:p>
-            <a:r>
-              <a:rPr lang="ru-RU" dirty="0" smtClean="0"/>
-              <a:t>Не заменяет, а дополняет </a:t>
-            </a:r>
-            <a:r>
-              <a:rPr lang="en-US" dirty="0" smtClean="0"/>
-              <a:t>Windows Forms</a:t>
-            </a:r>
-            <a:endParaRPr lang="en-US" dirty="0"/>
+              <a:t>более сложная в освоении, </a:t>
+            </a:r>
+            <a:r>
+              <a:rPr lang="ru-RU" smtClean="0"/>
+              <a:t>но дающая больше встроенных инструментов для правильной организации приложений</a:t>
+            </a:r>
+            <a:endParaRPr lang="ru-RU" dirty="0"/>
           </a:p>
         </p:txBody>
       </p:sp>
     </p:spTree>
     <p:extLst>
       <p:ext uri="{BB962C8B-B14F-4D97-AF65-F5344CB8AC3E}">
-        <p14:creationId xmlns:p14="http://schemas.microsoft.com/office/powerpoint/2010/main" val="622353422"/>
+        <p14:creationId xmlns:p14="http://schemas.microsoft.com/office/powerpoint/2010/main" val="326031182"/>
       </p:ext>
     </p:extLst>
   </p:cSld>
   <p:clrMapOvr>
     <a:masterClrMapping/>
   </p:clrMapOvr>
-  <p:timing>
-    <p:tnLst>
-      <p:par>
-        <p:cTn id="1" dur="indefinite" restart="never" nodeType="tmRoot"/>
-      </p:par>
-    </p:tnLst>
-  </p:timing>
 </p:sld>
 </file>
 
@@ -7883,6 +8090,189 @@
           <a:p>
             <a:r>
               <a:rPr lang="en-US" dirty="0" smtClean="0"/>
+              <a:t>WPF</a:t>
+            </a:r>
+            <a:endParaRPr lang="en-US" dirty="0"/>
+          </a:p>
+        </p:txBody>
+      </p:sp>
+      <p:sp>
+        <p:nvSpPr>
+          <p:cNvPr id="3" name="Content Placeholder 2"/>
+          <p:cNvSpPr>
+            <a:spLocks noGrp="1"/>
+          </p:cNvSpPr>
+          <p:nvPr>
+            <p:ph idx="1"/>
+          </p:nvPr>
+        </p:nvSpPr>
+        <p:spPr/>
+        <p:txBody>
+          <a:bodyPr>
+            <a:normAutofit/>
+          </a:bodyPr>
+          <a:lstStyle/>
+          <a:p>
+            <a:r>
+              <a:rPr lang="ru-RU" dirty="0" smtClean="0"/>
+              <a:t>Работает через </a:t>
+            </a:r>
+            <a:r>
+              <a:rPr lang="en-US" dirty="0" smtClean="0"/>
+              <a:t>DirectX </a:t>
+            </a:r>
+            <a:r>
+              <a:rPr lang="ru-RU" dirty="0" smtClean="0"/>
+              <a:t>т.е. использует аппаратную акселерацию</a:t>
+            </a:r>
+            <a:endParaRPr lang="en-US" dirty="0" smtClean="0"/>
+          </a:p>
+          <a:p>
+            <a:pPr lvl="1"/>
+            <a:r>
+              <a:rPr lang="en-US" dirty="0"/>
+              <a:t>Rendering Tier 0. </a:t>
+            </a:r>
+            <a:r>
+              <a:rPr lang="ru-RU" dirty="0" smtClean="0"/>
+              <a:t>Аппаратное ускорение отсутствует</a:t>
+            </a:r>
+            <a:r>
+              <a:rPr lang="en-US" dirty="0" smtClean="0"/>
+              <a:t>. DirectX &lt; 7.0</a:t>
+            </a:r>
+            <a:endParaRPr lang="en-US" dirty="0"/>
+          </a:p>
+          <a:p>
+            <a:pPr lvl="1"/>
+            <a:r>
+              <a:rPr lang="en-US" dirty="0" smtClean="0"/>
+              <a:t>Rendering </a:t>
+            </a:r>
+            <a:r>
+              <a:rPr lang="en-US" dirty="0"/>
+              <a:t>Tier </a:t>
+            </a:r>
+            <a:r>
+              <a:rPr lang="en-US" dirty="0" smtClean="0"/>
+              <a:t>1. </a:t>
+            </a:r>
+            <a:r>
+              <a:rPr lang="ru-RU" dirty="0" smtClean="0"/>
+              <a:t>Частичное аппаратное ускорение</a:t>
+            </a:r>
+            <a:r>
+              <a:rPr lang="en-US" dirty="0" smtClean="0"/>
+              <a:t>. </a:t>
+            </a:r>
+            <a:r>
+              <a:rPr lang="en-US" dirty="0"/>
+              <a:t>7.0 </a:t>
+            </a:r>
+            <a:r>
+              <a:rPr lang="en-US" dirty="0" smtClean="0"/>
+              <a:t>&lt;= DirectX  &lt; 9.0</a:t>
+            </a:r>
+            <a:r>
+              <a:rPr lang="en-US" dirty="0"/>
+              <a:t>.</a:t>
+            </a:r>
+          </a:p>
+          <a:p>
+            <a:pPr lvl="1"/>
+            <a:r>
+              <a:rPr lang="en-US" dirty="0" smtClean="0"/>
+              <a:t>Rendering </a:t>
+            </a:r>
+            <a:r>
+              <a:rPr lang="en-US" dirty="0"/>
+              <a:t>Tier 2</a:t>
+            </a:r>
+            <a:r>
+              <a:rPr lang="en-US" dirty="0" smtClean="0"/>
+              <a:t>.</a:t>
+            </a:r>
+            <a:r>
+              <a:rPr lang="ru-RU" dirty="0" smtClean="0"/>
+              <a:t> Полное аппаратное ускорение</a:t>
+            </a:r>
+            <a:r>
+              <a:rPr lang="en-US" dirty="0" smtClean="0"/>
+              <a:t>. DirectX &gt;</a:t>
+            </a:r>
+            <a:r>
+              <a:rPr lang="ru-RU" dirty="0" smtClean="0"/>
+              <a:t>= </a:t>
+            </a:r>
+            <a:r>
+              <a:rPr lang="en-US" dirty="0" smtClean="0"/>
+              <a:t>9.0</a:t>
+            </a:r>
+          </a:p>
+          <a:p>
+            <a:pPr lvl="1"/>
+            <a:r>
+              <a:rPr lang="en-US" dirty="0" err="1" smtClean="0"/>
+              <a:t>System.Windows.Media.RenderCapability</a:t>
+            </a:r>
+            <a:endParaRPr lang="en-US" dirty="0"/>
+          </a:p>
+        </p:txBody>
+      </p:sp>
+    </p:spTree>
+    <p:extLst>
+      <p:ext uri="{BB962C8B-B14F-4D97-AF65-F5344CB8AC3E}">
+        <p14:creationId xmlns:p14="http://schemas.microsoft.com/office/powerpoint/2010/main" val="622353422"/>
+      </p:ext>
+    </p:extLst>
+  </p:cSld>
+  <p:clrMapOvr>
+    <a:masterClrMapping/>
+  </p:clrMapOvr>
+  <p:timing>
+    <p:tnLst>
+      <p:par>
+        <p:cTn id="1" dur="indefinite" restart="never" nodeType="tmRoot"/>
+      </p:par>
+    </p:tnLst>
+  </p:timing>
+</p:sld>
+</file>
+
+<file path=ppt/slides/slide8.xml><?xml version="1.0" encoding="utf-8"?>
+<p:sld xmlns:a="http://schemas.openxmlformats.org/drawingml/2006/main" xmlns:r="http://schemas.openxmlformats.org/officeDocument/2006/relationships" xmlns:p="http://schemas.openxmlformats.org/presentationml/2006/main">
+  <p:cSld>
+    <p:spTree>
+      <p:nvGrpSpPr>
+        <p:cNvPr id="1" name=""/>
+        <p:cNvGrpSpPr/>
+        <p:nvPr/>
+      </p:nvGrpSpPr>
+      <p:grpSpPr>
+        <a:xfrm>
+          <a:off x="0" y="0"/>
+          <a:ext cx="0" cy="0"/>
+          <a:chOff x="0" y="0"/>
+          <a:chExt cx="0" cy="0"/>
+        </a:xfrm>
+      </p:grpSpPr>
+      <p:sp>
+        <p:nvSpPr>
+          <p:cNvPr id="2" name="Title 1"/>
+          <p:cNvSpPr>
+            <a:spLocks noGrp="1"/>
+          </p:cNvSpPr>
+          <p:nvPr>
+            <p:ph type="title"/>
+          </p:nvPr>
+        </p:nvSpPr>
+        <p:spPr/>
+        <p:txBody>
+          <a:bodyPr/>
+          <a:lstStyle/>
+          <a:p>
+            <a:r>
+              <a:rPr lang="en-US" dirty="0" smtClean="0"/>
               <a:t>Silverlight</a:t>
             </a:r>
             <a:endParaRPr lang="en-US" dirty="0"/>
@@ -7948,7 +8338,7 @@
 </p:sld>
 </file>
 
-<file path=ppt/slides/slide8.xml><?xml version="1.0" encoding="utf-8"?>
+<file path=ppt/slides/slide9.xml><?xml version="1.0" encoding="utf-8"?>
 <p:sld xmlns:a="http://schemas.openxmlformats.org/drawingml/2006/main" xmlns:r="http://schemas.openxmlformats.org/officeDocument/2006/relationships" xmlns:p="http://schemas.openxmlformats.org/presentationml/2006/main">
   <p:cSld>
     <p:bg>
@@ -8080,195 +8470,6 @@
     <p:extLst>
       <p:ext uri="{BB962C8B-B14F-4D97-AF65-F5344CB8AC3E}">
         <p14:creationId xmlns:p14="http://schemas.microsoft.com/office/powerpoint/2010/main" val="550215289"/>
-      </p:ext>
-    </p:extLst>
-  </p:cSld>
-  <p:clrMapOvr>
-    <a:masterClrMapping/>
-  </p:clrMapOvr>
-  <p:timing>
-    <p:tnLst>
-      <p:par>
-        <p:cTn id="1" dur="indefinite" restart="never" nodeType="tmRoot"/>
-      </p:par>
-    </p:tnLst>
-  </p:timing>
-</p:sld>
-</file>
-
-<file path=ppt/slides/slide9.xml><?xml version="1.0" encoding="utf-8"?>
-<p:sld xmlns:a="http://schemas.openxmlformats.org/drawingml/2006/main" xmlns:r="http://schemas.openxmlformats.org/officeDocument/2006/relationships" xmlns:p="http://schemas.openxmlformats.org/presentationml/2006/main">
-  <p:cSld>
-    <p:bg>
-      <p:bgPr>
-        <a:solidFill>
-          <a:schemeClr val="accent1"/>
-        </a:solidFill>
-        <a:effectLst/>
-      </p:bgPr>
-    </p:bg>
-    <p:spTree>
-      <p:nvGrpSpPr>
-        <p:cNvPr id="1" name=""/>
-        <p:cNvGrpSpPr/>
-        <p:nvPr/>
-      </p:nvGrpSpPr>
-      <p:grpSpPr>
-        <a:xfrm>
-          <a:off x="0" y="0"/>
-          <a:ext cx="0" cy="0"/>
-          <a:chOff x="0" y="0"/>
-          <a:chExt cx="0" cy="0"/>
-        </a:xfrm>
-      </p:grpSpPr>
-      <p:sp>
-        <p:nvSpPr>
-          <p:cNvPr id="2" name="Title 1"/>
-          <p:cNvSpPr>
-            <a:spLocks noGrp="1"/>
-          </p:cNvSpPr>
-          <p:nvPr>
-            <p:ph type="title"/>
-          </p:nvPr>
-        </p:nvSpPr>
-        <p:spPr/>
-        <p:txBody>
-          <a:bodyPr>
-            <a:normAutofit fontScale="90000"/>
-          </a:bodyPr>
-          <a:lstStyle/>
-          <a:p>
-            <a:r>
-              <a:rPr lang="ru-RU" dirty="0" smtClean="0">
-                <a:solidFill>
-                  <a:srgbClr val="002060"/>
-                </a:solidFill>
-              </a:rPr>
-              <a:t>Иерархия классов </a:t>
-            </a:r>
-            <a:r>
-              <a:rPr lang="en-US" dirty="0" smtClean="0">
-                <a:solidFill>
-                  <a:srgbClr val="002060"/>
-                </a:solidFill>
-              </a:rPr>
-              <a:t>WPF</a:t>
-            </a:r>
-            <a:r>
-              <a:rPr lang="ru-RU" dirty="0">
-                <a:solidFill>
-                  <a:srgbClr val="002060"/>
-                </a:solidFill>
-              </a:rPr>
-              <a:t/>
-            </a:r>
-            <a:br>
-              <a:rPr lang="ru-RU" dirty="0">
-                <a:solidFill>
-                  <a:srgbClr val="002060"/>
-                </a:solidFill>
-              </a:rPr>
-            </a:br>
-            <a:r>
-              <a:rPr lang="en-US" dirty="0" err="1" smtClean="0">
-                <a:solidFill>
-                  <a:srgbClr val="002060"/>
-                </a:solidFill>
-              </a:rPr>
-              <a:t>System.Windows</a:t>
-            </a:r>
-            <a:r>
-              <a:rPr lang="ru-RU" dirty="0" smtClean="0">
-                <a:solidFill>
-                  <a:srgbClr val="002060"/>
-                </a:solidFill>
-              </a:rPr>
-              <a:t> </a:t>
-            </a:r>
-            <a:r>
-              <a:rPr lang="en-US" dirty="0" smtClean="0">
-                <a:solidFill>
-                  <a:srgbClr val="002060"/>
-                </a:solidFill>
-              </a:rPr>
-              <a:t>namespace</a:t>
-            </a:r>
-            <a:endParaRPr lang="en-US" dirty="0">
-              <a:solidFill>
-                <a:srgbClr val="002060"/>
-              </a:solidFill>
-            </a:endParaRPr>
-          </a:p>
-        </p:txBody>
-      </p:sp>
-      <p:pic>
-        <p:nvPicPr>
-          <p:cNvPr id="2050" name="Picture 2"/>
-          <p:cNvPicPr>
-            <a:picLocks noChangeAspect="1" noChangeArrowheads="1"/>
-          </p:cNvPicPr>
-          <p:nvPr/>
-        </p:nvPicPr>
-        <p:blipFill>
-          <a:blip r:embed="rId2">
-            <a:extLst>
-              <a:ext uri="{28A0092B-C50C-407E-A947-70E740481C1C}">
-                <a14:useLocalDpi xmlns:a14="http://schemas.microsoft.com/office/drawing/2010/main" val="0"/>
-              </a:ext>
-            </a:extLst>
-          </a:blip>
-          <a:srcRect/>
-          <a:stretch>
-            <a:fillRect/>
-          </a:stretch>
-        </p:blipFill>
-        <p:spPr bwMode="auto">
-          <a:xfrm>
-            <a:off x="2094548" y="1515576"/>
-            <a:ext cx="4954905" cy="4937760"/>
-          </a:xfrm>
-          <a:prstGeom prst="rect">
-            <a:avLst/>
-          </a:prstGeom>
-          <a:noFill/>
-          <a:ln>
-            <a:noFill/>
-          </a:ln>
-          <a:effectLst/>
-          <a:extLst>
-            <a:ext uri="{909E8E84-426E-40DD-AFC4-6F175D3DCCD1}">
-              <a14:hiddenFill xmlns:a14="http://schemas.microsoft.com/office/drawing/2010/main">
-                <a:solidFill>
-                  <a:schemeClr val="accent1"/>
-                </a:solidFill>
-              </a14:hiddenFill>
-            </a:ext>
-            <a:ext uri="{91240B29-F687-4F45-9708-019B960494DF}">
-              <a14:hiddenLine xmlns:a14="http://schemas.microsoft.com/office/drawing/2010/main" w="9525">
-                <a:solidFill>
-                  <a:schemeClr val="tx1"/>
-                </a:solidFill>
-                <a:miter lim="800000"/>
-                <a:headEnd/>
-                <a:tailEnd/>
-              </a14:hiddenLine>
-            </a:ext>
-            <a:ext uri="{AF507438-7753-43E0-B8FC-AC1667EBCBE1}">
-              <a14:hiddenEffects xmlns:a14="http://schemas.microsoft.com/office/drawing/2010/main">
-                <a:effectLst>
-                  <a:outerShdw dist="35921" dir="2700000" algn="ctr" rotWithShape="0">
-                    <a:schemeClr val="bg2"/>
-                  </a:outerShdw>
-                </a:effectLst>
-              </a14:hiddenEffects>
-            </a:ext>
-          </a:extLst>
-        </p:spPr>
-      </p:pic>
-    </p:spTree>
-    <p:extLst>
-      <p:ext uri="{BB962C8B-B14F-4D97-AF65-F5344CB8AC3E}">
-        <p14:creationId xmlns:p14="http://schemas.microsoft.com/office/powerpoint/2010/main" val="32627630"/>
       </p:ext>
     </p:extLst>
   </p:cSld>

</xml_diff>